<commit_message>
update eda proyecto power point
</commit_message>
<xml_diff>
--- a/EDA_PROYECTO/EDA_PROYECTO_power point.pptx
+++ b/EDA_PROYECTO/EDA_PROYECTO_power point.pptx
@@ -4,6 +4,9 @@
   <p:sldMasterIdLst>
     <p:sldMasterId id="2147483648" r:id="rId1"/>
   </p:sldMasterIdLst>
+  <p:notesMasterIdLst>
+    <p:notesMasterId r:id="rId14"/>
+  </p:notesMasterIdLst>
   <p:sldIdLst>
     <p:sldId id="256" r:id="rId2"/>
     <p:sldId id="257" r:id="rId3"/>
@@ -115,7 +118,743 @@
       </a:defRPr>
     </a:lvl9pPr>
   </p:defaultTextStyle>
+  <p:extLst>
+    <p:ext uri="{EFAFB233-063F-42B5-8137-9DF3F51BA10A}">
+      <p15:sldGuideLst xmlns:p15="http://schemas.microsoft.com/office/powerpoint/2012/main"/>
+    </p:ext>
+  </p:extLst>
 </p:presentation>
+</file>
+
+<file path=ppt/changesInfos/changesInfo1.xml><?xml version="1.0" encoding="utf-8"?>
+<pc:chgInfo xmlns:a="http://schemas.openxmlformats.org/drawingml/2006/main" xmlns:r="http://schemas.openxmlformats.org/officeDocument/2006/relationships" xmlns:ac="http://schemas.microsoft.com/office/drawing/2013/main/command" xmlns:pc="http://schemas.microsoft.com/office/powerpoint/2013/main/command">
+  <pc:docChgLst>
+    <pc:chgData name="naim hariri" userId="c29c009dcbcc8673" providerId="LiveId" clId="{301F79E5-3D84-4C0D-838F-8CB4366C52C9}"/>
+    <pc:docChg chg="custSel modSld sldOrd">
+      <pc:chgData name="naim hariri" userId="c29c009dcbcc8673" providerId="LiveId" clId="{301F79E5-3D84-4C0D-838F-8CB4366C52C9}" dt="2024-04-19T20:39:14.511" v="517" actId="113"/>
+      <pc:docMkLst>
+        <pc:docMk/>
+      </pc:docMkLst>
+      <pc:sldChg chg="modSp mod">
+        <pc:chgData name="naim hariri" userId="c29c009dcbcc8673" providerId="LiveId" clId="{301F79E5-3D84-4C0D-838F-8CB4366C52C9}" dt="2024-04-19T17:20:13.768" v="29" actId="14100"/>
+        <pc:sldMkLst>
+          <pc:docMk/>
+          <pc:sldMk cId="2060246023" sldId="256"/>
+        </pc:sldMkLst>
+        <pc:graphicFrameChg chg="mod">
+          <ac:chgData name="naim hariri" userId="c29c009dcbcc8673" providerId="LiveId" clId="{301F79E5-3D84-4C0D-838F-8CB4366C52C9}" dt="2024-04-19T17:20:13.768" v="29" actId="14100"/>
+          <ac:graphicFrameMkLst>
+            <pc:docMk/>
+            <pc:sldMk cId="2060246023" sldId="256"/>
+            <ac:graphicFrameMk id="4" creationId="{46FFE19F-9A7C-DCC1-7BF3-9954D9562900}"/>
+          </ac:graphicFrameMkLst>
+        </pc:graphicFrameChg>
+      </pc:sldChg>
+      <pc:sldChg chg="addSp delSp modSp mod">
+        <pc:chgData name="naim hariri" userId="c29c009dcbcc8673" providerId="LiveId" clId="{301F79E5-3D84-4C0D-838F-8CB4366C52C9}" dt="2024-04-19T17:58:48.273" v="409" actId="478"/>
+        <pc:sldMkLst>
+          <pc:docMk/>
+          <pc:sldMk cId="3324750251" sldId="257"/>
+        </pc:sldMkLst>
+        <pc:graphicFrameChg chg="mod">
+          <ac:chgData name="naim hariri" userId="c29c009dcbcc8673" providerId="LiveId" clId="{301F79E5-3D84-4C0D-838F-8CB4366C52C9}" dt="2024-04-19T17:20:03.904" v="27" actId="14100"/>
+          <ac:graphicFrameMkLst>
+            <pc:docMk/>
+            <pc:sldMk cId="3324750251" sldId="257"/>
+            <ac:graphicFrameMk id="2" creationId="{FB53BE1C-5E69-98C5-2C02-7ADFCBF167A5}"/>
+          </ac:graphicFrameMkLst>
+        </pc:graphicFrameChg>
+        <pc:picChg chg="add mod">
+          <ac:chgData name="naim hariri" userId="c29c009dcbcc8673" providerId="LiveId" clId="{301F79E5-3D84-4C0D-838F-8CB4366C52C9}" dt="2024-04-19T17:52:09.231" v="201" actId="1076"/>
+          <ac:picMkLst>
+            <pc:docMk/>
+            <pc:sldMk cId="3324750251" sldId="257"/>
+            <ac:picMk id="4" creationId="{A9377E10-BDCE-00FE-7E10-01FA58ADC00E}"/>
+          </ac:picMkLst>
+        </pc:picChg>
+        <pc:picChg chg="add del mod modCrop">
+          <ac:chgData name="naim hariri" userId="c29c009dcbcc8673" providerId="LiveId" clId="{301F79E5-3D84-4C0D-838F-8CB4366C52C9}" dt="2024-04-19T17:58:48.273" v="409" actId="478"/>
+          <ac:picMkLst>
+            <pc:docMk/>
+            <pc:sldMk cId="3324750251" sldId="257"/>
+            <ac:picMk id="6" creationId="{A2BF2064-4F84-C391-5987-BCE9A4CDA763}"/>
+          </ac:picMkLst>
+        </pc:picChg>
+      </pc:sldChg>
+      <pc:sldChg chg="addSp delSp modSp mod">
+        <pc:chgData name="naim hariri" userId="c29c009dcbcc8673" providerId="LiveId" clId="{301F79E5-3D84-4C0D-838F-8CB4366C52C9}" dt="2024-04-19T20:37:12.663" v="514"/>
+        <pc:sldMkLst>
+          <pc:docMk/>
+          <pc:sldMk cId="2247517099" sldId="258"/>
+        </pc:sldMkLst>
+        <pc:spChg chg="add del">
+          <ac:chgData name="naim hariri" userId="c29c009dcbcc8673" providerId="LiveId" clId="{301F79E5-3D84-4C0D-838F-8CB4366C52C9}" dt="2024-04-19T20:37:12.662" v="512"/>
+          <ac:spMkLst>
+            <pc:docMk/>
+            <pc:sldMk cId="2247517099" sldId="258"/>
+            <ac:spMk id="3" creationId="{056BC2B1-3DE9-2926-1BE3-B2D37C6C187C}"/>
+          </ac:spMkLst>
+        </pc:spChg>
+        <pc:spChg chg="add del">
+          <ac:chgData name="naim hariri" userId="c29c009dcbcc8673" providerId="LiveId" clId="{301F79E5-3D84-4C0D-838F-8CB4366C52C9}" dt="2024-04-19T20:37:12.663" v="514"/>
+          <ac:spMkLst>
+            <pc:docMk/>
+            <pc:sldMk cId="2247517099" sldId="258"/>
+            <ac:spMk id="4" creationId="{47F43649-AA08-919A-3E7C-7ADCBC18C199}"/>
+          </ac:spMkLst>
+        </pc:spChg>
+        <pc:spChg chg="add mod">
+          <ac:chgData name="naim hariri" userId="c29c009dcbcc8673" providerId="LiveId" clId="{301F79E5-3D84-4C0D-838F-8CB4366C52C9}" dt="2024-04-19T20:34:36.829" v="509" actId="20577"/>
+          <ac:spMkLst>
+            <pc:docMk/>
+            <pc:sldMk cId="2247517099" sldId="258"/>
+            <ac:spMk id="5" creationId="{9664BA13-C188-ECE2-D8E7-653782AB0017}"/>
+          </ac:spMkLst>
+        </pc:spChg>
+        <pc:spChg chg="add mod">
+          <ac:chgData name="naim hariri" userId="c29c009dcbcc8673" providerId="LiveId" clId="{301F79E5-3D84-4C0D-838F-8CB4366C52C9}" dt="2024-04-19T20:36:20.196" v="510" actId="20577"/>
+          <ac:spMkLst>
+            <pc:docMk/>
+            <pc:sldMk cId="2247517099" sldId="258"/>
+            <ac:spMk id="6" creationId="{5B791888-65B6-1E33-F515-156FD983512D}"/>
+          </ac:spMkLst>
+        </pc:spChg>
+        <pc:graphicFrameChg chg="mod">
+          <ac:chgData name="naim hariri" userId="c29c009dcbcc8673" providerId="LiveId" clId="{301F79E5-3D84-4C0D-838F-8CB4366C52C9}" dt="2024-04-19T20:31:05.381" v="429" actId="767"/>
+          <ac:graphicFrameMkLst>
+            <pc:docMk/>
+            <pc:sldMk cId="2247517099" sldId="258"/>
+            <ac:graphicFrameMk id="2" creationId="{6A95EF32-8C29-A26F-FB94-EB461C222069}"/>
+          </ac:graphicFrameMkLst>
+        </pc:graphicFrameChg>
+      </pc:sldChg>
+      <pc:sldChg chg="modSp mod">
+        <pc:chgData name="naim hariri" userId="c29c009dcbcc8673" providerId="LiveId" clId="{301F79E5-3D84-4C0D-838F-8CB4366C52C9}" dt="2024-04-19T17:19:43.139" v="23" actId="14100"/>
+        <pc:sldMkLst>
+          <pc:docMk/>
+          <pc:sldMk cId="3099827162" sldId="259"/>
+        </pc:sldMkLst>
+        <pc:graphicFrameChg chg="mod">
+          <ac:chgData name="naim hariri" userId="c29c009dcbcc8673" providerId="LiveId" clId="{301F79E5-3D84-4C0D-838F-8CB4366C52C9}" dt="2024-04-19T17:19:43.139" v="23" actId="14100"/>
+          <ac:graphicFrameMkLst>
+            <pc:docMk/>
+            <pc:sldMk cId="3099827162" sldId="259"/>
+            <ac:graphicFrameMk id="2" creationId="{63124A9D-AA94-8464-4C0B-3BA569CFE405}"/>
+          </ac:graphicFrameMkLst>
+        </pc:graphicFrameChg>
+      </pc:sldChg>
+      <pc:sldChg chg="modSp mod">
+        <pc:chgData name="naim hariri" userId="c29c009dcbcc8673" providerId="LiveId" clId="{301F79E5-3D84-4C0D-838F-8CB4366C52C9}" dt="2024-04-19T17:19:10.156" v="21" actId="14100"/>
+        <pc:sldMkLst>
+          <pc:docMk/>
+          <pc:sldMk cId="2682966274" sldId="260"/>
+        </pc:sldMkLst>
+        <pc:graphicFrameChg chg="mod">
+          <ac:chgData name="naim hariri" userId="c29c009dcbcc8673" providerId="LiveId" clId="{301F79E5-3D84-4C0D-838F-8CB4366C52C9}" dt="2024-04-19T17:19:10.156" v="21" actId="14100"/>
+          <ac:graphicFrameMkLst>
+            <pc:docMk/>
+            <pc:sldMk cId="2682966274" sldId="260"/>
+            <ac:graphicFrameMk id="2" creationId="{31504251-76C7-343E-8384-3026A8305282}"/>
+          </ac:graphicFrameMkLst>
+        </pc:graphicFrameChg>
+      </pc:sldChg>
+      <pc:sldChg chg="addSp modSp mod">
+        <pc:chgData name="naim hariri" userId="c29c009dcbcc8673" providerId="LiveId" clId="{301F79E5-3D84-4C0D-838F-8CB4366C52C9}" dt="2024-04-19T17:44:16.112" v="41" actId="14100"/>
+        <pc:sldMkLst>
+          <pc:docMk/>
+          <pc:sldMk cId="3151945109" sldId="261"/>
+        </pc:sldMkLst>
+        <pc:graphicFrameChg chg="mod">
+          <ac:chgData name="naim hariri" userId="c29c009dcbcc8673" providerId="LiveId" clId="{301F79E5-3D84-4C0D-838F-8CB4366C52C9}" dt="2024-04-19T17:34:30.295" v="32" actId="14100"/>
+          <ac:graphicFrameMkLst>
+            <pc:docMk/>
+            <pc:sldMk cId="3151945109" sldId="261"/>
+            <ac:graphicFrameMk id="2" creationId="{0FDA5378-EC2F-04D7-7AC6-F9134FAEE20E}"/>
+          </ac:graphicFrameMkLst>
+        </pc:graphicFrameChg>
+        <pc:graphicFrameChg chg="add mod">
+          <ac:chgData name="naim hariri" userId="c29c009dcbcc8673" providerId="LiveId" clId="{301F79E5-3D84-4C0D-838F-8CB4366C52C9}" dt="2024-04-19T17:44:16.112" v="41" actId="14100"/>
+          <ac:graphicFrameMkLst>
+            <pc:docMk/>
+            <pc:sldMk cId="3151945109" sldId="261"/>
+            <ac:graphicFrameMk id="3" creationId="{25B21471-A3E7-FD6F-4B68-05A96CB0EB4B}"/>
+          </ac:graphicFrameMkLst>
+        </pc:graphicFrameChg>
+      </pc:sldChg>
+      <pc:sldChg chg="modSp mod">
+        <pc:chgData name="naim hariri" userId="c29c009dcbcc8673" providerId="LiveId" clId="{301F79E5-3D84-4C0D-838F-8CB4366C52C9}" dt="2024-04-19T17:18:46.638" v="19" actId="14100"/>
+        <pc:sldMkLst>
+          <pc:docMk/>
+          <pc:sldMk cId="1980559087" sldId="262"/>
+        </pc:sldMkLst>
+        <pc:graphicFrameChg chg="mod">
+          <ac:chgData name="naim hariri" userId="c29c009dcbcc8673" providerId="LiveId" clId="{301F79E5-3D84-4C0D-838F-8CB4366C52C9}" dt="2024-04-19T17:18:46.638" v="19" actId="14100"/>
+          <ac:graphicFrameMkLst>
+            <pc:docMk/>
+            <pc:sldMk cId="1980559087" sldId="262"/>
+            <ac:graphicFrameMk id="2" creationId="{545CFD32-08CE-981A-EA0D-E3C022D0F261}"/>
+          </ac:graphicFrameMkLst>
+        </pc:graphicFrameChg>
+      </pc:sldChg>
+      <pc:sldChg chg="addSp modSp mod">
+        <pc:chgData name="naim hariri" userId="c29c009dcbcc8673" providerId="LiveId" clId="{301F79E5-3D84-4C0D-838F-8CB4366C52C9}" dt="2024-04-19T17:50:31.908" v="188" actId="1076"/>
+        <pc:sldMkLst>
+          <pc:docMk/>
+          <pc:sldMk cId="1913406743" sldId="263"/>
+        </pc:sldMkLst>
+        <pc:graphicFrameChg chg="mod">
+          <ac:chgData name="naim hariri" userId="c29c009dcbcc8673" providerId="LiveId" clId="{301F79E5-3D84-4C0D-838F-8CB4366C52C9}" dt="2024-04-19T17:18:34.009" v="17" actId="14100"/>
+          <ac:graphicFrameMkLst>
+            <pc:docMk/>
+            <pc:sldMk cId="1913406743" sldId="263"/>
+            <ac:graphicFrameMk id="2" creationId="{58152873-1C13-CF0C-DD09-53C020348E31}"/>
+          </ac:graphicFrameMkLst>
+        </pc:graphicFrameChg>
+        <pc:picChg chg="add mod">
+          <ac:chgData name="naim hariri" userId="c29c009dcbcc8673" providerId="LiveId" clId="{301F79E5-3D84-4C0D-838F-8CB4366C52C9}" dt="2024-04-19T17:50:31.908" v="188" actId="1076"/>
+          <ac:picMkLst>
+            <pc:docMk/>
+            <pc:sldMk cId="1913406743" sldId="263"/>
+            <ac:picMk id="4" creationId="{4187FA43-CD3A-3735-5115-CB80676E03B7}"/>
+          </ac:picMkLst>
+        </pc:picChg>
+      </pc:sldChg>
+      <pc:sldChg chg="addSp modSp mod ord">
+        <pc:chgData name="naim hariri" userId="c29c009dcbcc8673" providerId="LiveId" clId="{301F79E5-3D84-4C0D-838F-8CB4366C52C9}" dt="2024-04-19T17:42:45.445" v="38" actId="14100"/>
+        <pc:sldMkLst>
+          <pc:docMk/>
+          <pc:sldMk cId="2646105459" sldId="264"/>
+        </pc:sldMkLst>
+        <pc:graphicFrameChg chg="add mod">
+          <ac:chgData name="naim hariri" userId="c29c009dcbcc8673" providerId="LiveId" clId="{301F79E5-3D84-4C0D-838F-8CB4366C52C9}" dt="2024-04-19T17:39:29.312" v="35" actId="14100"/>
+          <ac:graphicFrameMkLst>
+            <pc:docMk/>
+            <pc:sldMk cId="2646105459" sldId="264"/>
+            <ac:graphicFrameMk id="3" creationId="{60426CDF-A547-8E09-88B8-5ACDBA27C4EB}"/>
+          </ac:graphicFrameMkLst>
+        </pc:graphicFrameChg>
+        <pc:picChg chg="add mod">
+          <ac:chgData name="naim hariri" userId="c29c009dcbcc8673" providerId="LiveId" clId="{301F79E5-3D84-4C0D-838F-8CB4366C52C9}" dt="2024-04-19T17:42:45.445" v="38" actId="14100"/>
+          <ac:picMkLst>
+            <pc:docMk/>
+            <pc:sldMk cId="2646105459" sldId="264"/>
+            <ac:picMk id="5" creationId="{B5E0BB8F-A5FF-4534-9485-308A90708216}"/>
+          </ac:picMkLst>
+        </pc:picChg>
+      </pc:sldChg>
+      <pc:sldChg chg="addSp modSp mod">
+        <pc:chgData name="naim hariri" userId="c29c009dcbcc8673" providerId="LiveId" clId="{301F79E5-3D84-4C0D-838F-8CB4366C52C9}" dt="2024-04-19T17:51:24.827" v="196" actId="1076"/>
+        <pc:sldMkLst>
+          <pc:docMk/>
+          <pc:sldMk cId="1789606937" sldId="265"/>
+        </pc:sldMkLst>
+        <pc:graphicFrameChg chg="mod">
+          <ac:chgData name="naim hariri" userId="c29c009dcbcc8673" providerId="LiveId" clId="{301F79E5-3D84-4C0D-838F-8CB4366C52C9}" dt="2024-04-19T17:17:58.832" v="15" actId="14100"/>
+          <ac:graphicFrameMkLst>
+            <pc:docMk/>
+            <pc:sldMk cId="1789606937" sldId="265"/>
+            <ac:graphicFrameMk id="2" creationId="{76406EFA-C874-4666-5425-CAC32864105D}"/>
+          </ac:graphicFrameMkLst>
+        </pc:graphicFrameChg>
+        <pc:picChg chg="add mod">
+          <ac:chgData name="naim hariri" userId="c29c009dcbcc8673" providerId="LiveId" clId="{301F79E5-3D84-4C0D-838F-8CB4366C52C9}" dt="2024-04-19T17:51:24.827" v="196" actId="1076"/>
+          <ac:picMkLst>
+            <pc:docMk/>
+            <pc:sldMk cId="1789606937" sldId="265"/>
+            <ac:picMk id="4" creationId="{E6E0E529-CB85-4B58-965E-75677989BCE3}"/>
+          </ac:picMkLst>
+        </pc:picChg>
+      </pc:sldChg>
+      <pc:sldChg chg="addSp modSp mod ord">
+        <pc:chgData name="naim hariri" userId="c29c009dcbcc8673" providerId="LiveId" clId="{301F79E5-3D84-4C0D-838F-8CB4366C52C9}" dt="2024-04-19T18:00:00.684" v="414" actId="1076"/>
+        <pc:sldMkLst>
+          <pc:docMk/>
+          <pc:sldMk cId="404833148" sldId="266"/>
+        </pc:sldMkLst>
+        <pc:graphicFrameChg chg="mod">
+          <ac:chgData name="naim hariri" userId="c29c009dcbcc8673" providerId="LiveId" clId="{301F79E5-3D84-4C0D-838F-8CB4366C52C9}" dt="2024-04-19T17:17:19.234" v="12" actId="14100"/>
+          <ac:graphicFrameMkLst>
+            <pc:docMk/>
+            <pc:sldMk cId="404833148" sldId="266"/>
+            <ac:graphicFrameMk id="2" creationId="{D7EBFFC0-8F42-3FE5-027C-3C423605430A}"/>
+          </ac:graphicFrameMkLst>
+        </pc:graphicFrameChg>
+        <pc:picChg chg="add mod">
+          <ac:chgData name="naim hariri" userId="c29c009dcbcc8673" providerId="LiveId" clId="{301F79E5-3D84-4C0D-838F-8CB4366C52C9}" dt="2024-04-19T18:00:00.684" v="414" actId="1076"/>
+          <ac:picMkLst>
+            <pc:docMk/>
+            <pc:sldMk cId="404833148" sldId="266"/>
+            <ac:picMk id="4" creationId="{8E3D20FE-43D4-597C-4510-DACFDDEF2385}"/>
+          </ac:picMkLst>
+        </pc:picChg>
+      </pc:sldChg>
+      <pc:sldChg chg="addSp delSp modSp mod setBg">
+        <pc:chgData name="naim hariri" userId="c29c009dcbcc8673" providerId="LiveId" clId="{301F79E5-3D84-4C0D-838F-8CB4366C52C9}" dt="2024-04-19T20:39:14.511" v="517" actId="113"/>
+        <pc:sldMkLst>
+          <pc:docMk/>
+          <pc:sldMk cId="350652868" sldId="267"/>
+        </pc:sldMkLst>
+        <pc:spChg chg="mod">
+          <ac:chgData name="naim hariri" userId="c29c009dcbcc8673" providerId="LiveId" clId="{301F79E5-3D84-4C0D-838F-8CB4366C52C9}" dt="2024-04-19T20:39:14.511" v="517" actId="113"/>
+          <ac:spMkLst>
+            <pc:docMk/>
+            <pc:sldMk cId="350652868" sldId="267"/>
+            <ac:spMk id="3" creationId="{8270C08C-1003-52C4-76E9-64AD7958EE95}"/>
+          </ac:spMkLst>
+        </pc:spChg>
+        <pc:picChg chg="add del mod">
+          <ac:chgData name="naim hariri" userId="c29c009dcbcc8673" providerId="LiveId" clId="{301F79E5-3D84-4C0D-838F-8CB4366C52C9}" dt="2024-04-19T18:05:30.145" v="421" actId="478"/>
+          <ac:picMkLst>
+            <pc:docMk/>
+            <pc:sldMk cId="350652868" sldId="267"/>
+            <ac:picMk id="4" creationId="{0D80D10F-1BA9-1C59-3FC9-6C9B13C9C559}"/>
+          </ac:picMkLst>
+        </pc:picChg>
+        <pc:picChg chg="add mod">
+          <ac:chgData name="naim hariri" userId="c29c009dcbcc8673" providerId="LiveId" clId="{301F79E5-3D84-4C0D-838F-8CB4366C52C9}" dt="2024-04-19T18:05:56.333" v="427" actId="14100"/>
+          <ac:picMkLst>
+            <pc:docMk/>
+            <pc:sldMk cId="350652868" sldId="267"/>
+            <ac:picMk id="6" creationId="{B299FBC1-D6F5-7A24-76BF-40DDE4FAA317}"/>
+          </ac:picMkLst>
+        </pc:picChg>
+      </pc:sldChg>
+    </pc:docChg>
+  </pc:docChgLst>
+</pc:chgInfo>
+</file>
+
+<file path=ppt/notesMasters/notesMaster1.xml><?xml version="1.0" encoding="utf-8"?>
+<p:notesMaster xmlns:a="http://schemas.openxmlformats.org/drawingml/2006/main" xmlns:r="http://schemas.openxmlformats.org/officeDocument/2006/relationships" xmlns:p="http://schemas.openxmlformats.org/presentationml/2006/main">
+  <p:cSld>
+    <p:bg>
+      <p:bgRef idx="1001">
+        <a:schemeClr val="bg1"/>
+      </p:bgRef>
+    </p:bg>
+    <p:spTree>
+      <p:nvGrpSpPr>
+        <p:cNvPr id="1" name=""/>
+        <p:cNvGrpSpPr/>
+        <p:nvPr/>
+      </p:nvGrpSpPr>
+      <p:grpSpPr>
+        <a:xfrm>
+          <a:off x="0" y="0"/>
+          <a:ext cx="0" cy="0"/>
+          <a:chOff x="0" y="0"/>
+          <a:chExt cx="0" cy="0"/>
+        </a:xfrm>
+      </p:grpSpPr>
+      <p:sp>
+        <p:nvSpPr>
+          <p:cNvPr id="2" name="Marcador de encabezado 1"/>
+          <p:cNvSpPr>
+            <a:spLocks noGrp="1"/>
+          </p:cNvSpPr>
+          <p:nvPr>
+            <p:ph type="hdr" sz="quarter"/>
+          </p:nvPr>
+        </p:nvSpPr>
+        <p:spPr>
+          <a:xfrm>
+            <a:off x="0" y="0"/>
+            <a:ext cx="2971800" cy="458788"/>
+          </a:xfrm>
+          <a:prstGeom prst="rect">
+            <a:avLst/>
+          </a:prstGeom>
+        </p:spPr>
+        <p:txBody>
+          <a:bodyPr vert="horz" lIns="91440" tIns="45720" rIns="91440" bIns="45720" rtlCol="0"/>
+          <a:lstStyle>
+            <a:lvl1pPr algn="l">
+              <a:defRPr sz="1200"/>
+            </a:lvl1pPr>
+          </a:lstStyle>
+          <a:p>
+            <a:endParaRPr lang="es-ES"/>
+          </a:p>
+        </p:txBody>
+      </p:sp>
+      <p:sp>
+        <p:nvSpPr>
+          <p:cNvPr id="3" name="Marcador de fecha 2"/>
+          <p:cNvSpPr>
+            <a:spLocks noGrp="1"/>
+          </p:cNvSpPr>
+          <p:nvPr>
+            <p:ph type="dt" idx="1"/>
+          </p:nvPr>
+        </p:nvSpPr>
+        <p:spPr>
+          <a:xfrm>
+            <a:off x="3884613" y="0"/>
+            <a:ext cx="2971800" cy="458788"/>
+          </a:xfrm>
+          <a:prstGeom prst="rect">
+            <a:avLst/>
+          </a:prstGeom>
+        </p:spPr>
+        <p:txBody>
+          <a:bodyPr vert="horz" lIns="91440" tIns="45720" rIns="91440" bIns="45720" rtlCol="0"/>
+          <a:lstStyle>
+            <a:lvl1pPr algn="r">
+              <a:defRPr sz="1200"/>
+            </a:lvl1pPr>
+          </a:lstStyle>
+          <a:p>
+            <a:fld id="{45805197-FCFE-4589-ADA2-379CDF3CB56B}" type="datetimeFigureOut">
+              <a:rPr lang="es-ES" smtClean="0"/>
+              <a:t>19/04/2024</a:t>
+            </a:fld>
+            <a:endParaRPr lang="es-ES"/>
+          </a:p>
+        </p:txBody>
+      </p:sp>
+      <p:sp>
+        <p:nvSpPr>
+          <p:cNvPr id="4" name="Marcador de imagen de diapositiva 3"/>
+          <p:cNvSpPr>
+            <a:spLocks noGrp="1" noRot="1" noChangeAspect="1"/>
+          </p:cNvSpPr>
+          <p:nvPr>
+            <p:ph type="sldImg" idx="2"/>
+          </p:nvPr>
+        </p:nvSpPr>
+        <p:spPr>
+          <a:xfrm>
+            <a:off x="685800" y="1143000"/>
+            <a:ext cx="5486400" cy="3086100"/>
+          </a:xfrm>
+          <a:prstGeom prst="rect">
+            <a:avLst/>
+          </a:prstGeom>
+          <a:noFill/>
+          <a:ln w="12700">
+            <a:solidFill>
+              <a:prstClr val="black"/>
+            </a:solidFill>
+          </a:ln>
+        </p:spPr>
+        <p:txBody>
+          <a:bodyPr vert="horz" lIns="91440" tIns="45720" rIns="91440" bIns="45720" rtlCol="0" anchor="ctr"/>
+          <a:lstStyle/>
+          <a:p>
+            <a:endParaRPr lang="es-ES"/>
+          </a:p>
+        </p:txBody>
+      </p:sp>
+      <p:sp>
+        <p:nvSpPr>
+          <p:cNvPr id="5" name="Marcador de notas 4"/>
+          <p:cNvSpPr>
+            <a:spLocks noGrp="1"/>
+          </p:cNvSpPr>
+          <p:nvPr>
+            <p:ph type="body" sz="quarter" idx="3"/>
+          </p:nvPr>
+        </p:nvSpPr>
+        <p:spPr>
+          <a:xfrm>
+            <a:off x="685800" y="4400550"/>
+            <a:ext cx="5486400" cy="3600450"/>
+          </a:xfrm>
+          <a:prstGeom prst="rect">
+            <a:avLst/>
+          </a:prstGeom>
+        </p:spPr>
+        <p:txBody>
+          <a:bodyPr vert="horz" lIns="91440" tIns="45720" rIns="91440" bIns="45720" rtlCol="0"/>
+          <a:lstStyle/>
+          <a:p>
+            <a:pPr lvl="0"/>
+            <a:r>
+              <a:rPr lang="es-ES"/>
+              <a:t>Haga clic para modificar los estilos de texto del patrón</a:t>
+            </a:r>
+          </a:p>
+          <a:p>
+            <a:pPr lvl="1"/>
+            <a:r>
+              <a:rPr lang="es-ES"/>
+              <a:t>Segundo nivel</a:t>
+            </a:r>
+          </a:p>
+          <a:p>
+            <a:pPr lvl="2"/>
+            <a:r>
+              <a:rPr lang="es-ES"/>
+              <a:t>Tercer nivel</a:t>
+            </a:r>
+          </a:p>
+          <a:p>
+            <a:pPr lvl="3"/>
+            <a:r>
+              <a:rPr lang="es-ES"/>
+              <a:t>Cuarto nivel</a:t>
+            </a:r>
+          </a:p>
+          <a:p>
+            <a:pPr lvl="4"/>
+            <a:r>
+              <a:rPr lang="es-ES"/>
+              <a:t>Quinto nivel</a:t>
+            </a:r>
+          </a:p>
+        </p:txBody>
+      </p:sp>
+      <p:sp>
+        <p:nvSpPr>
+          <p:cNvPr id="6" name="Marcador de pie de página 5"/>
+          <p:cNvSpPr>
+            <a:spLocks noGrp="1"/>
+          </p:cNvSpPr>
+          <p:nvPr>
+            <p:ph type="ftr" sz="quarter" idx="4"/>
+          </p:nvPr>
+        </p:nvSpPr>
+        <p:spPr>
+          <a:xfrm>
+            <a:off x="0" y="8685213"/>
+            <a:ext cx="2971800" cy="458787"/>
+          </a:xfrm>
+          <a:prstGeom prst="rect">
+            <a:avLst/>
+          </a:prstGeom>
+        </p:spPr>
+        <p:txBody>
+          <a:bodyPr vert="horz" lIns="91440" tIns="45720" rIns="91440" bIns="45720" rtlCol="0" anchor="b"/>
+          <a:lstStyle>
+            <a:lvl1pPr algn="l">
+              <a:defRPr sz="1200"/>
+            </a:lvl1pPr>
+          </a:lstStyle>
+          <a:p>
+            <a:endParaRPr lang="es-ES"/>
+          </a:p>
+        </p:txBody>
+      </p:sp>
+      <p:sp>
+        <p:nvSpPr>
+          <p:cNvPr id="7" name="Marcador de número de diapositiva 6"/>
+          <p:cNvSpPr>
+            <a:spLocks noGrp="1"/>
+          </p:cNvSpPr>
+          <p:nvPr>
+            <p:ph type="sldNum" sz="quarter" idx="5"/>
+          </p:nvPr>
+        </p:nvSpPr>
+        <p:spPr>
+          <a:xfrm>
+            <a:off x="3884613" y="8685213"/>
+            <a:ext cx="2971800" cy="458787"/>
+          </a:xfrm>
+          <a:prstGeom prst="rect">
+            <a:avLst/>
+          </a:prstGeom>
+        </p:spPr>
+        <p:txBody>
+          <a:bodyPr vert="horz" lIns="91440" tIns="45720" rIns="91440" bIns="45720" rtlCol="0" anchor="b"/>
+          <a:lstStyle>
+            <a:lvl1pPr algn="r">
+              <a:defRPr sz="1200"/>
+            </a:lvl1pPr>
+          </a:lstStyle>
+          <a:p>
+            <a:fld id="{2EC3240D-E4E8-4F6C-8C23-AF8567794702}" type="slidenum">
+              <a:rPr lang="es-ES" smtClean="0"/>
+              <a:t>‹Nº›</a:t>
+            </a:fld>
+            <a:endParaRPr lang="es-ES"/>
+          </a:p>
+        </p:txBody>
+      </p:sp>
+    </p:spTree>
+    <p:extLst>
+      <p:ext uri="{BB962C8B-B14F-4D97-AF65-F5344CB8AC3E}">
+        <p14:creationId xmlns:p14="http://schemas.microsoft.com/office/powerpoint/2010/main" val="2893975402"/>
+      </p:ext>
+    </p:extLst>
+  </p:cSld>
+  <p:clrMap bg1="lt1" tx1="dk1" bg2="lt2" tx2="dk2" accent1="accent1" accent2="accent2" accent3="accent3" accent4="accent4" accent5="accent5" accent6="accent6" hlink="hlink" folHlink="folHlink"/>
+  <p:notesStyle>
+    <a:lvl1pPr marL="0" algn="l" defTabSz="914400" rtl="0" eaLnBrk="1" latinLnBrk="0" hangingPunct="1">
+      <a:defRPr sz="1200" kern="1200">
+        <a:solidFill>
+          <a:schemeClr val="tx1"/>
+        </a:solidFill>
+        <a:latin typeface="+mn-lt"/>
+        <a:ea typeface="+mn-ea"/>
+        <a:cs typeface="+mn-cs"/>
+      </a:defRPr>
+    </a:lvl1pPr>
+    <a:lvl2pPr marL="457200" algn="l" defTabSz="914400" rtl="0" eaLnBrk="1" latinLnBrk="0" hangingPunct="1">
+      <a:defRPr sz="1200" kern="1200">
+        <a:solidFill>
+          <a:schemeClr val="tx1"/>
+        </a:solidFill>
+        <a:latin typeface="+mn-lt"/>
+        <a:ea typeface="+mn-ea"/>
+        <a:cs typeface="+mn-cs"/>
+      </a:defRPr>
+    </a:lvl2pPr>
+    <a:lvl3pPr marL="914400" algn="l" defTabSz="914400" rtl="0" eaLnBrk="1" latinLnBrk="0" hangingPunct="1">
+      <a:defRPr sz="1200" kern="1200">
+        <a:solidFill>
+          <a:schemeClr val="tx1"/>
+        </a:solidFill>
+        <a:latin typeface="+mn-lt"/>
+        <a:ea typeface="+mn-ea"/>
+        <a:cs typeface="+mn-cs"/>
+      </a:defRPr>
+    </a:lvl3pPr>
+    <a:lvl4pPr marL="1371600" algn="l" defTabSz="914400" rtl="0" eaLnBrk="1" latinLnBrk="0" hangingPunct="1">
+      <a:defRPr sz="1200" kern="1200">
+        <a:solidFill>
+          <a:schemeClr val="tx1"/>
+        </a:solidFill>
+        <a:latin typeface="+mn-lt"/>
+        <a:ea typeface="+mn-ea"/>
+        <a:cs typeface="+mn-cs"/>
+      </a:defRPr>
+    </a:lvl4pPr>
+    <a:lvl5pPr marL="1828800" algn="l" defTabSz="914400" rtl="0" eaLnBrk="1" latinLnBrk="0" hangingPunct="1">
+      <a:defRPr sz="1200" kern="1200">
+        <a:solidFill>
+          <a:schemeClr val="tx1"/>
+        </a:solidFill>
+        <a:latin typeface="+mn-lt"/>
+        <a:ea typeface="+mn-ea"/>
+        <a:cs typeface="+mn-cs"/>
+      </a:defRPr>
+    </a:lvl5pPr>
+    <a:lvl6pPr marL="2286000" algn="l" defTabSz="914400" rtl="0" eaLnBrk="1" latinLnBrk="0" hangingPunct="1">
+      <a:defRPr sz="1200" kern="1200">
+        <a:solidFill>
+          <a:schemeClr val="tx1"/>
+        </a:solidFill>
+        <a:latin typeface="+mn-lt"/>
+        <a:ea typeface="+mn-ea"/>
+        <a:cs typeface="+mn-cs"/>
+      </a:defRPr>
+    </a:lvl6pPr>
+    <a:lvl7pPr marL="2743200" algn="l" defTabSz="914400" rtl="0" eaLnBrk="1" latinLnBrk="0" hangingPunct="1">
+      <a:defRPr sz="1200" kern="1200">
+        <a:solidFill>
+          <a:schemeClr val="tx1"/>
+        </a:solidFill>
+        <a:latin typeface="+mn-lt"/>
+        <a:ea typeface="+mn-ea"/>
+        <a:cs typeface="+mn-cs"/>
+      </a:defRPr>
+    </a:lvl7pPr>
+    <a:lvl8pPr marL="3200400" algn="l" defTabSz="914400" rtl="0" eaLnBrk="1" latinLnBrk="0" hangingPunct="1">
+      <a:defRPr sz="1200" kern="1200">
+        <a:solidFill>
+          <a:schemeClr val="tx1"/>
+        </a:solidFill>
+        <a:latin typeface="+mn-lt"/>
+        <a:ea typeface="+mn-ea"/>
+        <a:cs typeface="+mn-cs"/>
+      </a:defRPr>
+    </a:lvl8pPr>
+    <a:lvl9pPr marL="3657600" algn="l" defTabSz="914400" rtl="0" eaLnBrk="1" latinLnBrk="0" hangingPunct="1">
+      <a:defRPr sz="1200" kern="1200">
+        <a:solidFill>
+          <a:schemeClr val="tx1"/>
+        </a:solidFill>
+        <a:latin typeface="+mn-lt"/>
+        <a:ea typeface="+mn-ea"/>
+        <a:cs typeface="+mn-cs"/>
+      </a:defRPr>
+    </a:lvl9pPr>
+  </p:notesStyle>
+</p:notesMaster>
+</file>
+
+<file path=ppt/notesSlides/notesSlide1.xml><?xml version="1.0" encoding="utf-8"?>
+<p:notes xmlns:a="http://schemas.openxmlformats.org/drawingml/2006/main" xmlns:r="http://schemas.openxmlformats.org/officeDocument/2006/relationships" xmlns:p="http://schemas.openxmlformats.org/presentationml/2006/main">
+  <p:cSld>
+    <p:spTree>
+      <p:nvGrpSpPr>
+        <p:cNvPr id="1" name=""/>
+        <p:cNvGrpSpPr/>
+        <p:nvPr/>
+      </p:nvGrpSpPr>
+      <p:grpSpPr>
+        <a:xfrm>
+          <a:off x="0" y="0"/>
+          <a:ext cx="0" cy="0"/>
+          <a:chOff x="0" y="0"/>
+          <a:chExt cx="0" cy="0"/>
+        </a:xfrm>
+      </p:grpSpPr>
+      <p:sp>
+        <p:nvSpPr>
+          <p:cNvPr id="2" name="Marcador de imagen de diapositiva 1"/>
+          <p:cNvSpPr>
+            <a:spLocks noGrp="1" noRot="1" noChangeAspect="1"/>
+          </p:cNvSpPr>
+          <p:nvPr>
+            <p:ph type="sldImg"/>
+          </p:nvPr>
+        </p:nvSpPr>
+        <p:spPr/>
+      </p:sp>
+      <p:sp>
+        <p:nvSpPr>
+          <p:cNvPr id="3" name="Marcador de notas 2"/>
+          <p:cNvSpPr>
+            <a:spLocks noGrp="1"/>
+          </p:cNvSpPr>
+          <p:nvPr>
+            <p:ph type="body" idx="1"/>
+          </p:nvPr>
+        </p:nvSpPr>
+        <p:spPr/>
+        <p:txBody>
+          <a:bodyPr/>
+          <a:lstStyle/>
+          <a:p>
+            <a:endParaRPr lang="es-ES" dirty="0"/>
+          </a:p>
+        </p:txBody>
+      </p:sp>
+      <p:sp>
+        <p:nvSpPr>
+          <p:cNvPr id="4" name="Marcador de número de diapositiva 3"/>
+          <p:cNvSpPr>
+            <a:spLocks noGrp="1"/>
+          </p:cNvSpPr>
+          <p:nvPr>
+            <p:ph type="sldNum" sz="quarter" idx="5"/>
+          </p:nvPr>
+        </p:nvSpPr>
+        <p:spPr/>
+        <p:txBody>
+          <a:bodyPr/>
+          <a:lstStyle/>
+          <a:p>
+            <a:fld id="{2EC3240D-E4E8-4F6C-8C23-AF8567794702}" type="slidenum">
+              <a:rPr lang="es-ES" smtClean="0"/>
+              <a:t>7</a:t>
+            </a:fld>
+            <a:endParaRPr lang="es-ES"/>
+          </a:p>
+        </p:txBody>
+      </p:sp>
+    </p:spTree>
+    <p:extLst>
+      <p:ext uri="{BB962C8B-B14F-4D97-AF65-F5344CB8AC3E}">
+        <p14:creationId xmlns:p14="http://schemas.microsoft.com/office/powerpoint/2010/main" val="2368102415"/>
+      </p:ext>
+    </p:extLst>
+  </p:cSld>
+  <p:clrMapOvr>
+    <a:masterClrMapping/>
+  </p:clrMapOvr>
+</p:notes>
 </file>
 
 <file path=ppt/slideLayouts/slideLayout1.xml><?xml version="1.0" encoding="utf-8"?>
@@ -265,7 +1004,7 @@
           <a:p>
             <a:fld id="{0238E83B-4CAE-4AE3-A504-9D43852CF89D}" type="datetimeFigureOut">
               <a:rPr lang="es-ES" smtClean="0"/>
-              <a:t>18/04/2024</a:t>
+              <a:t>19/04/2024</a:t>
             </a:fld>
             <a:endParaRPr lang="es-ES"/>
           </a:p>
@@ -463,7 +1202,7 @@
           <a:p>
             <a:fld id="{0238E83B-4CAE-4AE3-A504-9D43852CF89D}" type="datetimeFigureOut">
               <a:rPr lang="es-ES" smtClean="0"/>
-              <a:t>18/04/2024</a:t>
+              <a:t>19/04/2024</a:t>
             </a:fld>
             <a:endParaRPr lang="es-ES"/>
           </a:p>
@@ -671,7 +1410,7 @@
           <a:p>
             <a:fld id="{0238E83B-4CAE-4AE3-A504-9D43852CF89D}" type="datetimeFigureOut">
               <a:rPr lang="es-ES" smtClean="0"/>
-              <a:t>18/04/2024</a:t>
+              <a:t>19/04/2024</a:t>
             </a:fld>
             <a:endParaRPr lang="es-ES"/>
           </a:p>
@@ -869,7 +1608,7 @@
           <a:p>
             <a:fld id="{0238E83B-4CAE-4AE3-A504-9D43852CF89D}" type="datetimeFigureOut">
               <a:rPr lang="es-ES" smtClean="0"/>
-              <a:t>18/04/2024</a:t>
+              <a:t>19/04/2024</a:t>
             </a:fld>
             <a:endParaRPr lang="es-ES"/>
           </a:p>
@@ -1144,7 +1883,7 @@
           <a:p>
             <a:fld id="{0238E83B-4CAE-4AE3-A504-9D43852CF89D}" type="datetimeFigureOut">
               <a:rPr lang="es-ES" smtClean="0"/>
-              <a:t>18/04/2024</a:t>
+              <a:t>19/04/2024</a:t>
             </a:fld>
             <a:endParaRPr lang="es-ES"/>
           </a:p>
@@ -1409,7 +2148,7 @@
           <a:p>
             <a:fld id="{0238E83B-4CAE-4AE3-A504-9D43852CF89D}" type="datetimeFigureOut">
               <a:rPr lang="es-ES" smtClean="0"/>
-              <a:t>18/04/2024</a:t>
+              <a:t>19/04/2024</a:t>
             </a:fld>
             <a:endParaRPr lang="es-ES"/>
           </a:p>
@@ -1821,7 +2560,7 @@
           <a:p>
             <a:fld id="{0238E83B-4CAE-4AE3-A504-9D43852CF89D}" type="datetimeFigureOut">
               <a:rPr lang="es-ES" smtClean="0"/>
-              <a:t>18/04/2024</a:t>
+              <a:t>19/04/2024</a:t>
             </a:fld>
             <a:endParaRPr lang="es-ES"/>
           </a:p>
@@ -1962,7 +2701,7 @@
           <a:p>
             <a:fld id="{0238E83B-4CAE-4AE3-A504-9D43852CF89D}" type="datetimeFigureOut">
               <a:rPr lang="es-ES" smtClean="0"/>
-              <a:t>18/04/2024</a:t>
+              <a:t>19/04/2024</a:t>
             </a:fld>
             <a:endParaRPr lang="es-ES"/>
           </a:p>
@@ -2075,7 +2814,7 @@
           <a:p>
             <a:fld id="{0238E83B-4CAE-4AE3-A504-9D43852CF89D}" type="datetimeFigureOut">
               <a:rPr lang="es-ES" smtClean="0"/>
-              <a:t>18/04/2024</a:t>
+              <a:t>19/04/2024</a:t>
             </a:fld>
             <a:endParaRPr lang="es-ES"/>
           </a:p>
@@ -2386,7 +3125,7 @@
           <a:p>
             <a:fld id="{0238E83B-4CAE-4AE3-A504-9D43852CF89D}" type="datetimeFigureOut">
               <a:rPr lang="es-ES" smtClean="0"/>
-              <a:t>18/04/2024</a:t>
+              <a:t>19/04/2024</a:t>
             </a:fld>
             <a:endParaRPr lang="es-ES"/>
           </a:p>
@@ -2674,7 +3413,7 @@
           <a:p>
             <a:fld id="{0238E83B-4CAE-4AE3-A504-9D43852CF89D}" type="datetimeFigureOut">
               <a:rPr lang="es-ES" smtClean="0"/>
-              <a:t>18/04/2024</a:t>
+              <a:t>19/04/2024</a:t>
             </a:fld>
             <a:endParaRPr lang="es-ES"/>
           </a:p>
@@ -2915,7 +3654,7 @@
           <a:p>
             <a:fld id="{0238E83B-4CAE-4AE3-A504-9D43852CF89D}" type="datetimeFigureOut">
               <a:rPr lang="es-ES" smtClean="0"/>
-              <a:t>18/04/2024</a:t>
+              <a:t>19/04/2024</a:t>
             </a:fld>
             <a:endParaRPr lang="es-ES"/>
           </a:p>
@@ -3399,11 +4138,17 @@
               <p:cNvGraphicFramePr>
                 <a:graphicFrameLocks noGrp="1"/>
               </p:cNvGraphicFramePr>
-              <p:nvPr/>
+              <p:nvPr>
+                <p:extLst>
+                  <p:ext uri="{D42A27DB-BD31-4B8C-83A1-F6EECF244321}">
+                    <p14:modId xmlns:p14="http://schemas.microsoft.com/office/powerpoint/2010/main" val="72676460"/>
+                  </p:ext>
+                </p:extLst>
+              </p:nvPr>
             </p:nvGraphicFramePr>
             <p:xfrm>
-              <a:off x="1524000" y="714374"/>
-              <a:ext cx="9144000" cy="5429250"/>
+              <a:off x="0" y="0"/>
+              <a:ext cx="12192000" cy="6858000"/>
             </p:xfrm>
             <a:graphic>
               <a:graphicData uri="http://schemas.microsoft.com/office/webextensions/webextension/2010/11">
@@ -3435,8 +4180,8 @@
             </p:blipFill>
             <p:spPr>
               <a:xfrm>
-                <a:off x="1524000" y="714374"/>
-                <a:ext cx="9144000" cy="5429250"/>
+                <a:off x="0" y="0"/>
+                <a:ext cx="12192000" cy="6858000"/>
               </a:xfrm>
               <a:prstGeom prst="rect">
                 <a:avLst/>
@@ -3489,11 +4234,17 @@
               <p:cNvGraphicFramePr>
                 <a:graphicFrameLocks noGrp="1"/>
               </p:cNvGraphicFramePr>
-              <p:nvPr/>
+              <p:nvPr>
+                <p:extLst>
+                  <p:ext uri="{D42A27DB-BD31-4B8C-83A1-F6EECF244321}">
+                    <p14:modId xmlns:p14="http://schemas.microsoft.com/office/powerpoint/2010/main" val="357845402"/>
+                  </p:ext>
+                </p:extLst>
+              </p:nvPr>
             </p:nvGraphicFramePr>
             <p:xfrm>
-              <a:off x="1524000" y="714374"/>
-              <a:ext cx="9144000" cy="5429250"/>
+              <a:off x="0" y="0"/>
+              <a:ext cx="12192000" cy="6858000"/>
             </p:xfrm>
             <a:graphic>
               <a:graphicData uri="http://schemas.microsoft.com/office/webextensions/webextension/2010/11">
@@ -3525,8 +4276,8 @@
             </p:blipFill>
             <p:spPr>
               <a:xfrm>
-                <a:off x="1524000" y="714374"/>
-                <a:ext cx="9144000" cy="5429250"/>
+                <a:off x="0" y="0"/>
+                <a:ext cx="12192000" cy="6858000"/>
               </a:xfrm>
               <a:prstGeom prst="rect">
                 <a:avLst/>
@@ -3535,6 +4286,42 @@
           </p:pic>
         </mc:Fallback>
       </mc:AlternateContent>
+      <p:pic>
+        <p:nvPicPr>
+          <p:cNvPr id="4" name="Imagen 3">
+            <a:extLst>
+              <a:ext uri="{FF2B5EF4-FFF2-40B4-BE49-F238E27FC236}">
+                <a16:creationId xmlns:a16="http://schemas.microsoft.com/office/drawing/2014/main" id="{E6E0E529-CB85-4B58-965E-75677989BCE3}"/>
+              </a:ext>
+            </a:extLst>
+          </p:cNvPr>
+          <p:cNvPicPr>
+            <a:picLocks noChangeAspect="1"/>
+          </p:cNvPicPr>
+          <p:nvPr/>
+        </p:nvPicPr>
+        <p:blipFill>
+          <a:blip r:embed="rId4">
+            <a:extLst>
+              <a:ext uri="{28A0092B-C50C-407E-A947-70E740481C1C}">
+                <a14:useLocalDpi xmlns:a14="http://schemas.microsoft.com/office/drawing/2010/main" val="0"/>
+              </a:ext>
+            </a:extLst>
+          </a:blip>
+          <a:stretch>
+            <a:fillRect/>
+          </a:stretch>
+        </p:blipFill>
+        <p:spPr>
+          <a:xfrm>
+            <a:off x="1454729" y="886692"/>
+            <a:ext cx="1694872" cy="2542308"/>
+          </a:xfrm>
+          <a:prstGeom prst="rect">
+            <a:avLst/>
+          </a:prstGeom>
+        </p:spPr>
+      </p:pic>
     </p:spTree>
     <p:extLst>
       <p:ext uri="{BB962C8B-B14F-4D97-AF65-F5344CB8AC3E}">
@@ -3579,11 +4366,17 @@
               <p:cNvGraphicFramePr>
                 <a:graphicFrameLocks noGrp="1"/>
               </p:cNvGraphicFramePr>
-              <p:nvPr/>
+              <p:nvPr>
+                <p:extLst>
+                  <p:ext uri="{D42A27DB-BD31-4B8C-83A1-F6EECF244321}">
+                    <p14:modId xmlns:p14="http://schemas.microsoft.com/office/powerpoint/2010/main" val="948258946"/>
+                  </p:ext>
+                </p:extLst>
+              </p:nvPr>
             </p:nvGraphicFramePr>
             <p:xfrm>
-              <a:off x="1524000" y="714374"/>
-              <a:ext cx="9144000" cy="5429250"/>
+              <a:off x="0" y="0"/>
+              <a:ext cx="12192000" cy="6858000"/>
             </p:xfrm>
             <a:graphic>
               <a:graphicData uri="http://schemas.microsoft.com/office/webextensions/webextension/2010/11">
@@ -3615,8 +4408,8 @@
             </p:blipFill>
             <p:spPr>
               <a:xfrm>
-                <a:off x="1524000" y="714374"/>
-                <a:ext cx="9144000" cy="5429250"/>
+                <a:off x="0" y="0"/>
+                <a:ext cx="12192000" cy="6858000"/>
               </a:xfrm>
               <a:prstGeom prst="rect">
                 <a:avLst/>
@@ -3625,6 +4418,42 @@
           </p:pic>
         </mc:Fallback>
       </mc:AlternateContent>
+      <p:pic>
+        <p:nvPicPr>
+          <p:cNvPr id="4" name="Imagen 3">
+            <a:extLst>
+              <a:ext uri="{FF2B5EF4-FFF2-40B4-BE49-F238E27FC236}">
+                <a16:creationId xmlns:a16="http://schemas.microsoft.com/office/drawing/2014/main" id="{8E3D20FE-43D4-597C-4510-DACFDDEF2385}"/>
+              </a:ext>
+            </a:extLst>
+          </p:cNvPr>
+          <p:cNvPicPr>
+            <a:picLocks noChangeAspect="1"/>
+          </p:cNvPicPr>
+          <p:nvPr/>
+        </p:nvPicPr>
+        <p:blipFill>
+          <a:blip r:embed="rId4">
+            <a:extLst>
+              <a:ext uri="{28A0092B-C50C-407E-A947-70E740481C1C}">
+                <a14:useLocalDpi xmlns:a14="http://schemas.microsoft.com/office/drawing/2010/main" val="0"/>
+              </a:ext>
+            </a:extLst>
+          </a:blip>
+          <a:stretch>
+            <a:fillRect/>
+          </a:stretch>
+        </p:blipFill>
+        <p:spPr>
+          <a:xfrm>
+            <a:off x="1491672" y="1551708"/>
+            <a:ext cx="1722582" cy="1291937"/>
+          </a:xfrm>
+          <a:prstGeom prst="rect">
+            <a:avLst/>
+          </a:prstGeom>
+        </p:spPr>
+      </p:pic>
     </p:spTree>
     <p:extLst>
       <p:ext uri="{BB962C8B-B14F-4D97-AF65-F5344CB8AC3E}">
@@ -3641,6 +4470,38 @@
 <file path=ppt/slides/slide12.xml><?xml version="1.0" encoding="utf-8"?>
 <p:sld xmlns:a="http://schemas.openxmlformats.org/drawingml/2006/main" xmlns:r="http://schemas.openxmlformats.org/officeDocument/2006/relationships" xmlns:p="http://schemas.openxmlformats.org/presentationml/2006/main">
   <p:cSld>
+    <p:bg>
+      <p:bgPr>
+        <a:gradFill>
+          <a:gsLst>
+            <a:gs pos="0">
+              <a:srgbClr val="B0AD9E"/>
+            </a:gs>
+            <a:gs pos="46000">
+              <a:srgbClr val="F5C3EA">
+                <a:alpha val="16000"/>
+                <a:lumMod val="32000"/>
+                <a:lumOff val="68000"/>
+              </a:srgbClr>
+            </a:gs>
+            <a:gs pos="83000">
+              <a:schemeClr val="accent1">
+                <a:lumMod val="45000"/>
+                <a:lumOff val="55000"/>
+              </a:schemeClr>
+            </a:gs>
+            <a:gs pos="100000">
+              <a:schemeClr val="accent1">
+                <a:lumMod val="30000"/>
+                <a:lumOff val="70000"/>
+              </a:schemeClr>
+            </a:gs>
+          </a:gsLst>
+          <a:lin ang="5400000" scaled="1"/>
+        </a:gradFill>
+        <a:effectLst/>
+      </p:bgPr>
+    </p:bg>
     <p:spTree>
       <p:nvGrpSpPr>
         <p:cNvPr id="1" name=""/>
@@ -3669,8 +4530,8 @@
         </p:nvSpPr>
         <p:spPr>
           <a:xfrm>
-            <a:off x="305291" y="1616423"/>
-            <a:ext cx="8880004" cy="3293209"/>
+            <a:off x="138546" y="203201"/>
+            <a:ext cx="11443854" cy="6555641"/>
           </a:xfrm>
           <a:prstGeom prst="rect">
             <a:avLst/>
@@ -3684,40 +4545,114 @@
           <a:lstStyle/>
           <a:p>
             <a:pPr algn="l" rtl="0"/>
-            <a:r>
-              <a:rPr lang="es-ES" sz="800" b="1" i="0" dirty="0">
+            <a:endParaRPr lang="es-ES" sz="1200" b="1" i="0" dirty="0">
+              <a:solidFill>
+                <a:srgbClr val="000000"/>
+              </a:solidFill>
+              <a:effectLst/>
+            </a:endParaRPr>
+          </a:p>
+          <a:p>
+            <a:pPr algn="l" rtl="0"/>
+            <a:r>
+              <a:rPr lang="es-ES" sz="1200" b="1" dirty="0">
+                <a:solidFill>
+                  <a:schemeClr val="accent4">
+                    <a:lumMod val="50000"/>
+                  </a:schemeClr>
+                </a:solidFill>
+              </a:rPr>
+              <a:t>CONCLUSIONES</a:t>
+            </a:r>
+            <a:r>
+              <a:rPr lang="es-ES" sz="1200" b="1" dirty="0">
+                <a:solidFill>
+                  <a:srgbClr val="000000"/>
+                </a:solidFill>
+              </a:rPr>
+              <a:t> .</a:t>
+            </a:r>
+          </a:p>
+          <a:p>
+            <a:pPr algn="l" rtl="0"/>
+            <a:endParaRPr lang="es-ES" sz="1200" b="1" i="0" dirty="0">
+              <a:solidFill>
+                <a:srgbClr val="000000"/>
+              </a:solidFill>
+              <a:effectLst/>
+            </a:endParaRPr>
+          </a:p>
+          <a:p>
+            <a:pPr algn="l" rtl="0"/>
+            <a:endParaRPr lang="es-ES" sz="1200" b="1" i="0" dirty="0">
+              <a:solidFill>
+                <a:srgbClr val="000000"/>
+              </a:solidFill>
+              <a:effectLst/>
+            </a:endParaRPr>
+          </a:p>
+          <a:p>
+            <a:pPr algn="l" rtl="0"/>
+            <a:endParaRPr lang="es-ES" sz="1200" b="1" dirty="0">
+              <a:solidFill>
+                <a:srgbClr val="000000"/>
+              </a:solidFill>
+            </a:endParaRPr>
+          </a:p>
+          <a:p>
+            <a:pPr algn="l" rtl="0"/>
+            <a:r>
+              <a:rPr lang="es-ES" sz="1200" b="1" i="0" dirty="0">
                 <a:solidFill>
                   <a:srgbClr val="000000"/>
                 </a:solidFill>
                 <a:effectLst/>
               </a:rPr>
-              <a:t>1-La edad promedio de las muestras es de 49.84 años.</a:t>
-            </a:r>
-          </a:p>
-          <a:p>
-            <a:pPr algn="l" rtl="0"/>
-            <a:endParaRPr lang="es-ES" sz="800" dirty="0">
-              <a:effectLst/>
-            </a:endParaRPr>
-          </a:p>
-          <a:p>
-            <a:pPr algn="l" rtl="0"/>
-            <a:r>
-              <a:rPr lang="es-ES" sz="800" b="1" i="0" dirty="0">
+              <a:t>1-</a:t>
+            </a:r>
+            <a:r>
+              <a:rPr lang="es-ES" sz="1200" i="0" dirty="0">
                 <a:solidFill>
                   <a:srgbClr val="000000"/>
                 </a:solidFill>
                 <a:effectLst/>
               </a:rPr>
-              <a:t>2. El análisis del estado civil revela que el 48.0% de las muestras están casadas, seguido por el 25.3% Categorizado como soltero, las personas que mas fuman son las solteras y casadas.</a:t>
-            </a:r>
-            <a:endParaRPr lang="es-ES" sz="800" dirty="0">
+              <a:t>La edad promedio de las muestras es de 49.84 años.</a:t>
+            </a:r>
+          </a:p>
+          <a:p>
+            <a:pPr algn="l" rtl="0"/>
+            <a:endParaRPr lang="es-ES" sz="1200" dirty="0">
               <a:effectLst/>
             </a:endParaRPr>
           </a:p>
           <a:p>
             <a:pPr algn="l" rtl="0"/>
-            <a:endParaRPr lang="es-ES" sz="800" b="1" i="0" dirty="0">
+            <a:r>
+              <a:rPr lang="es-ES" sz="1200" b="1" i="0" dirty="0">
+                <a:solidFill>
+                  <a:srgbClr val="000000"/>
+                </a:solidFill>
+                <a:effectLst/>
+              </a:rPr>
+              <a:t>2</a:t>
+            </a:r>
+            <a:r>
+              <a:rPr lang="es-ES" sz="1200" i="0" dirty="0">
+                <a:solidFill>
+                  <a:srgbClr val="000000"/>
+                </a:solidFill>
+                <a:effectLst/>
+              </a:rPr>
+              <a:t>. El análisis del estado civil revela que el 48.0% de las muestras están casadas, seguido por el 25.3% Categorizado como soltero, las personas que mas fuman son las solteras y casadas.</a:t>
+            </a:r>
+            <a:endParaRPr lang="es-ES" sz="1200" dirty="0">
+              <a:effectLst/>
+            </a:endParaRPr>
+          </a:p>
+          <a:p>
+            <a:pPr algn="l" rtl="0"/>
+            <a:endParaRPr lang="es-ES" sz="1200" i="0" dirty="0">
               <a:solidFill>
                 <a:srgbClr val="000000"/>
               </a:solidFill>
@@ -3727,16 +4662,25 @@
           <a:p>
             <a:pPr algn="l" rtl="0"/>
             <a:r>
-              <a:rPr lang="es-ES" sz="800" b="1" i="0" dirty="0">
+              <a:rPr lang="es-ES" sz="1200" b="1" i="0" dirty="0">
                 <a:solidFill>
                   <a:srgbClr val="000000"/>
                 </a:solidFill>
                 <a:effectLst/>
               </a:rPr>
-              <a:t>3. En cuanto al nivel educativo alcanzado, la distribución es la siguiente: el 34.7% de las muestras carecen de Una calificación formal, el 18.2% poseen una calificación de GCSE/O </a:t>
-            </a:r>
-            <a:r>
-              <a:rPr lang="es-ES" sz="800" b="1" i="0" dirty="0" err="1">
+              <a:t>3</a:t>
+            </a:r>
+            <a:r>
+              <a:rPr lang="es-ES" sz="1200" i="0" dirty="0">
+                <a:solidFill>
+                  <a:srgbClr val="000000"/>
+                </a:solidFill>
+                <a:effectLst/>
+              </a:rPr>
+              <a:t>. En cuanto al nivel educativo alcanzado, la distribución es la siguiente: el 34.7% de las muestras carecen de Una calificación formal, el 18.2% poseen una calificación de GCSE/O </a:t>
+            </a:r>
+            <a:r>
+              <a:rPr lang="es-ES" sz="1200" i="0" dirty="0" err="1">
                 <a:solidFill>
                   <a:srgbClr val="000000"/>
                 </a:solidFill>
@@ -3745,57 +4689,87 @@
               <a:t>Level</a:t>
             </a:r>
             <a:r>
-              <a:rPr lang="es-ES" sz="800" b="1" i="0" dirty="0">
+              <a:rPr lang="es-ES" sz="1200" i="0" dirty="0">
                 <a:solidFill>
                   <a:srgbClr val="000000"/>
                 </a:solidFill>
                 <a:effectLst/>
               </a:rPr>
-              <a:t> y el 15.5% han obtenido un título Universitario, los que mas fuman son personas sin </a:t>
-            </a:r>
-            <a:r>
-              <a:rPr lang="es-ES" sz="800" b="1" i="0" dirty="0" err="1">
+              <a:t> y el 15.5% han obtenido un título Universitario, los que mas fuman son personas sin cualificación seguido de GCSE (educación secundaria Obligatoria)</a:t>
+            </a:r>
+            <a:endParaRPr lang="es-ES" sz="1200" dirty="0">
+              <a:effectLst/>
+            </a:endParaRPr>
+          </a:p>
+          <a:p>
+            <a:pPr algn="l" rtl="0"/>
+            <a:endParaRPr lang="es-ES" sz="1200" i="0" dirty="0">
+              <a:solidFill>
+                <a:srgbClr val="000000"/>
+              </a:solidFill>
+              <a:effectLst/>
+            </a:endParaRPr>
+          </a:p>
+          <a:p>
+            <a:pPr algn="l" rtl="0"/>
+            <a:r>
+              <a:rPr lang="es-ES" sz="1200" b="1" i="0" dirty="0">
                 <a:solidFill>
                   <a:srgbClr val="000000"/>
                 </a:solidFill>
                 <a:effectLst/>
               </a:rPr>
-              <a:t>cualificacion</a:t>
-            </a:r>
-            <a:r>
-              <a:rPr lang="es-ES" sz="800" b="1" i="0" dirty="0">
+              <a:t>4</a:t>
+            </a:r>
+            <a:r>
+              <a:rPr lang="es-ES" sz="1200" i="0" dirty="0">
                 <a:solidFill>
                   <a:srgbClr val="000000"/>
                 </a:solidFill>
                 <a:effectLst/>
               </a:rPr>
-              <a:t> seguido de GCSE (</a:t>
-            </a:r>
-            <a:r>
-              <a:rPr lang="es-ES" sz="800" b="1" i="0" dirty="0" err="1">
+              <a:t>. En términos de nacionalidad, la mayoría de las muestras (49.3%) se identifican como inglesas, siendo el segundo grupo más grande el británico, que representa el 31.8% de la muestra.</a:t>
+            </a:r>
+            <a:endParaRPr lang="es-ES" sz="1200" dirty="0">
+              <a:effectLst/>
+            </a:endParaRPr>
+          </a:p>
+          <a:p>
+            <a:pPr algn="l" rtl="0"/>
+            <a:endParaRPr lang="es-ES" sz="1200" i="0" dirty="0">
+              <a:solidFill>
+                <a:srgbClr val="000000"/>
+              </a:solidFill>
+              <a:effectLst/>
+            </a:endParaRPr>
+          </a:p>
+          <a:p>
+            <a:pPr algn="l" rtl="0"/>
+            <a:r>
+              <a:rPr lang="es-ES" sz="1200" b="1" i="0" dirty="0">
                 <a:solidFill>
                   <a:srgbClr val="000000"/>
                 </a:solidFill>
                 <a:effectLst/>
               </a:rPr>
-              <a:t>educacion</a:t>
-            </a:r>
-            <a:r>
-              <a:rPr lang="es-ES" sz="800" b="1" i="0" dirty="0">
+              <a:t>5</a:t>
+            </a:r>
+            <a:r>
+              <a:rPr lang="es-ES" sz="1200" i="0" dirty="0">
                 <a:solidFill>
                   <a:srgbClr val="000000"/>
                 </a:solidFill>
                 <a:effectLst/>
               </a:rPr>
-              <a:t> secundaria Obligatoria)</a:t>
-            </a:r>
-            <a:endParaRPr lang="es-ES" sz="800" dirty="0">
+              <a:t>. La composición étnica es predominantemente blanca, con más del 90% de las muestras, mientras que otros grupos étnicos colectivamente constituyen menos del 10%.</a:t>
+            </a:r>
+            <a:endParaRPr lang="es-ES" sz="1200" dirty="0">
               <a:effectLst/>
             </a:endParaRPr>
           </a:p>
           <a:p>
             <a:pPr algn="l" rtl="0"/>
-            <a:endParaRPr lang="es-ES" sz="800" b="1" i="0" dirty="0">
+            <a:endParaRPr lang="es-ES" sz="1200" i="0" dirty="0">
               <a:solidFill>
                 <a:srgbClr val="000000"/>
               </a:solidFill>
@@ -3805,21 +4779,30 @@
           <a:p>
             <a:pPr algn="l" rtl="0"/>
             <a:r>
-              <a:rPr lang="es-ES" sz="800" b="1" i="0" dirty="0">
+              <a:rPr lang="es-ES" sz="1200" b="1" i="0" dirty="0">
                 <a:solidFill>
                   <a:srgbClr val="000000"/>
                 </a:solidFill>
                 <a:effectLst/>
               </a:rPr>
-              <a:t>4. En términos de nacionalidad, la mayoría de las muestras (49.3%) se identifican como inglesas, siendo el segundo grupo más grande el británico, que representa el 31.8% de la muestra.</a:t>
-            </a:r>
-            <a:endParaRPr lang="es-ES" sz="800" dirty="0">
+              <a:t>6</a:t>
+            </a:r>
+            <a:r>
+              <a:rPr lang="es-ES" sz="1200" i="0" dirty="0">
+                <a:solidFill>
+                  <a:srgbClr val="000000"/>
+                </a:solidFill>
+                <a:effectLst/>
+              </a:rPr>
+              <a:t>. El análisis de ingresos brutos indica que el tramo de ingresos de 5200-10400 es el más grande, abarcando el 23.4% de las muestras. Le siguen de cerca los tramos de 10400-15600 y 2600-5200, que constituyen el 15.8% y el 15.2%.</a:t>
+            </a:r>
+            <a:endParaRPr lang="es-ES" sz="1200" dirty="0">
               <a:effectLst/>
             </a:endParaRPr>
           </a:p>
           <a:p>
             <a:pPr algn="l" rtl="0"/>
-            <a:endParaRPr lang="es-ES" sz="800" b="1" i="0" dirty="0">
+            <a:endParaRPr lang="es-ES" sz="1200" i="0" dirty="0">
               <a:solidFill>
                 <a:srgbClr val="000000"/>
               </a:solidFill>
@@ -3829,64 +4812,25 @@
           <a:p>
             <a:pPr algn="l" rtl="0"/>
             <a:r>
-              <a:rPr lang="es-ES" sz="800" b="1" i="0" dirty="0">
+              <a:rPr lang="es-ES" sz="1200" b="1" i="0" dirty="0">
                 <a:solidFill>
                   <a:srgbClr val="000000"/>
                 </a:solidFill>
                 <a:effectLst/>
               </a:rPr>
-              <a:t>5. La composición étnica es predominantemente blanca, con más del 90% de las muestras, mientras que otros grupos étnicos colectivamente constituyen menos del 10%.</a:t>
-            </a:r>
-            <a:endParaRPr lang="es-ES" sz="800" dirty="0">
-              <a:effectLst/>
-            </a:endParaRPr>
-          </a:p>
-          <a:p>
-            <a:pPr algn="l" rtl="0"/>
-            <a:endParaRPr lang="es-ES" sz="800" b="1" i="0" dirty="0">
-              <a:solidFill>
-                <a:srgbClr val="000000"/>
-              </a:solidFill>
-              <a:effectLst/>
-            </a:endParaRPr>
-          </a:p>
-          <a:p>
-            <a:pPr algn="l" rtl="0"/>
-            <a:r>
-              <a:rPr lang="es-ES" sz="800" b="1" i="0" dirty="0">
+              <a:t>7</a:t>
+            </a:r>
+            <a:r>
+              <a:rPr lang="es-ES" sz="1200" i="0" dirty="0">
                 <a:solidFill>
                   <a:srgbClr val="000000"/>
                 </a:solidFill>
                 <a:effectLst/>
               </a:rPr>
-              <a:t>6. El análisis de ingresos brutos indica que el tramo de ingresos de 5200-10400 es el más grande, abarcando el 23.4% de las muestras. Le siguen de cerca los tramos de 10400-15600 y 2600-5200, que constituyen el 15.8% y el 15.2%.</a:t>
-            </a:r>
-            <a:endParaRPr lang="es-ES" sz="800" dirty="0">
-              <a:effectLst/>
-            </a:endParaRPr>
-          </a:p>
-          <a:p>
-            <a:pPr algn="l" rtl="0"/>
-            <a:endParaRPr lang="es-ES" sz="800" b="1" i="0" dirty="0">
-              <a:solidFill>
-                <a:srgbClr val="000000"/>
-              </a:solidFill>
-              <a:effectLst/>
-            </a:endParaRPr>
-          </a:p>
-          <a:p>
-            <a:pPr algn="l" rtl="0"/>
-            <a:r>
-              <a:rPr lang="es-ES" sz="800" b="1" i="0" dirty="0">
-                <a:solidFill>
-                  <a:srgbClr val="000000"/>
-                </a:solidFill>
-                <a:effectLst/>
-              </a:rPr>
-              <a:t>7. Regionalmente, aproximadamente el 50% de los datos provienen de las </a:t>
-            </a:r>
-            <a:r>
-              <a:rPr lang="es-ES" sz="800" b="1" i="0" dirty="0" err="1">
+              <a:t>. Regionalmente, aproximadamente el 50% de los datos provienen de las </a:t>
+            </a:r>
+            <a:r>
+              <a:rPr lang="es-ES" sz="1200" i="0" dirty="0" err="1">
                 <a:solidFill>
                   <a:srgbClr val="000000"/>
                 </a:solidFill>
@@ -3895,7 +4839,7 @@
               <a:t>Midlands</a:t>
             </a:r>
             <a:r>
-              <a:rPr lang="es-ES" sz="800" b="1" i="0" dirty="0">
+              <a:rPr lang="es-ES" sz="1200" i="0" dirty="0">
                 <a:solidFill>
                   <a:srgbClr val="000000"/>
                 </a:solidFill>
@@ -3904,7 +4848,7 @@
               <a:t> y el Este de </a:t>
             </a:r>
             <a:r>
-              <a:rPr lang="es-ES" sz="800" b="1" i="0" dirty="0" err="1">
+              <a:rPr lang="es-ES" sz="1200" i="0" dirty="0" err="1">
                 <a:solidFill>
                   <a:srgbClr val="000000"/>
                 </a:solidFill>
@@ -3913,7 +4857,7 @@
               <a:t>Anglia</a:t>
             </a:r>
             <a:r>
-              <a:rPr lang="es-ES" sz="800" b="1" i="0" dirty="0">
+              <a:rPr lang="es-ES" sz="1200" i="0" dirty="0">
                 <a:solidFill>
                   <a:srgbClr val="000000"/>
                 </a:solidFill>
@@ -3922,7 +4866,7 @@
               <a:t> (26.2%), y la región del Norte contribuye con el 25.2% al conjunto de datos, los que mas fuman en el </a:t>
             </a:r>
             <a:r>
-              <a:rPr lang="es-ES" sz="800" b="1" i="0" dirty="0" err="1">
+              <a:rPr lang="es-ES" sz="1200" i="0" dirty="0" err="1">
                 <a:solidFill>
                   <a:srgbClr val="000000"/>
                 </a:solidFill>
@@ -3931,7 +4875,7 @@
               <a:t>dataset</a:t>
             </a:r>
             <a:r>
-              <a:rPr lang="es-ES" sz="800" b="1" i="0" dirty="0">
+              <a:rPr lang="es-ES" sz="1200" i="0" dirty="0">
                 <a:solidFill>
                   <a:srgbClr val="000000"/>
                 </a:solidFill>
@@ -3940,7 +4884,7 @@
               <a:t> son las regiones de </a:t>
             </a:r>
             <a:r>
-              <a:rPr lang="es-ES" sz="800" b="1" i="0" dirty="0" err="1">
+              <a:rPr lang="es-ES" sz="1200" i="0" dirty="0" err="1">
                 <a:solidFill>
                   <a:srgbClr val="000000"/>
                 </a:solidFill>
@@ -3949,7 +4893,7 @@
               <a:t>Midlands</a:t>
             </a:r>
             <a:r>
-              <a:rPr lang="es-ES" sz="800" b="1" i="0" dirty="0">
+              <a:rPr lang="es-ES" sz="1200" i="0" dirty="0">
                 <a:solidFill>
                   <a:srgbClr val="000000"/>
                 </a:solidFill>
@@ -3958,7 +4902,7 @@
               <a:t> y </a:t>
             </a:r>
             <a:r>
-              <a:rPr lang="es-ES" sz="800" b="1" i="0" dirty="0" err="1">
+              <a:rPr lang="es-ES" sz="1200" i="0" dirty="0" err="1">
                 <a:solidFill>
                   <a:srgbClr val="000000"/>
                 </a:solidFill>
@@ -3967,7 +4911,7 @@
               <a:t>region</a:t>
             </a:r>
             <a:r>
-              <a:rPr lang="es-ES" sz="800" b="1" i="0" dirty="0">
+              <a:rPr lang="es-ES" sz="1200" i="0" dirty="0">
                 <a:solidFill>
                   <a:srgbClr val="000000"/>
                 </a:solidFill>
@@ -3975,13 +4919,13 @@
               </a:rPr>
               <a:t> del norte, como es evidente.</a:t>
             </a:r>
-            <a:endParaRPr lang="es-ES" sz="800" dirty="0">
+            <a:endParaRPr lang="es-ES" sz="1200" dirty="0">
               <a:effectLst/>
             </a:endParaRPr>
           </a:p>
           <a:p>
             <a:pPr algn="l" rtl="0"/>
-            <a:endParaRPr lang="es-ES" sz="800" b="1" i="0" dirty="0">
+            <a:endParaRPr lang="es-ES" sz="1200" i="0" dirty="0">
               <a:solidFill>
                 <a:srgbClr val="000000"/>
               </a:solidFill>
@@ -3991,7 +4935,7 @@
           <a:p>
             <a:pPr algn="l" rtl="0"/>
             <a:r>
-              <a:rPr lang="es-ES" sz="800" b="1" i="0" dirty="0">
+              <a:rPr lang="es-ES" sz="1200" b="1" i="0" dirty="0">
                 <a:solidFill>
                   <a:srgbClr val="000000"/>
                 </a:solidFill>
@@ -4000,7 +4944,7 @@
               <a:t>8. El análisis estadístico revela asociaciones significativas entre el estado de fumador y varios factores demográficos, incluyendo la edad, nivel educativo, nacionalidad, ingresos brutos y región. Sin embargo, no se encuentra ninguna asociación significativa entre el estado de fumador y el género o la etnia (blanca vs. otros). (Test realizados con Chi cuadrado en el EDA con </a:t>
             </a:r>
             <a:r>
-              <a:rPr lang="es-ES" sz="800" b="1" i="0" dirty="0" err="1">
+              <a:rPr lang="es-ES" sz="1200" b="1" i="0" dirty="0" err="1">
                 <a:solidFill>
                   <a:srgbClr val="000000"/>
                 </a:solidFill>
@@ -4009,7 +4953,7 @@
               <a:t>codigo</a:t>
             </a:r>
             <a:r>
-              <a:rPr lang="es-ES" sz="800" b="1" i="0" dirty="0">
+              <a:rPr lang="es-ES" sz="1200" b="1" i="0" dirty="0">
                 <a:solidFill>
                   <a:srgbClr val="000000"/>
                 </a:solidFill>
@@ -4017,13 +4961,13 @@
               </a:rPr>
               <a:t>.)</a:t>
             </a:r>
-            <a:endParaRPr lang="es-ES" sz="800" dirty="0">
+            <a:endParaRPr lang="es-ES" sz="1200" b="1" dirty="0">
               <a:effectLst/>
             </a:endParaRPr>
           </a:p>
           <a:p>
             <a:pPr algn="l" rtl="0"/>
-            <a:endParaRPr lang="es-ES" sz="800" b="1" i="0" dirty="0">
+            <a:endParaRPr lang="es-ES" sz="1200" i="0" dirty="0">
               <a:solidFill>
                 <a:srgbClr val="000000"/>
               </a:solidFill>
@@ -4033,21 +4977,30 @@
           <a:p>
             <a:pPr algn="l" rtl="0"/>
             <a:r>
-              <a:rPr lang="es-ES" sz="800" b="1" i="0" dirty="0">
+              <a:rPr lang="es-ES" sz="1200" b="1" i="0" dirty="0">
                 <a:solidFill>
                   <a:srgbClr val="000000"/>
                 </a:solidFill>
                 <a:effectLst/>
               </a:rPr>
-              <a:t>9. Los paquetes emergen como el tipo predominante de cigarrillos fumados entre los fumadores encuestados, constituyendo una mayoría sustancial con el 70.5% del total de la muestra.</a:t>
-            </a:r>
-            <a:endParaRPr lang="es-ES" sz="800" dirty="0">
+              <a:t>9</a:t>
+            </a:r>
+            <a:r>
+              <a:rPr lang="es-ES" sz="1200" i="0" dirty="0">
+                <a:solidFill>
+                  <a:srgbClr val="000000"/>
+                </a:solidFill>
+                <a:effectLst/>
+              </a:rPr>
+              <a:t>. Los paquetes emergen como el tipo predominante de cigarrillos fumados entre los fumadores encuestados, constituyendo una mayoría sustancial con el 70.5% del total de la muestra.</a:t>
+            </a:r>
+            <a:endParaRPr lang="es-ES" sz="1200" dirty="0">
               <a:effectLst/>
             </a:endParaRPr>
           </a:p>
           <a:p>
             <a:pPr algn="l" rtl="0"/>
-            <a:endParaRPr lang="es-ES" sz="800" b="1" i="0" dirty="0">
+            <a:endParaRPr lang="es-ES" sz="1200" i="0" dirty="0">
               <a:solidFill>
                 <a:srgbClr val="000000"/>
               </a:solidFill>
@@ -4057,21 +5010,30 @@
           <a:p>
             <a:pPr algn="l" rtl="0"/>
             <a:r>
-              <a:rPr lang="es-ES" sz="800" b="1" i="0" dirty="0">
+              <a:rPr lang="es-ES" sz="1200" b="1" i="0" dirty="0">
                 <a:solidFill>
                   <a:srgbClr val="000000"/>
                 </a:solidFill>
                 <a:effectLst/>
               </a:rPr>
-              <a:t>10. En promedio, los fumadores consumen 16.41 cigarrillos por día los fines de semana y 13.75 cigarrillos los días laborables.</a:t>
-            </a:r>
-            <a:endParaRPr lang="es-ES" sz="800" dirty="0">
+              <a:t>10</a:t>
+            </a:r>
+            <a:r>
+              <a:rPr lang="es-ES" sz="1200" i="0" dirty="0">
+                <a:solidFill>
+                  <a:srgbClr val="000000"/>
+                </a:solidFill>
+                <a:effectLst/>
+              </a:rPr>
+              <a:t>. En promedio, los fumadores consumen 16.41 cigarrillos por día los fines de semana y 13.75 cigarrillos los días laborables.</a:t>
+            </a:r>
+            <a:endParaRPr lang="es-ES" sz="1200" dirty="0">
               <a:effectLst/>
             </a:endParaRPr>
           </a:p>
           <a:p>
             <a:pPr algn="l" rtl="0"/>
-            <a:endParaRPr lang="es-ES" sz="800" b="1" i="0" dirty="0">
+            <a:endParaRPr lang="es-ES" sz="1200" i="0" dirty="0">
               <a:solidFill>
                 <a:srgbClr val="000000"/>
               </a:solidFill>
@@ -4081,20 +5043,65 @@
           <a:p>
             <a:pPr algn="l" rtl="0"/>
             <a:r>
-              <a:rPr lang="es-ES" sz="800" b="1" i="0" dirty="0">
+              <a:rPr lang="es-ES" sz="1200" b="1" i="0" dirty="0">
                 <a:solidFill>
                   <a:srgbClr val="000000"/>
                 </a:solidFill>
                 <a:effectLst/>
               </a:rPr>
-              <a:t>11. A partir de la prueba t, se revela una diferencia significativa en el número de cigarrillos fumados por día entre los fines de semana y los días laborables dentro de la población estudiada, subrayando una notable variación en el comportamiento de fumar a través de estas categorías temporales.</a:t>
-            </a:r>
-            <a:endParaRPr lang="es-ES" sz="800" dirty="0">
+              <a:t>11</a:t>
+            </a:r>
+            <a:r>
+              <a:rPr lang="es-ES" sz="1200" i="0" dirty="0">
+                <a:solidFill>
+                  <a:srgbClr val="000000"/>
+                </a:solidFill>
+                <a:effectLst/>
+              </a:rPr>
+              <a:t>. A partir de la prueba t, se revela una diferencia significativa en el número de cigarrillos fumados por día entre los fines de semana y los días laborables dentro de la población estudiada, subrayando una notable variación en el comportamiento de fumar a través de estas categorías temporales.</a:t>
+            </a:r>
+            <a:endParaRPr lang="es-ES" sz="1200" dirty="0">
               <a:effectLst/>
             </a:endParaRPr>
           </a:p>
         </p:txBody>
       </p:sp>
+      <p:pic>
+        <p:nvPicPr>
+          <p:cNvPr id="6" name="Imagen 5">
+            <a:extLst>
+              <a:ext uri="{FF2B5EF4-FFF2-40B4-BE49-F238E27FC236}">
+                <a16:creationId xmlns:a16="http://schemas.microsoft.com/office/drawing/2014/main" id="{B299FBC1-D6F5-7A24-76BF-40DDE4FAA317}"/>
+              </a:ext>
+            </a:extLst>
+          </p:cNvPr>
+          <p:cNvPicPr>
+            <a:picLocks noChangeAspect="1"/>
+          </p:cNvPicPr>
+          <p:nvPr/>
+        </p:nvPicPr>
+        <p:blipFill>
+          <a:blip r:embed="rId2">
+            <a:extLst>
+              <a:ext uri="{28A0092B-C50C-407E-A947-70E740481C1C}">
+                <a14:useLocalDpi xmlns:a14="http://schemas.microsoft.com/office/drawing/2010/main" val="0"/>
+              </a:ext>
+            </a:extLst>
+          </a:blip>
+          <a:stretch>
+            <a:fillRect/>
+          </a:stretch>
+        </p:blipFill>
+        <p:spPr>
+          <a:xfrm>
+            <a:off x="10501745" y="203201"/>
+            <a:ext cx="1080655" cy="999969"/>
+          </a:xfrm>
+          <a:prstGeom prst="rect">
+            <a:avLst/>
+          </a:prstGeom>
+        </p:spPr>
+      </p:pic>
     </p:spTree>
     <p:extLst>
       <p:ext uri="{BB962C8B-B14F-4D97-AF65-F5344CB8AC3E}">
@@ -4139,11 +5146,17 @@
               <p:cNvGraphicFramePr>
                 <a:graphicFrameLocks noGrp="1"/>
               </p:cNvGraphicFramePr>
-              <p:nvPr/>
+              <p:nvPr>
+                <p:extLst>
+                  <p:ext uri="{D42A27DB-BD31-4B8C-83A1-F6EECF244321}">
+                    <p14:modId xmlns:p14="http://schemas.microsoft.com/office/powerpoint/2010/main" val="4127344762"/>
+                  </p:ext>
+                </p:extLst>
+              </p:nvPr>
             </p:nvGraphicFramePr>
             <p:xfrm>
-              <a:off x="1524000" y="714374"/>
-              <a:ext cx="9144000" cy="5429250"/>
+              <a:off x="-64008" y="0"/>
+              <a:ext cx="12256008" cy="6858000"/>
             </p:xfrm>
             <a:graphic>
               <a:graphicData uri="http://schemas.microsoft.com/office/webextensions/webextension/2010/11">
@@ -4175,8 +5188,8 @@
             </p:blipFill>
             <p:spPr>
               <a:xfrm>
-                <a:off x="1524000" y="714374"/>
-                <a:ext cx="9144000" cy="5429250"/>
+                <a:off x="-64008" y="0"/>
+                <a:ext cx="12256008" cy="6858000"/>
               </a:xfrm>
               <a:prstGeom prst="rect">
                 <a:avLst/>
@@ -4185,6 +5198,42 @@
           </p:pic>
         </mc:Fallback>
       </mc:AlternateContent>
+      <p:pic>
+        <p:nvPicPr>
+          <p:cNvPr id="4" name="Imagen 3">
+            <a:extLst>
+              <a:ext uri="{FF2B5EF4-FFF2-40B4-BE49-F238E27FC236}">
+                <a16:creationId xmlns:a16="http://schemas.microsoft.com/office/drawing/2014/main" id="{A9377E10-BDCE-00FE-7E10-01FA58ADC00E}"/>
+              </a:ext>
+            </a:extLst>
+          </p:cNvPr>
+          <p:cNvPicPr>
+            <a:picLocks noChangeAspect="1"/>
+          </p:cNvPicPr>
+          <p:nvPr/>
+        </p:nvPicPr>
+        <p:blipFill>
+          <a:blip r:embed="rId4">
+            <a:extLst>
+              <a:ext uri="{28A0092B-C50C-407E-A947-70E740481C1C}">
+                <a14:useLocalDpi xmlns:a14="http://schemas.microsoft.com/office/drawing/2010/main" val="0"/>
+              </a:ext>
+            </a:extLst>
+          </a:blip>
+          <a:stretch>
+            <a:fillRect/>
+          </a:stretch>
+        </p:blipFill>
+        <p:spPr>
+          <a:xfrm>
+            <a:off x="1469736" y="1126836"/>
+            <a:ext cx="2686628" cy="1791085"/>
+          </a:xfrm>
+          <a:prstGeom prst="rect">
+            <a:avLst/>
+          </a:prstGeom>
+        </p:spPr>
+      </p:pic>
     </p:spTree>
     <p:extLst>
       <p:ext uri="{BB962C8B-B14F-4D97-AF65-F5344CB8AC3E}">
@@ -4229,11 +5278,17 @@
               <p:cNvGraphicFramePr>
                 <a:graphicFrameLocks noGrp="1"/>
               </p:cNvGraphicFramePr>
-              <p:nvPr/>
+              <p:nvPr>
+                <p:extLst>
+                  <p:ext uri="{D42A27DB-BD31-4B8C-83A1-F6EECF244321}">
+                    <p14:modId xmlns:p14="http://schemas.microsoft.com/office/powerpoint/2010/main" val="3570636856"/>
+                  </p:ext>
+                </p:extLst>
+              </p:nvPr>
             </p:nvGraphicFramePr>
             <p:xfrm>
-              <a:off x="1524000" y="714374"/>
-              <a:ext cx="9144000" cy="5429250"/>
+              <a:off x="0" y="-64008"/>
+              <a:ext cx="12192000" cy="6922008"/>
             </p:xfrm>
             <a:graphic>
               <a:graphicData uri="http://schemas.microsoft.com/office/webextensions/webextension/2010/11">
@@ -4265,8 +5320,8 @@
             </p:blipFill>
             <p:spPr>
               <a:xfrm>
-                <a:off x="1524000" y="714374"/>
-                <a:ext cx="9144000" cy="5429250"/>
+                <a:off x="0" y="-64008"/>
+                <a:ext cx="12192000" cy="6922008"/>
               </a:xfrm>
               <a:prstGeom prst="rect">
                 <a:avLst/>
@@ -4275,6 +5330,109 @@
           </p:pic>
         </mc:Fallback>
       </mc:AlternateContent>
+      <p:sp>
+        <p:nvSpPr>
+          <p:cNvPr id="5" name="CuadroTexto 4">
+            <a:extLst>
+              <a:ext uri="{FF2B5EF4-FFF2-40B4-BE49-F238E27FC236}">
+                <a16:creationId xmlns:a16="http://schemas.microsoft.com/office/drawing/2014/main" id="{9664BA13-C188-ECE2-D8E7-653782AB0017}"/>
+              </a:ext>
+            </a:extLst>
+          </p:cNvPr>
+          <p:cNvSpPr txBox="1"/>
+          <p:nvPr/>
+        </p:nvSpPr>
+        <p:spPr>
+          <a:xfrm>
+            <a:off x="157018" y="4396509"/>
+            <a:ext cx="4313382" cy="307777"/>
+          </a:xfrm>
+          <a:prstGeom prst="rect">
+            <a:avLst/>
+          </a:prstGeom>
+          <a:noFill/>
+        </p:spPr>
+        <p:txBody>
+          <a:bodyPr wrap="square" rtlCol="0">
+            <a:spAutoFit/>
+          </a:bodyPr>
+          <a:lstStyle/>
+          <a:p>
+            <a:r>
+              <a:rPr lang="es-ES" sz="1400" b="1" dirty="0">
+                <a:solidFill>
+                  <a:srgbClr val="0D0D0D"/>
+                </a:solidFill>
+                <a:highlight>
+                  <a:srgbClr val="FFFFFF"/>
+                </a:highlight>
+                <a:latin typeface="Calibri "/>
+              </a:rPr>
+              <a:t>The proportion of</a:t>
+            </a:r>
+            <a:r>
+              <a:rPr lang="es-ES" sz="1400" b="1" i="0" dirty="0">
+                <a:solidFill>
+                  <a:srgbClr val="0D0D0D"/>
+                </a:solidFill>
+                <a:effectLst/>
+                <a:highlight>
+                  <a:srgbClr val="FFFFFF"/>
+                </a:highlight>
+                <a:latin typeface="Calibri "/>
+              </a:rPr>
+              <a:t> females smokers = 234 / 965 ≈ 0.2423</a:t>
+            </a:r>
+            <a:endParaRPr lang="es-ES" sz="1400" b="1" dirty="0">
+              <a:latin typeface="Calibri "/>
+            </a:endParaRPr>
+          </a:p>
+        </p:txBody>
+      </p:sp>
+      <p:sp>
+        <p:nvSpPr>
+          <p:cNvPr id="6" name="CuadroTexto 5">
+            <a:extLst>
+              <a:ext uri="{FF2B5EF4-FFF2-40B4-BE49-F238E27FC236}">
+                <a16:creationId xmlns:a16="http://schemas.microsoft.com/office/drawing/2014/main" id="{5B791888-65B6-1E33-F515-156FD983512D}"/>
+              </a:ext>
+            </a:extLst>
+          </p:cNvPr>
+          <p:cNvSpPr txBox="1"/>
+          <p:nvPr/>
+        </p:nvSpPr>
+        <p:spPr>
+          <a:xfrm>
+            <a:off x="157018" y="5008434"/>
+            <a:ext cx="4230255" cy="307777"/>
+          </a:xfrm>
+          <a:prstGeom prst="rect">
+            <a:avLst/>
+          </a:prstGeom>
+          <a:noFill/>
+        </p:spPr>
+        <p:txBody>
+          <a:bodyPr wrap="square" rtlCol="0">
+            <a:spAutoFit/>
+          </a:bodyPr>
+          <a:lstStyle/>
+          <a:p>
+            <a:r>
+              <a:rPr lang="en-US" sz="1400" b="1" i="0" dirty="0">
+                <a:solidFill>
+                  <a:srgbClr val="0D0D0D"/>
+                </a:solidFill>
+                <a:effectLst/>
+                <a:highlight>
+                  <a:srgbClr val="FFFFFF"/>
+                </a:highlight>
+              </a:rPr>
+              <a:t>The proportion of male smokers = 187 / 726 ≈ 0.2575</a:t>
+            </a:r>
+            <a:endParaRPr lang="es-ES" sz="1400" b="1" dirty="0"/>
+          </a:p>
+        </p:txBody>
+      </p:sp>
     </p:spTree>
     <p:extLst>
       <p:ext uri="{BB962C8B-B14F-4D97-AF65-F5344CB8AC3E}">
@@ -4319,11 +5477,17 @@
               <p:cNvGraphicFramePr>
                 <a:graphicFrameLocks noGrp="1"/>
               </p:cNvGraphicFramePr>
-              <p:nvPr/>
+              <p:nvPr>
+                <p:extLst>
+                  <p:ext uri="{D42A27DB-BD31-4B8C-83A1-F6EECF244321}">
+                    <p14:modId xmlns:p14="http://schemas.microsoft.com/office/powerpoint/2010/main" val="1281472250"/>
+                  </p:ext>
+                </p:extLst>
+              </p:nvPr>
             </p:nvGraphicFramePr>
             <p:xfrm>
-              <a:off x="1524000" y="714374"/>
-              <a:ext cx="9144000" cy="5429250"/>
+              <a:off x="0" y="0"/>
+              <a:ext cx="12192000" cy="6858000"/>
             </p:xfrm>
             <a:graphic>
               <a:graphicData uri="http://schemas.microsoft.com/office/webextensions/webextension/2010/11">
@@ -4355,8 +5519,8 @@
             </p:blipFill>
             <p:spPr>
               <a:xfrm>
-                <a:off x="1524000" y="714374"/>
-                <a:ext cx="9144000" cy="5429250"/>
+                <a:off x="0" y="0"/>
+                <a:ext cx="12192000" cy="6858000"/>
               </a:xfrm>
               <a:prstGeom prst="rect">
                 <a:avLst/>
@@ -4409,11 +5573,17 @@
               <p:cNvGraphicFramePr>
                 <a:graphicFrameLocks noGrp="1"/>
               </p:cNvGraphicFramePr>
-              <p:nvPr/>
+              <p:nvPr>
+                <p:extLst>
+                  <p:ext uri="{D42A27DB-BD31-4B8C-83A1-F6EECF244321}">
+                    <p14:modId xmlns:p14="http://schemas.microsoft.com/office/powerpoint/2010/main" val="3281029138"/>
+                  </p:ext>
+                </p:extLst>
+              </p:nvPr>
             </p:nvGraphicFramePr>
             <p:xfrm>
-              <a:off x="1524000" y="714374"/>
-              <a:ext cx="9144000" cy="5429250"/>
+              <a:off x="0" y="-73152"/>
+              <a:ext cx="12192000" cy="6931152"/>
             </p:xfrm>
             <a:graphic>
               <a:graphicData uri="http://schemas.microsoft.com/office/webextensions/webextension/2010/11">
@@ -4445,8 +5615,8 @@
             </p:blipFill>
             <p:spPr>
               <a:xfrm>
-                <a:off x="1524000" y="714374"/>
-                <a:ext cx="9144000" cy="5429250"/>
+                <a:off x="0" y="-73152"/>
+                <a:ext cx="12192000" cy="6931152"/>
               </a:xfrm>
               <a:prstGeom prst="rect">
                 <a:avLst/>
@@ -4499,11 +5669,17 @@
               <p:cNvGraphicFramePr>
                 <a:graphicFrameLocks noGrp="1"/>
               </p:cNvGraphicFramePr>
-              <p:nvPr/>
+              <p:nvPr>
+                <p:extLst>
+                  <p:ext uri="{D42A27DB-BD31-4B8C-83A1-F6EECF244321}">
+                    <p14:modId xmlns:p14="http://schemas.microsoft.com/office/powerpoint/2010/main" val="163642326"/>
+                  </p:ext>
+                </p:extLst>
+              </p:nvPr>
             </p:nvGraphicFramePr>
             <p:xfrm>
-              <a:off x="1524000" y="714374"/>
-              <a:ext cx="9144000" cy="5429250"/>
+              <a:off x="0" y="0"/>
+              <a:ext cx="12192000" cy="6949440"/>
             </p:xfrm>
             <a:graphic>
               <a:graphicData uri="http://schemas.microsoft.com/office/webextensions/webextension/2010/11">
@@ -4535,8 +5711,74 @@
             </p:blipFill>
             <p:spPr>
               <a:xfrm>
-                <a:off x="1524000" y="714374"/>
-                <a:ext cx="9144000" cy="5429250"/>
+                <a:off x="0" y="0"/>
+                <a:ext cx="12192000" cy="6949440"/>
+              </a:xfrm>
+              <a:prstGeom prst="rect">
+                <a:avLst/>
+              </a:prstGeom>
+            </p:spPr>
+          </p:pic>
+        </mc:Fallback>
+      </mc:AlternateContent>
+      <mc:AlternateContent xmlns:mc="http://schemas.openxmlformats.org/markup-compatibility/2006">
+        <mc:Choice xmlns:we="http://schemas.microsoft.com/office/webextensions/webextension/2010/11" xmlns:pca="http://schemas.microsoft.com/office/powerpoint/2013/contentapp" Requires="we pca">
+          <p:graphicFrame>
+            <p:nvGraphicFramePr>
+              <p:cNvPr id="3" name="Complemento 2">
+                <a:extLst>
+                  <a:ext uri="{FF2B5EF4-FFF2-40B4-BE49-F238E27FC236}">
+                    <a16:creationId xmlns:a16="http://schemas.microsoft.com/office/drawing/2014/main" id="{25B21471-A3E7-FD6F-4B68-05A96CB0EB4B}"/>
+                  </a:ext>
+                </a:extLst>
+              </p:cNvPr>
+              <p:cNvGraphicFramePr>
+                <a:graphicFrameLocks noGrp="1"/>
+              </p:cNvGraphicFramePr>
+              <p:nvPr>
+                <p:extLst>
+                  <p:ext uri="{D42A27DB-BD31-4B8C-83A1-F6EECF244321}">
+                    <p14:modId xmlns:p14="http://schemas.microsoft.com/office/powerpoint/2010/main" val="1138899736"/>
+                  </p:ext>
+                </p:extLst>
+              </p:nvPr>
+            </p:nvGraphicFramePr>
+            <p:xfrm>
+              <a:off x="0" y="0"/>
+              <a:ext cx="12192000" cy="6903720"/>
+            </p:xfrm>
+            <a:graphic>
+              <a:graphicData uri="http://schemas.microsoft.com/office/webextensions/webextension/2010/11">
+                <we:webextensionref xmlns:we="http://schemas.microsoft.com/office/webextensions/webextension/2010/11" xmlns:r="http://schemas.openxmlformats.org/officeDocument/2006/relationships" r:id="rId4"/>
+              </a:graphicData>
+            </a:graphic>
+          </p:graphicFrame>
+        </mc:Choice>
+        <mc:Fallback>
+          <p:pic>
+            <p:nvPicPr>
+              <p:cNvPr id="3" name="Complemento 2">
+                <a:extLst>
+                  <a:ext uri="{FF2B5EF4-FFF2-40B4-BE49-F238E27FC236}">
+                    <a16:creationId xmlns:a16="http://schemas.microsoft.com/office/drawing/2014/main" id="{25B21471-A3E7-FD6F-4B68-05A96CB0EB4B}"/>
+                  </a:ext>
+                </a:extLst>
+              </p:cNvPr>
+              <p:cNvPicPr>
+                <a:picLocks noGrp="1" noRot="1" noChangeAspect="1" noMove="1" noResize="1" noEditPoints="1" noAdjustHandles="1" noChangeArrowheads="1" noChangeShapeType="1"/>
+              </p:cNvPicPr>
+              <p:nvPr/>
+            </p:nvPicPr>
+            <p:blipFill>
+              <a:blip r:embed="rId3"/>
+              <a:stretch>
+                <a:fillRect/>
+              </a:stretch>
+            </p:blipFill>
+            <p:spPr>
+              <a:xfrm>
+                <a:off x="0" y="0"/>
+                <a:ext cx="12192000" cy="6903720"/>
               </a:xfrm>
               <a:prstGeom prst="rect">
                 <a:avLst/>
@@ -4589,15 +5831,21 @@
               <p:cNvGraphicFramePr>
                 <a:graphicFrameLocks noGrp="1"/>
               </p:cNvGraphicFramePr>
-              <p:nvPr/>
+              <p:nvPr>
+                <p:extLst>
+                  <p:ext uri="{D42A27DB-BD31-4B8C-83A1-F6EECF244321}">
+                    <p14:modId xmlns:p14="http://schemas.microsoft.com/office/powerpoint/2010/main" val="1100172599"/>
+                  </p:ext>
+                </p:extLst>
+              </p:nvPr>
             </p:nvGraphicFramePr>
             <p:xfrm>
-              <a:off x="1524000" y="714374"/>
-              <a:ext cx="9144000" cy="5429250"/>
+              <a:off x="0" y="0"/>
+              <a:ext cx="12192000" cy="6858000"/>
             </p:xfrm>
             <a:graphic>
               <a:graphicData uri="http://schemas.microsoft.com/office/webextensions/webextension/2010/11">
-                <we:webextensionref xmlns:we="http://schemas.microsoft.com/office/webextensions/webextension/2010/11" xmlns:r="http://schemas.openxmlformats.org/officeDocument/2006/relationships" r:id="rId2"/>
+                <we:webextensionref xmlns:we="http://schemas.microsoft.com/office/webextensions/webextension/2010/11" xmlns:r="http://schemas.openxmlformats.org/officeDocument/2006/relationships" r:id="rId3"/>
               </a:graphicData>
             </a:graphic>
           </p:graphicFrame>
@@ -4618,15 +5866,15 @@
               <p:nvPr/>
             </p:nvPicPr>
             <p:blipFill>
-              <a:blip r:embed="rId3"/>
+              <a:blip r:embed="rId4"/>
               <a:stretch>
                 <a:fillRect/>
               </a:stretch>
             </p:blipFill>
             <p:spPr>
               <a:xfrm>
-                <a:off x="1524000" y="714374"/>
-                <a:ext cx="9144000" cy="5429250"/>
+                <a:off x="0" y="0"/>
+                <a:ext cx="12192000" cy="6858000"/>
               </a:xfrm>
               <a:prstGeom prst="rect">
                 <a:avLst/>
@@ -4679,11 +5927,17 @@
               <p:cNvGraphicFramePr>
                 <a:graphicFrameLocks noGrp="1"/>
               </p:cNvGraphicFramePr>
-              <p:nvPr/>
+              <p:nvPr>
+                <p:extLst>
+                  <p:ext uri="{D42A27DB-BD31-4B8C-83A1-F6EECF244321}">
+                    <p14:modId xmlns:p14="http://schemas.microsoft.com/office/powerpoint/2010/main" val="3204551130"/>
+                  </p:ext>
+                </p:extLst>
+              </p:nvPr>
             </p:nvGraphicFramePr>
             <p:xfrm>
-              <a:off x="1524000" y="714374"/>
-              <a:ext cx="9144000" cy="5429250"/>
+              <a:off x="0" y="0"/>
+              <a:ext cx="12192000" cy="6858000"/>
             </p:xfrm>
             <a:graphic>
               <a:graphicData uri="http://schemas.microsoft.com/office/webextensions/webextension/2010/11">
@@ -4715,8 +5969,8 @@
             </p:blipFill>
             <p:spPr>
               <a:xfrm>
-                <a:off x="1524000" y="714374"/>
-                <a:ext cx="9144000" cy="5429250"/>
+                <a:off x="0" y="0"/>
+                <a:ext cx="12192000" cy="6858000"/>
               </a:xfrm>
               <a:prstGeom prst="rect">
                 <a:avLst/>
@@ -4725,6 +5979,42 @@
           </p:pic>
         </mc:Fallback>
       </mc:AlternateContent>
+      <p:pic>
+        <p:nvPicPr>
+          <p:cNvPr id="4" name="Imagen 3">
+            <a:extLst>
+              <a:ext uri="{FF2B5EF4-FFF2-40B4-BE49-F238E27FC236}">
+                <a16:creationId xmlns:a16="http://schemas.microsoft.com/office/drawing/2014/main" id="{4187FA43-CD3A-3735-5115-CB80676E03B7}"/>
+              </a:ext>
+            </a:extLst>
+          </p:cNvPr>
+          <p:cNvPicPr>
+            <a:picLocks noChangeAspect="1"/>
+          </p:cNvPicPr>
+          <p:nvPr/>
+        </p:nvPicPr>
+        <p:blipFill>
+          <a:blip r:embed="rId4">
+            <a:extLst>
+              <a:ext uri="{28A0092B-C50C-407E-A947-70E740481C1C}">
+                <a14:useLocalDpi xmlns:a14="http://schemas.microsoft.com/office/drawing/2010/main" val="0"/>
+              </a:ext>
+            </a:extLst>
+          </a:blip>
+          <a:stretch>
+            <a:fillRect/>
+          </a:stretch>
+        </p:blipFill>
+        <p:spPr>
+          <a:xfrm>
+            <a:off x="1126837" y="933221"/>
+            <a:ext cx="2096654" cy="2822429"/>
+          </a:xfrm>
+          <a:prstGeom prst="rect">
+            <a:avLst/>
+          </a:prstGeom>
+        </p:spPr>
+      </p:pic>
     </p:spTree>
     <p:extLst>
       <p:ext uri="{BB962C8B-B14F-4D97-AF65-F5344CB8AC3E}">
@@ -4815,6 +6105,108 @@
           </p:pic>
         </mc:Fallback>
       </mc:AlternateContent>
+      <mc:AlternateContent xmlns:mc="http://schemas.openxmlformats.org/markup-compatibility/2006">
+        <mc:Choice xmlns:we="http://schemas.microsoft.com/office/webextensions/webextension/2010/11" xmlns:pca="http://schemas.microsoft.com/office/powerpoint/2013/contentapp" Requires="we pca">
+          <p:graphicFrame>
+            <p:nvGraphicFramePr>
+              <p:cNvPr id="3" name="Complemento 2">
+                <a:extLst>
+                  <a:ext uri="{FF2B5EF4-FFF2-40B4-BE49-F238E27FC236}">
+                    <a16:creationId xmlns:a16="http://schemas.microsoft.com/office/drawing/2014/main" id="{60426CDF-A547-8E09-88B8-5ACDBA27C4EB}"/>
+                  </a:ext>
+                </a:extLst>
+              </p:cNvPr>
+              <p:cNvGraphicFramePr>
+                <a:graphicFrameLocks noGrp="1"/>
+              </p:cNvGraphicFramePr>
+              <p:nvPr>
+                <p:extLst>
+                  <p:ext uri="{D42A27DB-BD31-4B8C-83A1-F6EECF244321}">
+                    <p14:modId xmlns:p14="http://schemas.microsoft.com/office/powerpoint/2010/main" val="426054238"/>
+                  </p:ext>
+                </p:extLst>
+              </p:nvPr>
+            </p:nvGraphicFramePr>
+            <p:xfrm>
+              <a:off x="0" y="0"/>
+              <a:ext cx="12192000" cy="6858000"/>
+            </p:xfrm>
+            <a:graphic>
+              <a:graphicData uri="http://schemas.microsoft.com/office/webextensions/webextension/2010/11">
+                <we:webextensionref xmlns:we="http://schemas.microsoft.com/office/webextensions/webextension/2010/11" xmlns:r="http://schemas.openxmlformats.org/officeDocument/2006/relationships" r:id="rId4"/>
+              </a:graphicData>
+            </a:graphic>
+          </p:graphicFrame>
+        </mc:Choice>
+        <mc:Fallback>
+          <p:pic>
+            <p:nvPicPr>
+              <p:cNvPr id="3" name="Complemento 2">
+                <a:extLst>
+                  <a:ext uri="{FF2B5EF4-FFF2-40B4-BE49-F238E27FC236}">
+                    <a16:creationId xmlns:a16="http://schemas.microsoft.com/office/drawing/2014/main" id="{60426CDF-A547-8E09-88B8-5ACDBA27C4EB}"/>
+                  </a:ext>
+                </a:extLst>
+              </p:cNvPr>
+              <p:cNvPicPr>
+                <a:picLocks noGrp="1" noRot="1" noChangeAspect="1" noMove="1" noResize="1" noEditPoints="1" noAdjustHandles="1" noChangeArrowheads="1" noChangeShapeType="1"/>
+              </p:cNvPicPr>
+              <p:nvPr/>
+            </p:nvPicPr>
+            <p:blipFill>
+              <a:blip r:embed="rId3"/>
+              <a:stretch>
+                <a:fillRect/>
+              </a:stretch>
+            </p:blipFill>
+            <p:spPr>
+              <a:xfrm>
+                <a:off x="0" y="0"/>
+                <a:ext cx="12192000" cy="6858000"/>
+              </a:xfrm>
+              <a:prstGeom prst="rect">
+                <a:avLst/>
+              </a:prstGeom>
+            </p:spPr>
+          </p:pic>
+        </mc:Fallback>
+      </mc:AlternateContent>
+      <p:pic>
+        <p:nvPicPr>
+          <p:cNvPr id="5" name="Imagen 4">
+            <a:extLst>
+              <a:ext uri="{FF2B5EF4-FFF2-40B4-BE49-F238E27FC236}">
+                <a16:creationId xmlns:a16="http://schemas.microsoft.com/office/drawing/2014/main" id="{B5E0BB8F-A5FF-4534-9485-308A90708216}"/>
+              </a:ext>
+            </a:extLst>
+          </p:cNvPr>
+          <p:cNvPicPr>
+            <a:picLocks noChangeAspect="1"/>
+          </p:cNvPicPr>
+          <p:nvPr/>
+        </p:nvPicPr>
+        <p:blipFill>
+          <a:blip r:embed="rId5">
+            <a:extLst>
+              <a:ext uri="{28A0092B-C50C-407E-A947-70E740481C1C}">
+                <a14:useLocalDpi xmlns:a14="http://schemas.microsoft.com/office/drawing/2010/main" val="0"/>
+              </a:ext>
+            </a:extLst>
+          </a:blip>
+          <a:stretch>
+            <a:fillRect/>
+          </a:stretch>
+        </p:blipFill>
+        <p:spPr>
+          <a:xfrm>
+            <a:off x="4438212" y="1259735"/>
+            <a:ext cx="7183812" cy="5142774"/>
+          </a:xfrm>
+          <a:prstGeom prst="rect">
+            <a:avLst/>
+          </a:prstGeom>
+        </p:spPr>
+      </p:pic>
     </p:spTree>
     <p:extLst>
       <p:ext uri="{BB962C8B-B14F-4D97-AF65-F5344CB8AC3E}">
@@ -5123,6 +6515,301 @@
 </a:theme>
 </file>
 
+<file path=ppt/theme/theme2.xml><?xml version="1.0" encoding="utf-8"?>
+<a:theme xmlns:a="http://schemas.openxmlformats.org/drawingml/2006/main" name="Tema de Office">
+  <a:themeElements>
+    <a:clrScheme name="Office">
+      <a:dk1>
+        <a:sysClr val="windowText" lastClr="000000"/>
+      </a:dk1>
+      <a:lt1>
+        <a:sysClr val="window" lastClr="FFFFFF"/>
+      </a:lt1>
+      <a:dk2>
+        <a:srgbClr val="44546A"/>
+      </a:dk2>
+      <a:lt2>
+        <a:srgbClr val="E7E6E6"/>
+      </a:lt2>
+      <a:accent1>
+        <a:srgbClr val="4472C4"/>
+      </a:accent1>
+      <a:accent2>
+        <a:srgbClr val="ED7D31"/>
+      </a:accent2>
+      <a:accent3>
+        <a:srgbClr val="A5A5A5"/>
+      </a:accent3>
+      <a:accent4>
+        <a:srgbClr val="FFC000"/>
+      </a:accent4>
+      <a:accent5>
+        <a:srgbClr val="5B9BD5"/>
+      </a:accent5>
+      <a:accent6>
+        <a:srgbClr val="70AD47"/>
+      </a:accent6>
+      <a:hlink>
+        <a:srgbClr val="0563C1"/>
+      </a:hlink>
+      <a:folHlink>
+        <a:srgbClr val="954F72"/>
+      </a:folHlink>
+    </a:clrScheme>
+    <a:fontScheme name="Office">
+      <a:majorFont>
+        <a:latin typeface="Calibri Light" panose="020F0302020204030204"/>
+        <a:ea typeface=""/>
+        <a:cs typeface=""/>
+        <a:font script="Jpan" typeface="游ゴシック Light"/>
+        <a:font script="Hang" typeface="맑은 고딕"/>
+        <a:font script="Hans" typeface="等线 Light"/>
+        <a:font script="Hant" typeface="新細明體"/>
+        <a:font script="Arab" typeface="Times New Roman"/>
+        <a:font script="Hebr" typeface="Times New Roman"/>
+        <a:font script="Thai" typeface="Angsana New"/>
+        <a:font script="Ethi" typeface="Nyala"/>
+        <a:font script="Beng" typeface="Vrinda"/>
+        <a:font script="Gujr" typeface="Shruti"/>
+        <a:font script="Khmr" typeface="MoolBoran"/>
+        <a:font script="Knda" typeface="Tunga"/>
+        <a:font script="Guru" typeface="Raavi"/>
+        <a:font script="Cans" typeface="Euphemia"/>
+        <a:font script="Cher" typeface="Plantagenet Cherokee"/>
+        <a:font script="Yiii" typeface="Microsoft Yi Baiti"/>
+        <a:font script="Tibt" typeface="Microsoft Himalaya"/>
+        <a:font script="Thaa" typeface="MV Boli"/>
+        <a:font script="Deva" typeface="Mangal"/>
+        <a:font script="Telu" typeface="Gautami"/>
+        <a:font script="Taml" typeface="Latha"/>
+        <a:font script="Syrc" typeface="Estrangelo Edessa"/>
+        <a:font script="Orya" typeface="Kalinga"/>
+        <a:font script="Mlym" typeface="Kartika"/>
+        <a:font script="Laoo" typeface="DokChampa"/>
+        <a:font script="Sinh" typeface="Iskoola Pota"/>
+        <a:font script="Mong" typeface="Mongolian Baiti"/>
+        <a:font script="Viet" typeface="Times New Roman"/>
+        <a:font script="Uigh" typeface="Microsoft Uighur"/>
+        <a:font script="Geor" typeface="Sylfaen"/>
+        <a:font script="Armn" typeface="Arial"/>
+        <a:font script="Bugi" typeface="Leelawadee UI"/>
+        <a:font script="Bopo" typeface="Microsoft JhengHei"/>
+        <a:font script="Java" typeface="Javanese Text"/>
+        <a:font script="Lisu" typeface="Segoe UI"/>
+        <a:font script="Mymr" typeface="Myanmar Text"/>
+        <a:font script="Nkoo" typeface="Ebrima"/>
+        <a:font script="Olck" typeface="Nirmala UI"/>
+        <a:font script="Osma" typeface="Ebrima"/>
+        <a:font script="Phag" typeface="Phagspa"/>
+        <a:font script="Syrn" typeface="Estrangelo Edessa"/>
+        <a:font script="Syrj" typeface="Estrangelo Edessa"/>
+        <a:font script="Syre" typeface="Estrangelo Edessa"/>
+        <a:font script="Sora" typeface="Nirmala UI"/>
+        <a:font script="Tale" typeface="Microsoft Tai Le"/>
+        <a:font script="Talu" typeface="Microsoft New Tai Lue"/>
+        <a:font script="Tfng" typeface="Ebrima"/>
+      </a:majorFont>
+      <a:minorFont>
+        <a:latin typeface="Calibri" panose="020F0502020204030204"/>
+        <a:ea typeface=""/>
+        <a:cs typeface=""/>
+        <a:font script="Jpan" typeface="游ゴシック"/>
+        <a:font script="Hang" typeface="맑은 고딕"/>
+        <a:font script="Hans" typeface="等线"/>
+        <a:font script="Hant" typeface="新細明體"/>
+        <a:font script="Arab" typeface="Arial"/>
+        <a:font script="Hebr" typeface="Arial"/>
+        <a:font script="Thai" typeface="Cordia New"/>
+        <a:font script="Ethi" typeface="Nyala"/>
+        <a:font script="Beng" typeface="Vrinda"/>
+        <a:font script="Gujr" typeface="Shruti"/>
+        <a:font script="Khmr" typeface="DaunPenh"/>
+        <a:font script="Knda" typeface="Tunga"/>
+        <a:font script="Guru" typeface="Raavi"/>
+        <a:font script="Cans" typeface="Euphemia"/>
+        <a:font script="Cher" typeface="Plantagenet Cherokee"/>
+        <a:font script="Yiii" typeface="Microsoft Yi Baiti"/>
+        <a:font script="Tibt" typeface="Microsoft Himalaya"/>
+        <a:font script="Thaa" typeface="MV Boli"/>
+        <a:font script="Deva" typeface="Mangal"/>
+        <a:font script="Telu" typeface="Gautami"/>
+        <a:font script="Taml" typeface="Latha"/>
+        <a:font script="Syrc" typeface="Estrangelo Edessa"/>
+        <a:font script="Orya" typeface="Kalinga"/>
+        <a:font script="Mlym" typeface="Kartika"/>
+        <a:font script="Laoo" typeface="DokChampa"/>
+        <a:font script="Sinh" typeface="Iskoola Pota"/>
+        <a:font script="Mong" typeface="Mongolian Baiti"/>
+        <a:font script="Viet" typeface="Arial"/>
+        <a:font script="Uigh" typeface="Microsoft Uighur"/>
+        <a:font script="Geor" typeface="Sylfaen"/>
+        <a:font script="Armn" typeface="Arial"/>
+        <a:font script="Bugi" typeface="Leelawadee UI"/>
+        <a:font script="Bopo" typeface="Microsoft JhengHei"/>
+        <a:font script="Java" typeface="Javanese Text"/>
+        <a:font script="Lisu" typeface="Segoe UI"/>
+        <a:font script="Mymr" typeface="Myanmar Text"/>
+        <a:font script="Nkoo" typeface="Ebrima"/>
+        <a:font script="Olck" typeface="Nirmala UI"/>
+        <a:font script="Osma" typeface="Ebrima"/>
+        <a:font script="Phag" typeface="Phagspa"/>
+        <a:font script="Syrn" typeface="Estrangelo Edessa"/>
+        <a:font script="Syrj" typeface="Estrangelo Edessa"/>
+        <a:font script="Syre" typeface="Estrangelo Edessa"/>
+        <a:font script="Sora" typeface="Nirmala UI"/>
+        <a:font script="Tale" typeface="Microsoft Tai Le"/>
+        <a:font script="Talu" typeface="Microsoft New Tai Lue"/>
+        <a:font script="Tfng" typeface="Ebrima"/>
+      </a:minorFont>
+    </a:fontScheme>
+    <a:fmtScheme name="Office">
+      <a:fillStyleLst>
+        <a:solidFill>
+          <a:schemeClr val="phClr"/>
+        </a:solidFill>
+        <a:gradFill rotWithShape="1">
+          <a:gsLst>
+            <a:gs pos="0">
+              <a:schemeClr val="phClr">
+                <a:lumMod val="110000"/>
+                <a:satMod val="105000"/>
+                <a:tint val="67000"/>
+              </a:schemeClr>
+            </a:gs>
+            <a:gs pos="50000">
+              <a:schemeClr val="phClr">
+                <a:lumMod val="105000"/>
+                <a:satMod val="103000"/>
+                <a:tint val="73000"/>
+              </a:schemeClr>
+            </a:gs>
+            <a:gs pos="100000">
+              <a:schemeClr val="phClr">
+                <a:lumMod val="105000"/>
+                <a:satMod val="109000"/>
+                <a:tint val="81000"/>
+              </a:schemeClr>
+            </a:gs>
+          </a:gsLst>
+          <a:lin ang="5400000" scaled="0"/>
+        </a:gradFill>
+        <a:gradFill rotWithShape="1">
+          <a:gsLst>
+            <a:gs pos="0">
+              <a:schemeClr val="phClr">
+                <a:satMod val="103000"/>
+                <a:lumMod val="102000"/>
+                <a:tint val="94000"/>
+              </a:schemeClr>
+            </a:gs>
+            <a:gs pos="50000">
+              <a:schemeClr val="phClr">
+                <a:satMod val="110000"/>
+                <a:lumMod val="100000"/>
+                <a:shade val="100000"/>
+              </a:schemeClr>
+            </a:gs>
+            <a:gs pos="100000">
+              <a:schemeClr val="phClr">
+                <a:lumMod val="99000"/>
+                <a:satMod val="120000"/>
+                <a:shade val="78000"/>
+              </a:schemeClr>
+            </a:gs>
+          </a:gsLst>
+          <a:lin ang="5400000" scaled="0"/>
+        </a:gradFill>
+      </a:fillStyleLst>
+      <a:lnStyleLst>
+        <a:ln w="6350" cap="flat" cmpd="sng" algn="ctr">
+          <a:solidFill>
+            <a:schemeClr val="phClr"/>
+          </a:solidFill>
+          <a:prstDash val="solid"/>
+          <a:miter lim="800000"/>
+        </a:ln>
+        <a:ln w="12700" cap="flat" cmpd="sng" algn="ctr">
+          <a:solidFill>
+            <a:schemeClr val="phClr"/>
+          </a:solidFill>
+          <a:prstDash val="solid"/>
+          <a:miter lim="800000"/>
+        </a:ln>
+        <a:ln w="19050" cap="flat" cmpd="sng" algn="ctr">
+          <a:solidFill>
+            <a:schemeClr val="phClr"/>
+          </a:solidFill>
+          <a:prstDash val="solid"/>
+          <a:miter lim="800000"/>
+        </a:ln>
+      </a:lnStyleLst>
+      <a:effectStyleLst>
+        <a:effectStyle>
+          <a:effectLst/>
+        </a:effectStyle>
+        <a:effectStyle>
+          <a:effectLst/>
+        </a:effectStyle>
+        <a:effectStyle>
+          <a:effectLst>
+            <a:outerShdw blurRad="57150" dist="19050" dir="5400000" algn="ctr" rotWithShape="0">
+              <a:srgbClr val="000000">
+                <a:alpha val="63000"/>
+              </a:srgbClr>
+            </a:outerShdw>
+          </a:effectLst>
+        </a:effectStyle>
+      </a:effectStyleLst>
+      <a:bgFillStyleLst>
+        <a:solidFill>
+          <a:schemeClr val="phClr"/>
+        </a:solidFill>
+        <a:solidFill>
+          <a:schemeClr val="phClr">
+            <a:tint val="95000"/>
+            <a:satMod val="170000"/>
+          </a:schemeClr>
+        </a:solidFill>
+        <a:gradFill rotWithShape="1">
+          <a:gsLst>
+            <a:gs pos="0">
+              <a:schemeClr val="phClr">
+                <a:tint val="93000"/>
+                <a:satMod val="150000"/>
+                <a:shade val="98000"/>
+                <a:lumMod val="102000"/>
+              </a:schemeClr>
+            </a:gs>
+            <a:gs pos="50000">
+              <a:schemeClr val="phClr">
+                <a:tint val="98000"/>
+                <a:satMod val="130000"/>
+                <a:shade val="90000"/>
+                <a:lumMod val="103000"/>
+              </a:schemeClr>
+            </a:gs>
+            <a:gs pos="100000">
+              <a:schemeClr val="phClr">
+                <a:shade val="63000"/>
+                <a:satMod val="120000"/>
+              </a:schemeClr>
+            </a:gs>
+          </a:gsLst>
+          <a:lin ang="5400000" scaled="0"/>
+        </a:gradFill>
+      </a:bgFillStyleLst>
+    </a:fmtScheme>
+  </a:themeElements>
+  <a:objectDefaults/>
+  <a:extraClrSchemeLst/>
+  <a:extLst>
+    <a:ext uri="{05A4C25C-085E-4340-85A3-A5531E510DB2}">
+      <thm15:themeFamily xmlns:thm15="http://schemas.microsoft.com/office/thememl/2012/main" name="Office Theme" id="{62F939B6-93AF-4DB8-9C6B-D6C7DFDC589F}" vid="{4A3C46E8-61CC-4603-A589-7422A47A8E4A}"/>
+    </a:ext>
+  </a:extLst>
+</a:theme>
+</file>
+
 <file path=ppt/webextensions/webextension1.xml><?xml version="1.0" encoding="utf-8"?>
 <we:webextension xmlns:we="http://schemas.microsoft.com/office/webextensions/webextension/2010/11" id="{74182E71-FFD4-4802-85CA-8585CB1B4883}">
   <we:reference id="wa200003233" version="2.0.0.3" store="es-ES" storeType="OMEX"/>
@@ -5130,23 +6817,23 @@
     <we:reference id="WA200003233" version="2.0.0.3" store="" storeType="OMEX"/>
   </we:alternateReferences>
   <we:properties>
-    <we:property name="reportUrl" value="&quot;/groups/me/reports/e1dd3c9f-eb8b-4fd5-9415-94528c45eafa/ReportSection4d4befd05b00615a9970?bookmarkGuid=0dc637a3-1668-4f10-8610-3b741723b394&amp;bookmarkUsage=1&amp;ctid=01ff18d5-6ae3-4fe1-831f-78c5ba7f715d&amp;fromEntryPoint=export&quot;"/>
-    <we:property name="reportName" value="&quot;EDA_PROYECTO&quot;"/>
-    <we:property name="reportState" value="&quot;CONNECTED&quot;"/>
-    <we:property name="embedUrl" value="&quot;/reportEmbed?reportId=e1dd3c9f-eb8b-4fd5-9415-94528c45eafa&amp;config=eyJjbHVzdGVyVXJsIjoiaHR0cHM6Ly9XQUJJLVdFU1QtRVVST1BFLUYtUFJJTUFSWS1yZWRpcmVjdC5hbmFseXNpcy53aW5kb3dzLm5ldCIsImVtYmVkRmVhdHVyZXMiOnsidXNhZ2VNZXRyaWNzVk5leHQiOnRydWV9fQ%3D%3D&amp;disableSensitivityBanner=true&quot;"/>
-    <we:property name="pageName" value="&quot;ReportSection4d4befd05b00615a9970&quot;"/>
-    <we:property name="pageDisplayName" value="&quot;PORTADA&quot;"/>
-    <we:property name="datasetId" value="&quot;8d266ffc-6eb7-4324-bb53-5eca314f4ee4&quot;"/>
+    <we:property name="artifactViewState" value="&quot;live&quot;"/>
     <we:property name="backgroundColor" value="&quot;#FFFFFF&quot;"/>
     <we:property name="bookmark" value="&quot;H4sIAAAAAAAAA4VQwW7CMAz9lcnnamo12AQ3hnZiBQQSF4QmtzEoU0iixEXbqv77nJQ7l8Tv+dnPdg9KR2/wd41XgjnUGFpULjxVUIAduffNZlUvdquv9aL+ENp51s5GmPfAGC7EBx07NKmDkMdTAWjMFi8JndFEKsBTiM6i0X80iiXFoaOhAPrxxgVMLfeMTKntTeSCxbt6fhFHbFnfaE8tj+yOvAt8xxM1aeisymlTlq/VFGezt1Jq4pjNYz7WJ9M82NJZRm1lAOGGQQZ0zbcU5j5XknVT4DqOHlvaohV87MEHJzuypqyTndAqUvc4pP9TMwU0KTyg6dJh83Egm4i5bgw9KEgnS/phOKXnH8xkV5a9AQAA&quot;"/>
+    <we:property name="creatorSessionId" value="&quot;ccc3ce60-28f7-4bf9-a48f-519ecb7b7855&quot;"/>
+    <we:property name="creatorTenantId" value="&quot;01ff18d5-6ae3-4fe1-831f-78c5ba7f715d&quot;"/>
+    <we:property name="creatorUserId" value="&quot;1003200373EAE09B&quot;"/>
+    <we:property name="datasetId" value="&quot;8d266ffc-6eb7-4324-bb53-5eca314f4ee4&quot;"/>
+    <we:property name="embedUrl" value="&quot;/reportEmbed?reportId=e1dd3c9f-eb8b-4fd5-9415-94528c45eafa&amp;config=eyJjbHVzdGVyVXJsIjoiaHR0cHM6Ly9XQUJJLVdFU1QtRVVST1BFLUYtUFJJTUFSWS1yZWRpcmVjdC5hbmFseXNpcy53aW5kb3dzLm5ldCIsImVtYmVkRmVhdHVyZXMiOnsidXNhZ2VNZXRyaWNzVk5leHQiOnRydWV9fQ%3D%3D&amp;disableSensitivityBanner=true&quot;"/>
     <we:property name="initialStateBookmark" value="&quot;H4sIAAAAAAAAA4VQwW7CMAz9lcnnamo12AQ3hnZiBQQSF4QmtzEoU0iixEXbqv77nJQ7l8Tv+dnPdg9KR2/wd41XgjnUGFpULjxVUIAduffNZlUvdquv9aL+ENp51s5GmPfAGC7EBx07NKmDkMdTAWjMFi8JndFEKsBTiM6i0X80iiXFoaOhAPrxxgVMLfeMTKntTeSCxbt6fhFHbFnfaE8tj+yOvAt8xxM1aeisymlTlq/VFGezt1Jq4pjNYz7WJ9M82NJZRm1lAOGGQQZ0zbcU5j5XknVT4DqOHlvaohV87MEHJzuypqyTndAqUvc4pP9TMwU0KTyg6dJh83Egm4i5bgw9KEgnS/phOKXnH8xkV5a9AQAA&quot;"/>
     <we:property name="isFiltersActionButtonVisible" value="true"/>
     <we:property name="isVisualContainerHeaderHidden" value="false"/>
+    <we:property name="pageDisplayName" value="&quot;PORTADA&quot;"/>
+    <we:property name="pageName" value="&quot;ReportSection4d4befd05b00615a9970&quot;"/>
     <we:property name="reportEmbeddedTime" value="&quot;2024-04-18T18:59:21.349Z&quot;"/>
-    <we:property name="creatorTenantId" value="&quot;01ff18d5-6ae3-4fe1-831f-78c5ba7f715d&quot;"/>
-    <we:property name="creatorUserId" value="&quot;1003200373EAE09B&quot;"/>
-    <we:property name="creatorSessionId" value="&quot;ccc3ce60-28f7-4bf9-a48f-519ecb7b7855&quot;"/>
-    <we:property name="artifactViewState" value="&quot;live&quot;"/>
+    <we:property name="reportName" value="&quot;EDA_PROYECTO&quot;"/>
+    <we:property name="reportState" value="&quot;CONNECTED&quot;"/>
+    <we:property name="reportUrl" value="&quot;/groups/me/reports/e1dd3c9f-eb8b-4fd5-9415-94528c45eafa/ReportSection4d4befd05b00615a9970?bookmarkGuid=0dc637a3-1668-4f10-8610-3b741723b394&amp;bookmarkUsage=1&amp;ctid=01ff18d5-6ae3-4fe1-831f-78c5ba7f715d&amp;fromEntryPoint=export&quot;"/>
   </we:properties>
   <we:bindings/>
   <we:snapshot xmlns:r="http://schemas.openxmlformats.org/officeDocument/2006/relationships"/>
@@ -5154,28 +6841,28 @@
 </file>
 
 <file path=ppt/webextensions/webextension10.xml><?xml version="1.0" encoding="utf-8"?>
-<we:webextension xmlns:we="http://schemas.microsoft.com/office/webextensions/webextension/2010/11" id="{A0668465-CD48-45CA-8604-A82F292596B0}">
+<we:webextension xmlns:we="http://schemas.microsoft.com/office/webextensions/webextension/2010/11" id="{0AAFD01D-5B72-478E-8927-935E73F9967A}">
   <we:reference id="wa200003233" version="2.0.0.3" store="es-ES" storeType="OMEX"/>
   <we:alternateReferences>
     <we:reference id="WA200003233" version="2.0.0.3" store="" storeType="OMEX"/>
   </we:alternateReferences>
   <we:properties>
-    <we:property name="reportUrl" value="&quot;/groups/me/reports/e1dd3c9f-eb8b-4fd5-9415-94528c45eafa/ReportSectionc79ff1f1a02049020864?bookmarkGuid=1650db9d-6b92-4342-9c55-1b1cd4ca28f6&amp;bookmarkUsage=1&amp;ctid=01ff18d5-6ae3-4fe1-831f-78c5ba7f715d&amp;fromEntryPoint=export&quot;"/>
+    <we:property name="reportUrl" value="&quot;/groups/me/reports/e1dd3c9f-eb8b-4fd5-9415-94528c45eafa/ReportSectionabe7d09ce07e6ca6c884?bookmarkGuid=351ab266-84a7-413b-8bc6-2986c29fc046&amp;bookmarkUsage=1&amp;ctid=01ff18d5-6ae3-4fe1-831f-78c5ba7f715d&amp;fromEntryPoint=export&quot;"/>
     <we:property name="reportName" value="&quot;EDA_PROYECTO&quot;"/>
     <we:property name="reportState" value="&quot;CONNECTED&quot;"/>
     <we:property name="embedUrl" value="&quot;/reportEmbed?reportId=e1dd3c9f-eb8b-4fd5-9415-94528c45eafa&amp;config=eyJjbHVzdGVyVXJsIjoiaHR0cHM6Ly9XQUJJLVdFU1QtRVVST1BFLUYtUFJJTUFSWS1yZWRpcmVjdC5hbmFseXNpcy53aW5kb3dzLm5ldCIsImVtYmVkRmVhdHVyZXMiOnsidXNhZ2VNZXRyaWNzVk5leHQiOnRydWV9fQ%3D%3D&amp;disableSensitivityBanner=true&quot;"/>
-    <we:property name="pageName" value="&quot;ReportSectionc79ff1f1a02049020864&quot;"/>
-    <we:property name="pageDisplayName" value="&quot;TYPE OF TOBACCO FOR SMOKERS&quot;"/>
+    <we:property name="pageName" value="&quot;ReportSectionabe7d09ce07e6ca6c884&quot;"/>
+    <we:property name="pageDisplayName" value="&quot;REGION BY SMOKERS&quot;"/>
     <we:property name="datasetId" value="&quot;8d266ffc-6eb7-4324-bb53-5eca314f4ee4&quot;"/>
     <we:property name="backgroundColor" value="&quot;#FFFFFF&quot;"/>
-    <we:property name="bookmark" value="&quot;H4sIAAAAAAAAA+1XS2/bMAz+K4MuvQSD/Igd99Z2KTD0iXboMAzFQEu0o86xDFnJmhX576PkJOsjXbNiXS+9GCZF8/F9JG3fMKnapoLZMYyRbbMjMAKkNu8C1mN1p9s9OTk42jk7+Ha8czQktW6s0nXLtm+YBVOivVDtBCrngZRfL3sMquoUSicVULXYYw2aVtdQqZ/YGdORNROc9xheN5U24FyeW7Do3E7JnGSKHbyPKCIIq6Z4jsJ22jNstLELWaRZUQRFADzkcUaXQRLTM2136tN82p6MClVZiutu89nwujFUy80Sg31/WOSQBzkKLjj0AaMB8oRC2VnjbPYo+1IbJaAiZefOebtYVhP22L7RY+93gXdLlsPaKjtzwlh/V3VJqk/eI58Tlp9HaNA/sqdrqToEbthHf3VpYtt2dXqTajK+d+Kkcz0xAs+w+C344HMi4NRoomeVAJKSwl5ANfF0ktdDRZVQUa4WpybLrS/YbjnLyzldOhpvxdsojwd1P5JNj430jz2DBK9k24EPN/VdRIhYUPWCtQTiOAAZx4M8znnA46gvHyd2LWkvUIWPc78IPu+tMtiRU6gFae+H3zHKjsZolXDSIRbWa8vSYAnLPhi+JO77k3oxcn0nnqly5HM4F2Qsh9OuJ+6GesX8fFpuAznhhMzBaiI7eoi+a6GWXFeLdeSXjr/rJo+JatJS06DsMt4bgbFu9eVXtERcK5EDbSSa3Znvpg/KLLcTTfnwjceX4dFtpu5lQH6ubm34xRjPNt+CG86t2289FkfZoBBBFiaQpFHCBxmPnlwtjw/2i0O7Wjr3kP3bKQAjn931r1Tk3HdNWqRFxJMk50mKWRwGWco3fMkLzItwkIZZGPEBj9IsDPHtJf9/X/Ib9KaFvMLh9d32dH6kkFwUA55HIgz6UQQhhq//GVBiTXPznELbSgl68nadbIz03e1uJFjwdTRdKIXduZb+GH2Z68ndhVYJR+9yZtYu1lWL/GscusXKZRjHPAwkz9M8DaGfZJ6sP1OP1zbXD6j3DteBpCe2bUDgKdS4BiwCCSgp+QRg/leG+SCUjaLue+IB94Ozgnc+/wUo48XLaw0AAA==&quot;"/>
-    <we:property name="initialStateBookmark" value="&quot;H4sIAAAAAAAAA+1XS2/bMAz+K4MuvQSD/Igd99Z2KTD0iXboMAzFQEu0o86xDFnJmhX576PkJOsjXbNiXS+9GCZF8/F9JG3fMKnapoLZMYyRbbMjMAKkNu8C1mN1p9s9OTk42jk7+Ha8czQktW6s0nXLtm+YBVOivVDtBCrngZRfL3sMquoUSicVULXYYw2aVtdQqZ/YGdORNROc9xheN5U24FyeW7Do3E7JnGSKHbyPKCIIq6Z4jsJ22jNstLELWaRZUQRFADzkcUaXQRLTM2136tN82p6MClVZiutu89nwujFUy80Sg31/WOSQBzkKLjj0AaMB8oRC2VnjbPYo+1IbJaAiZefOebtYVhP22L7RY+93gXdLlsPaKjtzwlh/V3VJqk/eI58Tlp9HaNA/sqdrqToEbthHf3VpYtt2dXqTajK+d+Kkcz0xAs+w+C344HMi4NRoomeVAJKSwl5ANfF0ktdDRZVQUa4WpybLrS/YbjnLyzldOhpvxdsojwd1P5JNj430jz2DBK9k24EPN/VdRIhYUPWCtQTiOAAZx4M8znnA46gvHyd2LWkvUIWPc78IPu+tMtiRU6gFae+H3zHKjsZolXDSIRbWa8vSYAnLPhi+JO77k3oxcn0nnqly5HM4F2Qsh9OuJ+6GesX8fFpuAznhhMzBaiI7eoi+a6GWXFeLdeSXjr/rJo+JatJS06DsMt4bgbFu9eVXtERcK5EDbSSa3Znvpg/KLLcTTfnwjceX4dFtpu5lQH6ubm34xRjPNt+CG86t2289FkfZoBBBFiaQpFHCBxmPnlwtjw/2i0O7Wjr3kP3bKQAjn931r1Tk3HdNWqRFxJMk50mKWRwGWco3fMkLzItwkIZZGPEBj9IsDPHtJf9/X/Ib9KaFvMLh9d32dH6kkFwUA55HIgz6UQQhhq//GVBiTXPznELbSgl68nadbIz03e1uJFjwdTRdKIXduZb+GH2Z68ndhVYJR+9yZtYu1lWL/GscusXKZRjHPAwkz9M8DaGfZJ6sP1OP1zbXD6j3DteBpCe2bUDgKdS4BiwCCSgp+QRg/leG+SCUjaLue+IB94Ozgnc+/wUo48XLaw0AAA==&quot;"/>
+    <we:property name="bookmark" value="&quot;H4sIAAAAAAAAA+VWy27bMBD8lYKXXIyCMi1Lzs1x3UuaB5IilyIoluRaZSqLAkmldg3/e5eUkzaBkaBAgPRxE2fJ3Z0ZLcEN08a3NaxPYYnskJ2AU6Cte5OxAWt67Ojs7PhkenH8+XR6MifYtsHYxrPDDQvgKgxXxndQxwwEfroeMKjrc6jiagG1xwFr0XnbQG2+Y7+ZQsF1uB0wXLW1dRBTXgYIGNPe0nZaU+3sraCKoIK5xUtUoUcvsLUu7NYgsdB8opAXOFYwVmU5ojO+j6Y2n98fi6bGZrYJYBpqIGLDIudyJAuhUZSZ4MMykxFfmDrstsj1fNU64k1qrNuo11TfQqNQs0TOoe+5bNi0qhxWEHbL+YPgzNbdcg9+aTun8AIXKdQEE9ZUwy/tV9NUbEsKnjtL+t7DmMD3XbNTK4/LL/bbzCHJq9kh314T4ul4vXPjJ/2PPQUFLrZv5Q1pFmnSAes0uqN1YvrOuDszhoNHDb8aS6JFUKaEyEcLlXGQkIMqgY+ftWxGylTWGUVaPHbthVv+TSd8bRS6B16wJdLUxQ8NARKNtq9ksI9bncKYWG7YB0PM+9xXUHcx7cEReKMOqKM73foZo5ZvfhmctN2nEi8qA1WkQDEW49FkMeSZ5KWYiIku+OtbRT9vPPbfe3WvQ28WLwRimY+lKHPQogTBs5jmSUUCroK0q4dXScw2KRfZUE9KLjkXpSzksMz/YOsH/9Lljt6ZXehvvOLT/7NvwmwXfAsKz6HBPZNGdkGjo0ZPTlt6sbBUhFQzsn5uPOM75n42t9sf6xsvIFIJAAA=&quot;"/>
+    <we:property name="initialStateBookmark" value="&quot;H4sIAAAAAAAAA+VWy27bMBD8lYKXXIyCMi1Lzs1x3UuaB5IilyIoluRaZSqLAkmldg3/e5eUkzaBkaBAgPRxE2fJ3Z0ZLcEN08a3NaxPYYnskJ2AU6Cte5OxAWt67Ojs7PhkenH8+XR6MifYtsHYxrPDDQvgKgxXxndQxwwEfroeMKjrc6jiagG1xwFr0XnbQG2+Y7+ZQsF1uB0wXLW1dRBTXgYIGNPe0nZaU+3sraCKoIK5xUtUoUcvsLUu7NYgsdB8opAXOFYwVmU5ojO+j6Y2n98fi6bGZrYJYBpqIGLDIudyJAuhUZSZ4MMykxFfmDrstsj1fNU64k1qrNuo11TfQqNQs0TOoe+5bNi0qhxWEHbL+YPgzNbdcg9+aTun8AIXKdQEE9ZUwy/tV9NUbEsKnjtL+t7DmMD3XbNTK4/LL/bbzCHJq9kh314T4ul4vXPjJ/2PPQUFLrZv5Q1pFmnSAes0uqN1YvrOuDszhoNHDb8aS6JFUKaEyEcLlXGQkIMqgY+ftWxGylTWGUVaPHbthVv+TSd8bRS6B16wJdLUxQ8NARKNtq9ksI9bncKYWG7YB0PM+9xXUHcx7cEReKMOqKM73foZo5ZvfhmctN2nEi8qA1WkQDEW49FkMeSZ5KWYiIku+OtbRT9vPPbfe3WvQ28WLwRimY+lKHPQogTBs5jmSUUCroK0q4dXScw2KRfZUE9KLjkXpSzksMz/YOsH/9Lljt6ZXehvvOLT/7NvwmwXfAsKz6HBPZNGdkGjo0ZPTlt6sbBUhFQzsn5uPOM75n42t9sf6xsvIFIJAAA=&quot;"/>
     <we:property name="isFiltersActionButtonVisible" value="true"/>
     <we:property name="isVisualContainerHeaderHidden" value="false"/>
-    <we:property name="reportEmbeddedTime" value="&quot;2024-04-18T19:13:05.771Z&quot;"/>
+    <we:property name="reportEmbeddedTime" value="&quot;2024-04-18T19:12:31.616Z&quot;"/>
     <we:property name="creatorTenantId" value="&quot;01ff18d5-6ae3-4fe1-831f-78c5ba7f715d&quot;"/>
     <we:property name="creatorUserId" value="&quot;1003200373EAE09B&quot;"/>
-    <we:property name="creatorSessionId" value="&quot;6d59a0fd-95e5-4c41-a327-c05bd8aeecd7&quot;"/>
+    <we:property name="creatorSessionId" value="&quot;8a05011c-091f-4b4d-af3b-6958fee221ee&quot;"/>
     <we:property name="artifactViewState" value="&quot;live&quot;"/>
   </we:properties>
   <we:bindings/>
@@ -5184,29 +6871,90 @@
 </file>
 
 <file path=ppt/webextensions/webextension11.xml><?xml version="1.0" encoding="utf-8"?>
+<we:webextension xmlns:we="http://schemas.microsoft.com/office/webextensions/webextension/2010/11" id="{C9FC497A-F511-4421-B62A-4C4409A64807}">
+  <we:reference id="wa200003233" version="2.0.0.3" store="es-ES" storeType="OMEX"/>
+  <we:alternateReferences>
+    <we:reference id="WA200003233" version="2.0.0.3" store="" storeType="OMEX"/>
+  </we:alternateReferences>
+  <we:properties>
+    <we:property name="reportUrl" value="&quot;/groups/me/reports/e1dd3c9f-eb8b-4fd5-9415-94528c45eafa/ReportSectionabe7d09ce07e6ca6c884?bookmarkGuid=84e6b883-6630-41c8-a4a1-19a101c2b7ab&amp;bookmarkUsage=1&amp;ctid=01ff18d5-6ae3-4fe1-831f-78c5ba7f715d&amp;fromEntryPoint=export&quot;"/>
+    <we:property name="reportName" value="&quot;EDA_PROYECTO&quot;"/>
+    <we:property name="reportState" value="&quot;CONNECTED&quot;"/>
+    <we:property name="embedUrl" value="&quot;/reportEmbed?reportId=e1dd3c9f-eb8b-4fd5-9415-94528c45eafa&amp;config=eyJjbHVzdGVyVXJsIjoiaHR0cHM6Ly9XQUJJLVdFU1QtRVVST1BFLUYtUFJJTUFSWS1yZWRpcmVjdC5hbmFseXNpcy53aW5kb3dzLm5ldCIsImVtYmVkRmVhdHVyZXMiOnsidXNhZ2VNZXRyaWNzVk5leHQiOnRydWV9fQ%3D%3D&amp;disableSensitivityBanner=true&quot;"/>
+    <we:property name="pageName" value="&quot;ReportSectionabe7d09ce07e6ca6c884&quot;"/>
+    <we:property name="pageDisplayName" value="&quot;REGION BY SMOKERS&quot;"/>
+    <we:property name="datasetId" value="&quot;8d266ffc-6eb7-4324-bb53-5eca314f4ee4&quot;"/>
+    <we:property name="backgroundColor" value="&quot;#FFFFFF&quot;"/>
+    <we:property name="bookmark" value="&quot;H4sIAAAAAAAAA+VWTW/bMAz9K4MuvQSDHMWx0lubdadtKNqhl6EHSmI8tY5lSHKXLMh/HyWn2VoELQYU6D5uFkmRfO+ZkjbM2NA1sP4ES2TH7CN4Dcb5NwUbsXawnTp3uwR/y42aqBlwxYGXClHKUlCU66J1bWDHGxbB1xivbOihSQnJ+IVVUzGdzBZjXiguxUzMTMXZ9YhB05xDnWIW0AQcsQ59cC009jsOKcgVfY/bEcNV1zgPqdBlhIip2B2F05oaLN6mPkBHe4eXqONgvcDO+bhbg8LK8JlGXuFUw1RLOaE9YfDm5p+PT0VzY3PXRrAtNZBs46rkxEwlDApZCD6WhUr2hW3iLkStz1adJzaIo3WXSD0xd9BqNCyD8xgGLBt2Utcea4i75dkD59w1/fKA/dL1XuMFLrKrjTauqUZYulvb1mxLDJ57R/zuzZiN7/t2x1aZll/dt7lHotewY769Jkug7c1OjZ/wPw8QNPjUvlM3xFmCSRucN+hP1xnpO+vvxRiPHjX8aigJFpkKLUQ5WeiCg4IStAQ+fVayOTFTO281cfFYtRdu+TeVCI3V6B9owZZIs5g+DETIMLqhksXB70x2Y0a5YR8sIR9yX0HTp7RHpxCsPqKO7nkbZoxavvllcHJ4yCVelAaqSI6Dx8erS0U/b9r232u152EQi1eC7oVyqoQswQgJghcpzZOMRFxF5VYPj5KUbSYXxdjMJN04XEhVqbEs/2DpR//S4Y7B253rbzzi8/9zaMJcH0MHGs+hxQOTRnJBaxJHT05bfrGwXIRYs6p5bjzTO2Y/m9vtD3d2Y2Z3CQAA&quot;"/>
+    <we:property name="initialStateBookmark" value="&quot;H4sIAAAAAAAAA+VWy27bMBD8lYKXXIyCMi1Lzs1x3UuaB5IilyIoluRaZSqLAkmldg3/e5eUkzaBkaBAgPRxE2fJ3Z0ZLcEN08a3NaxPYYnskJ2AU6Cte5OxAWt67Ojs7PhkenH8+XR6MifYtsHYxrPDDQvgKgxXxndQxwwEfroeMKjrc6jiagG1xwFr0XnbQG2+Y7+ZQsF1uB0wXLW1dRBTXgYIGNPe0nZaU+3sraCKoIK5xUtUoUcvsLUu7NYgsdB8opAXOFYwVmU5ojO+j6Y2n98fi6bGZrYJYBpqIGLDIudyJAuhUZSZ4MMykxFfmDrstsj1fNU64k1qrNuo11TfQqNQs0TOoe+5bNi0qhxWEHbL+YPgzNbdcg9+aTun8AIXKdQEE9ZUwy/tV9NUbEsKnjtL+t7DmMD3XbNTK4/LL/bbzCHJq9kh314T4ul4vXPjJ/2PPQUFLrZv5Q1pFmnSAes0uqN1YvrOuDszhoNHDb8aS6JFUKaEyEcLlXGQkIMqgY+ftWxGylTWGUVaPHbthVv+TSd8bRS6B16wJdLUxQ8NARKNtq9ksI9bncKYWG7YB0PM+9xXUHcx7cEReKMOqKM73foZo5ZvfhmctN2nEi8qA1WkQDEW49FkMeSZ5KWYiIku+OtbRT9vPPbfe3WvQ28WLwRimY+lKHPQogTBs5jmSUUCroK0q4dXScw2KRfZUE9KLjkXpSzksMz/YOsH/9Lljt6ZXehvvOLT/7NvwmwXfAsKz6HBPZNGdkGjo0ZPTlt6sbBUhFQzsn5uPOM75n42t9sf6xsvIFIJAAA=&quot;"/>
+    <we:property name="isFiltersActionButtonVisible" value="true"/>
+    <we:property name="isVisualContainerHeaderHidden" value="false"/>
+    <we:property name="reportEmbeddedTime" value="&quot;2024-04-19T17:39:43.772Z&quot;"/>
+    <we:property name="creatorTenantId" value="&quot;01ff18d5-6ae3-4fe1-831f-78c5ba7f715d&quot;"/>
+    <we:property name="creatorUserId" value="&quot;1003200373EAE09B&quot;"/>
+    <we:property name="creatorSessionId" value="&quot;3c10453e-4ff5-4863-8775-91f464154048&quot;"/>
+    <we:property name="artifactViewState" value="&quot;live&quot;"/>
+  </we:properties>
+  <we:bindings/>
+  <we:snapshot xmlns:r="http://schemas.openxmlformats.org/officeDocument/2006/relationships"/>
+</we:webextension>
+</file>
+
+<file path=ppt/webextensions/webextension12.xml><?xml version="1.0" encoding="utf-8"?>
+<we:webextension xmlns:we="http://schemas.microsoft.com/office/webextensions/webextension/2010/11" id="{A0668465-CD48-45CA-8604-A82F292596B0}">
+  <we:reference id="wa200003233" version="2.0.0.3" store="es-ES" storeType="OMEX"/>
+  <we:alternateReferences>
+    <we:reference id="WA200003233" version="2.0.0.3" store="" storeType="OMEX"/>
+  </we:alternateReferences>
+  <we:properties>
+    <we:property name="artifactViewState" value="&quot;live&quot;"/>
+    <we:property name="backgroundColor" value="&quot;#FFFFFF&quot;"/>
+    <we:property name="bookmark" value="&quot;H4sIAAAAAAAAA+1XS2/bMAz+K4MuvQSD/Igd99Z2KTD0iXboMAzFQEu0o86xDFnJmhX576PkJOsjXbNiXS+9GCZF8/F9JG3fMKnapoLZMYyRbbMjMAKkNu8C1mN1p9s9OTk42jk7+Ha8czQktW6s0nXLtm+YBVOivVDtBCrngZRfL3sMquoUSicVULXYYw2aVtdQqZ/YGdORNROc9xheN5U24FyeW7Do3E7JnGSKHbyPKCIIq6Z4jsJ22jNstLELWaRZUQRFADzkcUaXQRLTM2136tN82p6MClVZiutu89nwujFUy80Sg31/WOSQBzkKLjj0AaMB8oRC2VnjbPYo+1IbJaAiZefOebtYVhP22L7RY+93gXdLlsPaKjtzwlh/V3VJqk/eI58Tlp9HaNA/sqdrqToEbthHf3VpYtt2dXqTajK+d+Kkcz0xAs+w+C344HMi4NRoomeVAJKSwl5ANfF0ktdDRZVQUa4WpybLrS/YbjnLyzldOhpvxdsojwd1P5JNj430jz2DBK9k24EPN/VdRIhYUPWCtQTiOAAZx4M8znnA46gvHyd2LWkvUIWPc78IPu+tMtiRU6gFae+H3zHKjsZolXDSIRbWa8vSYAnLPhi+JO77k3oxcn0nnqly5HM4F2Qsh9OuJ+6GesX8fFpuAznhhMzBaiI7eoi+a6GWXFeLdeSXjr/rJo+JatJS06DsMt4bgbFu9eVXtERcK5EDbSSa3Znvpg/KLLcTTfnwjceX4dFtpu5lQH6ubm34xRjPNt+CG86t2289FkfZoBBBFiaQpFHCBxmPnlwtjw/2i0O7Wjr3kP3bKQAjn931r1Tk3HdNWqRFxJMk50mKWRwGWco3fMkLzItwkIZZGPEBj9IsDPHtJf9/X/Ib9KaFvMLh9d32dH6kkFwUA55HIgz6UQQhhq//GVBiTXPznELbSgl68nadbIz03e1uJFjwdTRdKIXduZb+GH2Z68ndhVYJR+9yZtYu1lWL/GscusXKZRjHPAwkz9M8DaGfZJ6sP1OP1zbXD6j3DteBpCe2bUDgKdS4BiwCCSgp+QRg/leG+SCUjaLue+IB94Ozgnc+/wUo48XLaw0AAA==&quot;"/>
+    <we:property name="creatorSessionId" value="&quot;6d59a0fd-95e5-4c41-a327-c05bd8aeecd7&quot;"/>
+    <we:property name="creatorTenantId" value="&quot;01ff18d5-6ae3-4fe1-831f-78c5ba7f715d&quot;"/>
+    <we:property name="creatorUserId" value="&quot;1003200373EAE09B&quot;"/>
+    <we:property name="datasetId" value="&quot;8d266ffc-6eb7-4324-bb53-5eca314f4ee4&quot;"/>
+    <we:property name="embedUrl" value="&quot;/reportEmbed?reportId=e1dd3c9f-eb8b-4fd5-9415-94528c45eafa&amp;config=eyJjbHVzdGVyVXJsIjoiaHR0cHM6Ly9XQUJJLVdFU1QtRVVST1BFLUYtUFJJTUFSWS1yZWRpcmVjdC5hbmFseXNpcy53aW5kb3dzLm5ldCIsImVtYmVkRmVhdHVyZXMiOnsidXNhZ2VNZXRyaWNzVk5leHQiOnRydWV9fQ%3D%3D&amp;disableSensitivityBanner=true&quot;"/>
+    <we:property name="initialStateBookmark" value="&quot;H4sIAAAAAAAAA+1XS2/bMAz+K4MuvQSD/Igd99Z2KTD0iXboMAzFQEu0o86xDFnJmhX576PkJOsjXbNiXS+9GCZF8/F9JG3fMKnapoLZMYyRbbMjMAKkNu8C1mN1p9s9OTk42jk7+Ha8czQktW6s0nXLtm+YBVOivVDtBCrngZRfL3sMquoUSicVULXYYw2aVtdQqZ/YGdORNROc9xheN5U24FyeW7Do3E7JnGSKHbyPKCIIq6Z4jsJ22jNstLELWaRZUQRFADzkcUaXQRLTM2136tN82p6MClVZiutu89nwujFUy80Sg31/WOSQBzkKLjj0AaMB8oRC2VnjbPYo+1IbJaAiZefOebtYVhP22L7RY+93gXdLlsPaKjtzwlh/V3VJqk/eI58Tlp9HaNA/sqdrqToEbthHf3VpYtt2dXqTajK+d+Kkcz0xAs+w+C344HMi4NRoomeVAJKSwl5ANfF0ktdDRZVQUa4WpybLrS/YbjnLyzldOhpvxdsojwd1P5JNj430jz2DBK9k24EPN/VdRIhYUPWCtQTiOAAZx4M8znnA46gvHyd2LWkvUIWPc78IPu+tMtiRU6gFae+H3zHKjsZolXDSIRbWa8vSYAnLPhi+JO77k3oxcn0nnqly5HM4F2Qsh9OuJ+6GesX8fFpuAznhhMzBaiI7eoi+a6GWXFeLdeSXjr/rJo+JatJS06DsMt4bgbFu9eVXtERcK5EDbSSa3Znvpg/KLLcTTfnwjceX4dFtpu5lQH6ubm34xRjPNt+CG86t2289FkfZoBBBFiaQpFHCBxmPnlwtjw/2i0O7Wjr3kP3bKQAjn931r1Tk3HdNWqRFxJMk50mKWRwGWco3fMkLzItwkIZZGPEBj9IsDPHtJf9/X/Ib9KaFvMLh9d32dH6kkFwUA55HIgz6UQQhhq//GVBiTXPznELbSgl68nadbIz03e1uJFjwdTRdKIXduZb+GH2Z68ndhVYJR+9yZtYu1lWL/GscusXKZRjHPAwkz9M8DaGfZJ6sP1OP1zbXD6j3DteBpCe2bUDgKdS4BiwCCSgp+QRg/leG+SCUjaLue+IB94Ozgnc+/wUo48XLaw0AAA==&quot;"/>
+    <we:property name="isFiltersActionButtonVisible" value="true"/>
+    <we:property name="isVisualContainerHeaderHidden" value="false"/>
+    <we:property name="pageDisplayName" value="&quot;TYPE OF TOBACCO FOR SMOKERS&quot;"/>
+    <we:property name="pageName" value="&quot;ReportSectionc79ff1f1a02049020864&quot;"/>
+    <we:property name="reportEmbeddedTime" value="&quot;2024-04-18T19:13:05.771Z&quot;"/>
+    <we:property name="reportName" value="&quot;EDA_PROYECTO&quot;"/>
+    <we:property name="reportState" value="&quot;CONNECTED&quot;"/>
+    <we:property name="reportUrl" value="&quot;/groups/me/reports/e1dd3c9f-eb8b-4fd5-9415-94528c45eafa/ReportSectionc79ff1f1a02049020864?bookmarkGuid=1650db9d-6b92-4342-9c55-1b1cd4ca28f6&amp;bookmarkUsage=1&amp;ctid=01ff18d5-6ae3-4fe1-831f-78c5ba7f715d&amp;fromEntryPoint=export&quot;"/>
+  </we:properties>
+  <we:bindings/>
+  <we:snapshot xmlns:r="http://schemas.openxmlformats.org/officeDocument/2006/relationships"/>
+</we:webextension>
+</file>
+
+<file path=ppt/webextensions/webextension13.xml><?xml version="1.0" encoding="utf-8"?>
 <we:webextension xmlns:we="http://schemas.microsoft.com/office/webextensions/webextension/2010/11" id="{5757A44A-5E77-4069-8CEF-B80A1556D79B}">
   <we:reference id="wa200003233" version="2.0.0.3" store="es-ES" storeType="OMEX"/>
   <we:alternateReferences>
     <we:reference id="WA200003233" version="2.0.0.3" store="" storeType="OMEX"/>
   </we:alternateReferences>
   <we:properties>
-    <we:property name="reportUrl" value="&quot;/groups/me/reports/e1dd3c9f-eb8b-4fd5-9415-94528c45eafa/ReportSectionbd7694d1b8ae70e1700c?bookmarkGuid=2065c45a-5899-404c-8786-807e083f0d15&amp;bookmarkUsage=1&amp;ctid=01ff18d5-6ae3-4fe1-831f-78c5ba7f715d&amp;fromEntryPoint=export&quot;"/>
-    <we:property name="reportName" value="&quot;EDA_PROYECTO&quot;"/>
-    <we:property name="reportState" value="&quot;CONNECTED&quot;"/>
+    <we:property name="artifactViewState" value="&quot;live&quot;"/>
+    <we:property name="backgroundColor" value="&quot;#FFFFFF&quot;"/>
+    <we:property name="bookmark" value="&quot;H4sIAAAAAAAAA+VY32/cNgz+Vwq99OUwSLblH3lLsgQYsBVBU6QYhmKgJPqqxmcZsi7NNbj/vZR8lyWd2wxBBzTpi21RFMmPHyVQvmHGjkMHm1ewQnbA/gCvwTj/QrAF6yfZkXOXK/CXmS6UarhoeFVJ5KYxRUZabgjW9SM7uGEB/BLDhR3X0EWDJPzr3YJB153BMo5a6EZcsAH96Hro7CeclGkq+DVuFwyvh855iCbPAwSMZq9IncYUivglJ4+gg73Cc9Rhkr7GwfmwGytTlU1hhKoBK46i4lzTmnGaTWE+rE9Kre0C+Y2fanNyPXjCcrNPyWmabFBJWqe1LjlvNCqlDLkKmyHqHFP0S+etho6Ek7lo7WKPJluwU+9Wye4u/SNpnvTBhk0crNyl7ZckepMs8i3l8u179JiWHLve2CkDN+y39Ixh4jhOOJNKt159MRNH527tNb7G9p9Bcr4lAs68I3puA0ASktsL6NaJTrL6uyUkBCpiiWLSfPknji+j5rstPSYa7/j7T3H8C/dXolmw9+7jsUdKr2EHIrm7SlVEGQlg+x1rmWga3dZZpiuTy8rwpii/TuyOtENzBb3GSON9CIfLpccl7PN98v3xwSr8/RHx0sBmYuJ03e8qPP8SNU+oR7LS7XZQ2ifpayoWpsFHFE59oDqPaGmB8wb90SYB/tX6/QaiQjz5ocASOhKVed1Ci3lRN7riplSylk+UwOJnIrDYE6grWWNTN5jrRgpUufnW0frjEIi9+XkInAc7EdjmEopaIJciy5TKtCybp0DgTFGKZ0vgPNiJwIrOT5PJqiyotclKXlGP8hQInCnK50vgPNiJQCD6uCLmhNLUmGIORfUggfc7z/+hFVtSyNTMPoKRsbOaVt7lhK2Qbg3xw0CAhGOYXFmc5p1J05hgzvefRzBaHTvQ28SlOwLF/OFO43/bxX7vPMS2lzItDV0iTGlyzoUplOR1Ec18MyMBr4Ny1/fLNFpTuhGc8wqEKMocdM5LfLy1BmopRUtHAM/KTHGoZPFET4Ln2w3Pg50KWraqrEtecwP0AuJRV48vB52LVmJeGjBANumGlJnHWksG5/azW4dxAI1n0OPMvqaSAto/5oG9nf4ZsOSEorGqe+gwiH8Sbk+C7fYza1G9u+MQAAA=&quot;"/>
+    <we:property name="creatorSessionId" value="&quot;bc9ca162-daf0-4f0d-9927-c6e4461dc3d6&quot;"/>
+    <we:property name="creatorTenantId" value="&quot;01ff18d5-6ae3-4fe1-831f-78c5ba7f715d&quot;"/>
+    <we:property name="creatorUserId" value="&quot;1003200373EAE09B&quot;"/>
+    <we:property name="datasetId" value="&quot;8d266ffc-6eb7-4324-bb53-5eca314f4ee4&quot;"/>
     <we:property name="embedUrl" value="&quot;/reportEmbed?reportId=e1dd3c9f-eb8b-4fd5-9415-94528c45eafa&amp;config=eyJjbHVzdGVyVXJsIjoiaHR0cHM6Ly9XQUJJLVdFU1QtRVVST1BFLUYtUFJJTUFSWS1yZWRpcmVjdC5hbmFseXNpcy53aW5kb3dzLm5ldCIsImVtYmVkRmVhdHVyZXMiOnsidXNhZ2VNZXRyaWNzVk5leHQiOnRydWV9fQ%3D%3D&amp;disableSensitivityBanner=true&quot;"/>
-    <we:property name="pageName" value="&quot;ReportSectionbd7694d1b8ae70e1700c&quot;"/>
-    <we:property name="pageDisplayName" value="&quot;DISTRIBUTION WEEKDAYS/WEEKENDS&quot;"/>
-    <we:property name="datasetId" value="&quot;8d266ffc-6eb7-4324-bb53-5eca314f4ee4&quot;"/>
-    <we:property name="backgroundColor" value="&quot;#FFFFFF&quot;"/>
-    <we:property name="bookmark" value="&quot;H4sIAAAAAAAAA+VYbW/UOBD+Kyd/4csKOS/OS7+1va10gkLVop4QqtDYniyGbBw53tK9av/7jZ3d0kKgp4qTaPmSxOPxzDzzjK1xrpk2Q9/C+hUske2xY3AKtHV/JGzGulF28Pr1i+P90xfvX+0fz0lse29sN7C9a+bBLdCfm2EFbbBAwncXMwZtewKLMGqgHXDGenSD7aA1/+CoTFPerXAzY3jVt9ZBMHnmwWMwe0nqNCbfyfOMPILy5hLPUPlReoq9dX47lros6lwnsgIsOSYl54rWDONsDPN+fVJqTOvJb/iU6/lV7wjL9S4HR3GyRilonVKq4LxWKKXU5Mqv+6BzSNEvrDMKWhKO5oK18x2adMaOnF1Gu9t8D6Q577zx6zBY2k+mW5DoTbTIN5TLvz+gw7jk0HbajBm4Zn/FZwgTh2HEGVXa1fKrmTA6syun8BSbL4PofEMEnDhL9NwEgCQkt+fQriKdZPWlISQEKmAJYtJ89haHZ0HzYkOPkcZb/v5THN/g/k40M/bBfj50SOnVbC+J7i5jFVFGPJhuy1qa1LVqqjRVpc5EqXmdF98ndkvavr6ETmGg8S6E/cXC4QJ2+Z7/fHyw9O8/I37SsB6ZOFp12wrPvkbNI+qBrLTbHRT3Sfwai4UpcAGFlR+pzgNaWmCdRnewjoD/NG63gagQ578UWEJHoiKrGmgwy6talVwXUlTikRKY/04E5jsCVSkqrKsaM1WLBGWmf3S0/joEYqd/HwKnwY4ENpmAvEqQiyRNpUyVKOrHQOBEUSZPlsBpsCOBJZ2fOhVlkVNrkxa8pB7lMRA4UZRPl8BpsCOBQPRxScwlUlFjihnk5b0E3u08/4dWbEEhUzP7AEaG1ihaeZsTtkS6NYQPDR4ijn50ZXCctzpOY4Q53X8ewGBU6EBvEhfvCBTzx1uN/00X+7PzENpeyrTQdInQhc44T3QuBa/yYOaHGfF45aW9ulumwZpUdcI5LyFJ8iIDlfECH26thkqIpKEjgKdFKjmUIn+kJ8HT7YanwY4FLRpZVAWvuAZ6AfGoyoeXg8qSRmBWaNBANumGlOqHWosGp/azXfmhB4Un0OHEvqaSAto/+p69Hf8ZsOiEojGyve8wCH8Sbk6CzeZfOJbcbNQQAAA=&quot;"/>
     <we:property name="initialStateBookmark" value="&quot;H4sIAAAAAAAAA+VYbW/UOBD+Kyd/4csKOS/OS7+1va10gkLVop4QqtDYniyGbBw53tK9av/7jZ3d0kKgp4qTaPmSxOPxzDzzjK1xrpk2Q9/C+hUske2xY3AKtHV/JGzGulF28Pr1i+P90xfvX+0fz0lse29sN7C9a+bBLdCfm2EFbbBAwncXMwZtewKLMGqgHXDGenSD7aA1/+CoTFPerXAzY3jVt9ZBMHnmwWMwe0nqNCbfyfOMPILy5hLPUPlReoq9dX47lros6lwnsgIsOSYl54rWDONsDPN+fVJqTOvJb/iU6/lV7wjL9S4HR3GyRilonVKq4LxWKKXU5Mqv+6BzSNEvrDMKWhKO5oK18x2adMaOnF1Gu9t8D6Q577zx6zBY2k+mW5DoTbTIN5TLvz+gw7jk0HbajBm4Zn/FZwgTh2HEGVXa1fKrmTA6syun8BSbL4PofEMEnDhL9NwEgCQkt+fQriKdZPWlISQEKmAJYtJ89haHZ0HzYkOPkcZb/v5THN/g/k40M/bBfj50SOnVbC+J7i5jFVFGPJhuy1qa1LVqqjRVpc5EqXmdF98ndkvavr6ETmGg8S6E/cXC4QJ2+Z7/fHyw9O8/I37SsB6ZOFp12wrPvkbNI+qBrLTbHRT3Sfwai4UpcAGFlR+pzgNaWmCdRnewjoD/NG63gagQ578UWEJHoiKrGmgwy6talVwXUlTikRKY/04E5jsCVSkqrKsaM1WLBGWmf3S0/joEYqd/HwKnwY4ENpmAvEqQiyRNpUyVKOrHQOBEUSZPlsBpsCOBJZ2fOhVlkVNrkxa8pB7lMRA4UZRPl8BpsCOBQPRxScwlUlFjihnk5b0E3u08/4dWbEEhUzP7AEaG1ihaeZsTtkS6NYQPDR4ijn50ZXCctzpOY4Q53X8ewGBU6EBvEhfvCBTzx1uN/00X+7PzENpeyrTQdInQhc44T3QuBa/yYOaHGfF45aW9ulumwZpUdcI5LyFJ8iIDlfECH26thkqIpKEjgKdFKjmUIn+kJ8HT7YanwY4FLRpZVAWvuAZ6AfGoyoeXg8qSRmBWaNBANumGlOqHWosGp/azXfmhB4Un0OHEvqaSAto/+p69Hf8ZsOiEojGyve8wCH8Sbk6CzeZfOJbcbNQQAAA=&quot;"/>
     <we:property name="isFiltersActionButtonVisible" value="true"/>
     <we:property name="isVisualContainerHeaderHidden" value="false"/>
+    <we:property name="pageDisplayName" value="&quot;DISTRIBUTION WEEKDAYS/WEEKENDS&quot;"/>
+    <we:property name="pageName" value="&quot;ReportSectionbd7694d1b8ae70e1700c&quot;"/>
     <we:property name="reportEmbeddedTime" value="&quot;2024-04-18T19:13:45.206Z&quot;"/>
-    <we:property name="creatorTenantId" value="&quot;01ff18d5-6ae3-4fe1-831f-78c5ba7f715d&quot;"/>
-    <we:property name="creatorUserId" value="&quot;1003200373EAE09B&quot;"/>
-    <we:property name="creatorSessionId" value="&quot;bc9ca162-daf0-4f0d-9927-c6e4461dc3d6&quot;"/>
-    <we:property name="artifactViewState" value="&quot;live&quot;"/>
+    <we:property name="reportName" value="&quot;EDA_PROYECTO&quot;"/>
+    <we:property name="reportState" value="&quot;CONNECTED&quot;"/>
+    <we:property name="reportUrl" value="&quot;/groups/me/reports/e1dd3c9f-eb8b-4fd5-9415-94528c45eafa/ReportSectionbd7694d1b8ae70e1700c?bookmarkGuid=2065c45a-5899-404c-8786-807e083f0d15&amp;bookmarkUsage=1&amp;ctid=01ff18d5-6ae3-4fe1-831f-78c5ba7f715d&amp;fromEntryPoint=export&quot;"/>
+    <we:property name="design" value="{&quot;border&quot;:{&quot;isActive&quot;:true,&quot;color&quot;:&quot;#C480A7&quot;,&quot;width&quot;:1,&quot;transparency&quot;:0,&quot;dash&quot;:&quot;solid&quot;}}"/>
   </we:properties>
   <we:bindings/>
   <we:snapshot xmlns:r="http://schemas.openxmlformats.org/officeDocument/2006/relationships"/>
@@ -5220,23 +6968,23 @@
     <we:reference id="WA200003233" version="2.0.0.3" store="" storeType="OMEX"/>
   </we:alternateReferences>
   <we:properties>
-    <we:property name="reportUrl" value="&quot;/groups/me/reports/e1dd3c9f-eb8b-4fd5-9415-94528c45eafa/ReportSection0c3f042c402b034bca04?bookmarkGuid=7c48e13d-5220-4420-8a06-63ffb4d232b7&amp;bookmarkUsage=1&amp;ctid=01ff18d5-6ae3-4fe1-831f-78c5ba7f715d&amp;fromEntryPoint=export&quot;"/>
-    <we:property name="reportName" value="&quot;EDA_PROYECTO&quot;"/>
-    <we:property name="reportState" value="&quot;CONNECTED&quot;"/>
+    <we:property name="artifactViewState" value="&quot;live&quot;"/>
+    <we:property name="backgroundColor" value="&quot;#FFFFFF&quot;"/>
+    <we:property name="bookmark" value="&quot;H4sIAAAAAAAAA+1W30/bMBD+Vya/bJMilKYhbXmDjklowBCdkKapDxf7mhrcOHKcjq7q/76z3ZQyYExTJ4S0PtV357vvvvsRL5mQdaVgcQ4zZAfsDAwHoc2bDotYGWRHWt/MwNzkWSfFPu/liUj63TjeT7pIVrqyUpc1O1gyC6ZAeyXrBpRzSMJvrNOLhUgwH0Ca7PeyAc9EzsYRA6UuoHA2E1A1RqxCU+sSlPyBwQWprGlwFTG8rZQ24AKNLFh0weZkTmcC2NnrEg7gVs5xhNwG6SVW2tj1OebdSZwmPI2TPO6mOYc4pTt10Hrwz9u7oB7YUJcWZEkAnOzRBEk+kcquTfLF8W1liA3iaFE5Ug/FHEqOgvnkDNYhlyU7LAqDBdj18fiecqhVM3tEPtKN4XiJE68qrbQLilHP9I0sC7YiBi+MJn43YvTCj025ZmvfHaf6+9Ag0SvYQWcVbbAOSVRoIzmoB3B3jGgbQrwF4Wm6jLTTGVrJ3ekUJ/aFSbyUxdRjGHEyFsdzIu1BqBfE52FRJ47d4TOZg9XUmd2H7I9JUpNrtR7Hu/7/EopSSRxOwVi3BPJrGhzX63RJG4HmaOHb/YM07UQm0a8s/K/drmq3GrcLkPxcb2219eyGYuwUnQcxJcZUy1qNqq01BRNg4Qwqrwie9sJVp6xdJiciUDarwMi6JbA9fZKla8No0xg75nZT7FNJazpU+gpU4zr77Ves35KVI5ZMqUfBpeM+Z0PdlPZcl+eNUu/uJfaejV0Zwtq/g3i2ubzc2l31PyhIxDjwKQqfxYnFWQgiBToPEuvXRn3E5k667qKYtKQMrUdesizN+pNEQJb0BkJkvTjuv/rv7h+sXQ5G/PXKfaksw7oYZHEXMKUHU5ajyOJOL/Vvud/ma/HW5vr2fsr+ty2hIaXHp/ujG1tXwPECyrBsqoDOD4CfQSgFinYen+hD/yhlPgihkbnCZy64p2q7Muj3E9pJCPFaCwAA&quot;"/>
+    <we:property name="creatorSessionId" value="&quot;512a605c-c2bc-4568-aabe-530aee35831a&quot;"/>
+    <we:property name="creatorTenantId" value="&quot;01ff18d5-6ae3-4fe1-831f-78c5ba7f715d&quot;"/>
+    <we:property name="creatorUserId" value="&quot;1003200373EAE09B&quot;"/>
+    <we:property name="datasetId" value="&quot;8d266ffc-6eb7-4324-bb53-5eca314f4ee4&quot;"/>
     <we:property name="embedUrl" value="&quot;/reportEmbed?reportId=e1dd3c9f-eb8b-4fd5-9415-94528c45eafa&amp;config=eyJjbHVzdGVyVXJsIjoiaHR0cHM6Ly9XQUJJLVdFU1QtRVVST1BFLUYtUFJJTUFSWS1yZWRpcmVjdC5hbmFseXNpcy53aW5kb3dzLm5ldCIsImVtYmVkRmVhdHVyZXMiOnsidXNhZ2VNZXRyaWNzVk5leHQiOnRydWV9fQ%3D%3D&amp;disableSensitivityBanner=true&quot;"/>
-    <we:property name="pageName" value="&quot;ReportSection0c3f042c402b034bca04&quot;"/>
-    <we:property name="pageDisplayName" value="&quot;FUMADORES&quot;"/>
-    <we:property name="datasetId" value="&quot;8d266ffc-6eb7-4324-bb53-5eca314f4ee4&quot;"/>
-    <we:property name="backgroundColor" value="&quot;#FFFFFF&quot;"/>
-    <we:property name="bookmark" value="&quot;H4sIAAAAAAAAA+1WUW/aMBD+K5Of0RRCGgpvlLGXjoJg6kuFpot9Ce5MHDkOg6H8952dtKNjW6cJCU1annKfz77vPt/ZPjAhy0LB/g42yIZsCoaD0OZNl3VY3mA3s9ntdLS4/XQ3mk4I1oWVOi/Z8MAsmAztvSwrUG4FAh9WHQZKzSFzVgqqxA4r0JQ6ByW/YuNMQ9ZUWHcY7gqlDbgllxYsumW35E42xe6+7VFE4FZucYncNugCC21sawe8lwZRyKMgTIJelHAIIppTNqOe5uv+LqgnNta5BZkTAYd1+4EQISYDiMKrfjzgsUgcnkplW5dkP9kVhvImNfaF02sktpBzFMwnZ7BscjmwUZYZzMC25uTF4FiravMTfKkrw3GBqR/KrbR7ilFu9GeZZ6wmBedGk77PMHrwfZW3al05c62/jA2SvIINu3XnmeuYoEwbyUGd0D0zo2MKwRGFX8tlpF1v0ErurA+Y2guLuJDZ2nNYcnIWky2JdhLqgvw8LdeBzpiRO1hNldk7VX9FSElLq7Ydv9f/x2ZTConjNRjr2j15pMZxtU6TtBFobva+3N9J89SRYedHFf7v3bn2rl49HYC0zuPRqdb2brMZZ2VHJGggjqP4Og0FxGF/IETcD4Lrf/7w+4Pa52DEX9f9pbKsfeEM4qAHGNGtFSco4qDbj/yF+tt8Le5soncvU/bfMcI2SHe9+9GVLQvgOIccvSBFw06i96Nth1w4rf2/8QeApIppQt+DqlxU/zJgPgixkYnCVya49wLztFx51t8APGT6jboIAAA=&quot;"/>
     <we:property name="initialStateBookmark" value="&quot;H4sIAAAAAAAAA+1WUW/aMBD+K5Of0RRCGgpvlLGXjoJg6kuFpot9Ce5MHDkOg6H8952dtKNjW6cJCU1annKfz77vPt/ZPjAhy0LB/g42yIZsCoaD0OZNl3VY3mA3s9ntdLS4/XQ3mk4I1oWVOi/Z8MAsmAztvSwrUG4FAh9WHQZKzSFzVgqqxA4r0JQ6ByW/YuNMQ9ZUWHcY7gqlDbgllxYsumW35E42xe6+7VFE4FZucYncNugCC21sawe8lwZRyKMgTIJelHAIIppTNqOe5uv+LqgnNta5BZkTAYd1+4EQISYDiMKrfjzgsUgcnkplW5dkP9kVhvImNfaF02sktpBzFMwnZ7BscjmwUZYZzMC25uTF4FiravMTfKkrw3GBqR/KrbR7ilFu9GeZZ6wmBedGk77PMHrwfZW3al05c62/jA2SvIINu3XnmeuYoEwbyUGd0D0zo2MKwRGFX8tlpF1v0ErurA+Y2guLuJDZ2nNYcnIWky2JdhLqgvw8LdeBzpiRO1hNldk7VX9FSElLq7Ydv9f/x2ZTConjNRjr2j15pMZxtU6TtBFobva+3N9J89SRYedHFf7v3bn2rl49HYC0zuPRqdb2brMZZ2VHJGggjqP4Og0FxGF/IETcD4Lrf/7w+4Pa52DEX9f9pbKsfeEM4qAHGNGtFSco4qDbj/yF+tt8Le5soncvU/bfMcI2SHe9+9GVLQvgOIccvSBFw06i96Nth1w4rf2/8QeApIppQt+DqlxU/zJgPgixkYnCVya49wLztFx51t8APGT6jboIAAA=&quot;"/>
     <we:property name="isFiltersActionButtonVisible" value="true"/>
     <we:property name="isVisualContainerHeaderHidden" value="false"/>
+    <we:property name="pageDisplayName" value="&quot;FUMADORES&quot;"/>
+    <we:property name="pageName" value="&quot;ReportSection0c3f042c402b034bca04&quot;"/>
     <we:property name="reportEmbeddedTime" value="&quot;2024-04-18T19:08:36.557Z&quot;"/>
-    <we:property name="creatorTenantId" value="&quot;01ff18d5-6ae3-4fe1-831f-78c5ba7f715d&quot;"/>
-    <we:property name="creatorUserId" value="&quot;1003200373EAE09B&quot;"/>
-    <we:property name="creatorSessionId" value="&quot;512a605c-c2bc-4568-aabe-530aee35831a&quot;"/>
-    <we:property name="artifactViewState" value="&quot;live&quot;"/>
+    <we:property name="reportName" value="&quot;EDA_PROYECTO&quot;"/>
+    <we:property name="reportState" value="&quot;CONNECTED&quot;"/>
+    <we:property name="reportUrl" value="&quot;/groups/me/reports/e1dd3c9f-eb8b-4fd5-9415-94528c45eafa/ReportSection0c3f042c402b034bca04?bookmarkGuid=7c48e13d-5220-4420-8a06-63ffb4d232b7&amp;bookmarkUsage=1&amp;ctid=01ff18d5-6ae3-4fe1-831f-78c5ba7f715d&amp;fromEntryPoint=export&quot;"/>
   </we:properties>
   <we:bindings/>
   <we:snapshot xmlns:r="http://schemas.openxmlformats.org/officeDocument/2006/relationships"/>
@@ -5250,23 +6998,23 @@
     <we:reference id="WA200003233" version="2.0.0.3" store="" storeType="OMEX"/>
   </we:alternateReferences>
   <we:properties>
-    <we:property name="reportUrl" value="&quot;/groups/me/reports/e1dd3c9f-eb8b-4fd5-9415-94528c45eafa/ReportSection?bookmarkGuid=ee1c0d49-9cc3-4d8e-b104-32f9906f3cd1&amp;bookmarkUsage=1&amp;ctid=01ff18d5-6ae3-4fe1-831f-78c5ba7f715d&amp;fromEntryPoint=export&quot;"/>
-    <we:property name="reportName" value="&quot;EDA_PROYECTO&quot;"/>
-    <we:property name="reportState" value="&quot;CONNECTED&quot;"/>
+    <we:property name="artifactViewState" value="&quot;live&quot;"/>
+    <we:property name="backgroundColor" value="&quot;#FFFFFF&quot;"/>
+    <we:property name="bookmark" value="&quot;H4sIAAAAAAAAA9VWTW/bMAz9K4MuvRiDnNj5ujVZd9qGoB16GXKgJcZVq1iGJGfJCv/3UXLSNkHb7NChm08WKT0+PpKW75lUrtaw/QYrZBP2FawAaeyHlCWs6mxTY+5WYO9wJEY9QBzwPh8V43HKsyHtMrVXpnJscs882BL9tXIN6ABIxh+LhIHWcyjDagnaYcJqtM5UoNUv7DaTy9sG24ThptbGQoC88uAxwK5pO62JSvqxTxFBeLXGKxS+s15ibazfrxPmurdI6dAXwGLAmak8qIqAgw0zFBlwXgzzLM8QixRGwe5UVeodxcez37d1kMXjxhdmExQobgk/ILUtpTAaDAfD3mCZQiqLYTHuSdKJTi+V9ruAxfZiU1tShzTr0GaUa2msEhQpqmDRuR3lmdHNKr5dHNivTGMFXuIyuiqv/JaQ3MrcEW8WqMytIa2jucRKoo3WG/NzZpECSjbh7YIsrybqtBJ08mmebIVU6fAiwUPMo+5CKez8RkY3xjTv2RdFqXfY16CbAHs2BafEGTGiZxF4dXUlzrdPChi3uxjibXVYxGKlXPYziRxGeZpxif1Ujt+/WMGMz9QqeaBwLtdQCbIexz8vS4sl7Nv94m+S+9xUu7nKX+P6D/e2iOFnN2D94SDTwhLmdBvr/knZ/ReklxwxfTfB28ULI7PTe/t2Q7Nn0M0Mfd16eT8X2Rh4ykXOBS/ef2ZebIL/aWhONuyq0V5d0hmw8g87Nj3u2LeVOzZFcD53PZjGuxoEzqHCZ64JqgIQjDxxVcTfBhaDkBiq0KfulvAz8XCxtO1v8DMg6+YIAAA=&quot;"/>
+    <we:property name="creatorSessionId" value="&quot;e183b0fe-992c-4671-9cff-6bace1d8a58f&quot;"/>
+    <we:property name="creatorTenantId" value="&quot;01ff18d5-6ae3-4fe1-831f-78c5ba7f715d&quot;"/>
+    <we:property name="creatorUserId" value="&quot;1003200373EAE09B&quot;"/>
+    <we:property name="datasetId" value="&quot;8d266ffc-6eb7-4324-bb53-5eca314f4ee4&quot;"/>
     <we:property name="embedUrl" value="&quot;/reportEmbed?reportId=e1dd3c9f-eb8b-4fd5-9415-94528c45eafa&amp;config=eyJjbHVzdGVyVXJsIjoiaHR0cHM6Ly9XQUJJLVdFU1QtRVVST1BFLUYtUFJJTUFSWS1yZWRpcmVjdC5hbmFseXNpcy53aW5kb3dzLm5ldCIsImVtYmVkRmVhdHVyZXMiOnsidXNhZ2VNZXRyaWNzVk5leHQiOnRydWV9fQ%3D%3D&amp;disableSensitivityBanner=true&quot;"/>
-    <we:property name="pageName" value="&quot;ReportSection&quot;"/>
-    <we:property name="pageDisplayName" value="&quot;GENEROS&quot;"/>
-    <we:property name="datasetId" value="&quot;8d266ffc-6eb7-4324-bb53-5eca314f4ee4&quot;"/>
-    <we:property name="backgroundColor" value="&quot;#FFFFFF&quot;"/>
-    <we:property name="bookmark" value="&quot;H4sIAAAAAAAAA9VWTXPaMBD9Kx1dcvF0bLAh5EYovaQkGdLJJcN01tLiKBWWR5IplPF/70qGNGFI6CGdtD5Jb623b78sb5iQtlKwvoQFsjM2AcNBaPMhYRErW+z86upiMpxefLscTsYE68pJXVp2tmEOTIHuVtoalGcg8G4WMVDqGgq/m4OyGLEKjdUlKPkT25fJ5EyNTcRwVSltwFPeOHDoaZf0Ou3Jd/KxSx6BO7nEG+SuRadYaeN2+4jZdhUkPbd5suBwpEsHsiRij2GKPIU4zvtZmqWIeQKnHreyLNRW4u+zX9eVz4PDlcv1ymcgfyB+z9Q0FMJpr9/rd3rzBBKR9/NBR6R9f3oulds6zNfjVWUoO5Szlm1EsRbaSE6eQhYMWruVPNKqXoTV+Bl+o2vDcYrzYCqddGtisgv9nXQzL+XaaMp1gAssBZqA3usfI4PkULCzuJkR8mqgVklOJ5/GyRZIlfYLAQ5CHFXrSmJr1yKYMYS5YV8khd5y34KqPe3JOVjJT0gRPTOvq60raX54UsDwug0u3jYPs1CsJBbdVGAMp1mSxgK7iRi8f7E8jAdqFT1KGIollJzQff/DojBYwK7dx39T3Oe63M5V9prWf7i3eXA/ugfjng8ybQxxnq9D3T9Js/uCdKI9pe+W8Gb2wshs871+u6HZKWhnhr5unayb8XQAcRLzLOZx/v4z82IT/E9Dc7RhF7VyckpnwIg/7Nhkv2PfNt2hKbzx0PWga2cr4HgNJR64JqgKQDTiyFURfhtYcELJkLk6drf4n4nHi6VpfgHHSmuC1wgAAA==&quot;"/>
     <we:property name="initialStateBookmark" value="&quot;H4sIAAAAAAAAA9VWTXPaMBD9Kx1dcvF0bLAh5EYovaQkGdLJJcN01tLiKBWWR5IplPF/70qGNGFI6CGdtD5Jb623b78sb5iQtlKwvoQFsjM2AcNBaPMhYRErW+z86upiMpxefLscTsYE68pJXVp2tmEOTIHuVtoalGcg8G4WMVDqGgq/m4OyGLEKjdUlKPkT25fJ5EyNTcRwVSltwFPeOHDoaZf0Ou3Jd/KxSx6BO7nEG+SuRadYaeN2+4jZdhUkPbd5suBwpEsHsiRij2GKPIU4zvtZmqWIeQKnHreyLNRW4u+zX9eVz4PDlcv1ymcgfyB+z9Q0FMJpr9/rd3rzBBKR9/NBR6R9f3oulds6zNfjVWUoO5Szlm1EsRbaSE6eQhYMWruVPNKqXoTV+Bl+o2vDcYrzYCqddGtisgv9nXQzL+XaaMp1gAssBZqA3usfI4PkULCzuJkR8mqgVklOJ5/GyRZIlfYLAQ5CHFXrSmJr1yKYMYS5YV8khd5y34KqPe3JOVjJT0gRPTOvq60raX54UsDwug0u3jYPs1CsJBbdVGAMp1mSxgK7iRi8f7E8jAdqFT1KGIollJzQff/DojBYwK7dx39T3Oe63M5V9prWf7i3eXA/ugfjng8ybQxxnq9D3T9Js/uCdKI9pe+W8Gb2wshs871+u6HZKWhnhr5unayb8XQAcRLzLOZx/v4z82IT/E9Dc7RhF7VyckpnwIg/7Nhkv2PfNt2hKbzx0PWga2cr4HgNJR64JqgKQDTiyFURfhtYcELJkLk6drf4n4nHi6VpfgHHSmuC1wgAAA==&quot;"/>
     <we:property name="isFiltersActionButtonVisible" value="true"/>
     <we:property name="isVisualContainerHeaderHidden" value="false"/>
+    <we:property name="pageDisplayName" value="&quot;GENEROS&quot;"/>
+    <we:property name="pageName" value="&quot;ReportSection&quot;"/>
     <we:property name="reportEmbeddedTime" value="&quot;2024-04-18T19:09:10.443Z&quot;"/>
-    <we:property name="creatorTenantId" value="&quot;01ff18d5-6ae3-4fe1-831f-78c5ba7f715d&quot;"/>
-    <we:property name="creatorUserId" value="&quot;1003200373EAE09B&quot;"/>
-    <we:property name="creatorSessionId" value="&quot;e183b0fe-992c-4671-9cff-6bace1d8a58f&quot;"/>
-    <we:property name="artifactViewState" value="&quot;live&quot;"/>
+    <we:property name="reportName" value="&quot;EDA_PROYECTO&quot;"/>
+    <we:property name="reportState" value="&quot;CONNECTED&quot;"/>
+    <we:property name="reportUrl" value="&quot;/groups/me/reports/e1dd3c9f-eb8b-4fd5-9415-94528c45eafa/ReportSection?bookmarkGuid=ee1c0d49-9cc3-4d8e-b104-32f9906f3cd1&amp;bookmarkUsage=1&amp;ctid=01ff18d5-6ae3-4fe1-831f-78c5ba7f715d&amp;fromEntryPoint=export&quot;"/>
   </we:properties>
   <we:bindings/>
   <we:snapshot xmlns:r="http://schemas.openxmlformats.org/officeDocument/2006/relationships"/>
@@ -5280,23 +7028,23 @@
     <we:reference id="WA200003233" version="2.0.0.3" store="" storeType="OMEX"/>
   </we:alternateReferences>
   <we:properties>
-    <we:property name="reportUrl" value="&quot;/groups/me/reports/e1dd3c9f-eb8b-4fd5-9415-94528c45eafa/ReportSectionf322a1c85d074148803c?bookmarkGuid=98477c35-d62d-4451-8739-04ea72b699ad&amp;bookmarkUsage=1&amp;ctid=01ff18d5-6ae3-4fe1-831f-78c5ba7f715d&amp;fromEntryPoint=export&quot;"/>
-    <we:property name="reportName" value="&quot;EDA_PROYECTO&quot;"/>
-    <we:property name="reportState" value="&quot;CONNECTED&quot;"/>
-    <we:property name="embedUrl" value="&quot;/reportEmbed?reportId=e1dd3c9f-eb8b-4fd5-9415-94528c45eafa&amp;config=eyJjbHVzdGVyVXJsIjoiaHR0cHM6Ly9XQUJJLVdFU1QtRVVST1BFLUYtUFJJTUFSWS1yZWRpcmVjdC5hbmFseXNpcy53aW5kb3dzLm5ldCIsImVtYmVkRmVhdHVyZXMiOnsidXNhZ2VNZXRyaWNzVk5leHQiOnRydWV9fQ%3D%3D&amp;disableSensitivityBanner=true&quot;"/>
-    <we:property name="pageName" value="&quot;ReportSectionf322a1c85d074148803c&quot;"/>
-    <we:property name="pageDisplayName" value="&quot;DISTRIBUCION EDAD&quot;"/>
-    <we:property name="datasetId" value="&quot;8d266ffc-6eb7-4324-bb53-5eca314f4ee4&quot;"/>
+    <we:property name="artifactViewState" value="&quot;live&quot;"/>
     <we:property name="backgroundColor" value="&quot;#FFFFFF&quot;"/>
     <we:property name="bookmark" value="&quot;H4sIAAAAAAAAA9VVUU/bMBD+K5NfeKmmOE3ThLfSdS+sgGDiBVXTxbkGMzeObIe1q/Lfd3bKNraOSgiE9hZ/Pt/d990Xe8tKaRsFmzNYITtmczACSm3ecTZgdY+dnJ+fzieXp1/OJvMZwbpxUteWHW+ZA1Ohu5a2BeUzEHizGDBQ6gIqv1qCsjhgDRqra1DyO/bBtOVMi92A4bpR2oBPeeXAoU97T+G0ptr8/ZAqgnDyHq9QuB69xEYbt1svh3EMXGSjMhonPMmyaCjojO13Q5uH433R0NhU1w5kTQ14DJM8EwhJhHEUpXGZ5Hnu8aVUbhdSbGbrxhBvUmPTeL0m5T3UAksWyBm0PZctm2rVrsLX7BF+pVsj8BKXYat20m0ojV3pr7KuWEciXRhNEgaYdA3Qrf42NUiClew46gaHq0+qymAFbrecvV5rH9t6N6nR350uCLF0WO2c8Ev6zz0BoNjpLRjnrVbc0dC8znRKmxLNySZI/UGaBzfEgz96fiOi3eLBqBR595v7pkS90qZv/AXrLzoPF0uIk4TDeFwITEeCpzD2OZ7U2OHaFXr9WGGfDUWU8jiOxlESpzwqYJSmBw2/IygFVXoVz3t4n+sPeskqKdA8oslWSHeW/yjBQaDR9JUk9vu6DNsYWG7ZJ0nM+9zXoFqf9ugErBRH1FEXxvCPwYdw+3Jjf5ChH3wWZ0vkccbznOejAodZnj3/bnqLn4Y/Y6ICTPk/XQy8d0iY2D4T6tbZBgReQI17zEhDgrr02jxpyPDMslCE1JKFOuRg//j+tG/X/QANJtvhBwgAAA==&quot;"/>
+    <we:property name="creatorSessionId" value="&quot;1d6e8200-9bfd-4a84-8b71-5204cab86961&quot;"/>
+    <we:property name="creatorTenantId" value="&quot;01ff18d5-6ae3-4fe1-831f-78c5ba7f715d&quot;"/>
+    <we:property name="creatorUserId" value="&quot;1003200373EAE09B&quot;"/>
+    <we:property name="datasetId" value="&quot;8d266ffc-6eb7-4324-bb53-5eca314f4ee4&quot;"/>
+    <we:property name="embedUrl" value="&quot;/reportEmbed?reportId=e1dd3c9f-eb8b-4fd5-9415-94528c45eafa&amp;config=eyJjbHVzdGVyVXJsIjoiaHR0cHM6Ly9XQUJJLVdFU1QtRVVST1BFLUYtUFJJTUFSWS1yZWRpcmVjdC5hbmFseXNpcy53aW5kb3dzLm5ldCIsImVtYmVkRmVhdHVyZXMiOnsidXNhZ2VNZXRyaWNzVk5leHQiOnRydWV9fQ%3D%3D&amp;disableSensitivityBanner=true&quot;"/>
     <we:property name="initialStateBookmark" value="&quot;H4sIAAAAAAAAA9VVUU/bMBD+K5NfeKmmOE3ThLfSdS+sgGDiBVXTxbkGMzeObIe1q/Lfd3bKNraOSgiE9hZ/Pt/d990Xe8tKaRsFmzNYITtmczACSm3ecTZgdY+dnJ+fzieXp1/OJvMZwbpxUteWHW+ZA1Ohu5a2BeUzEHizGDBQ6gIqv1qCsjhgDRqra1DyO/bBtOVMi92A4bpR2oBPeeXAoU97T+G0ptr8/ZAqgnDyHq9QuB69xEYbt1svh3EMXGSjMhonPMmyaCjojO13Q5uH433R0NhU1w5kTQ14DJM8EwhJhHEUpXGZ5Hnu8aVUbhdSbGbrxhBvUmPTeL0m5T3UAksWyBm0PZctm2rVrsLX7BF+pVsj8BKXYat20m0ojV3pr7KuWEciXRhNEgaYdA3Qrf42NUiClew46gaHq0+qymAFbrecvV5rH9t6N6nR350uCLF0WO2c8Ev6zz0BoNjpLRjnrVbc0dC8znRKmxLNySZI/UGaBzfEgz96fiOi3eLBqBR595v7pkS90qZv/AXrLzoPF0uIk4TDeFwITEeCpzD2OZ7U2OHaFXr9WGGfDUWU8jiOxlESpzwqYJSmBw2/IygFVXoVz3t4n+sPeskqKdA8oslWSHeW/yjBQaDR9JUk9vu6DNsYWG7ZJ0nM+9zXoFqf9ugErBRH1FEXxvCPwYdw+3Jjf5ChH3wWZ0vkccbznOejAodZnj3/bnqLn4Y/Y6ICTPk/XQy8d0iY2D4T6tbZBgReQI17zEhDgrr02jxpyPDMslCE1JKFOuRg//j+tG/X/QANJtvhBwgAAA==&quot;"/>
     <we:property name="isFiltersActionButtonVisible" value="true"/>
     <we:property name="isVisualContainerHeaderHidden" value="false"/>
+    <we:property name="pageDisplayName" value="&quot;DISTRIBUCION EDAD&quot;"/>
+    <we:property name="pageName" value="&quot;ReportSectionf322a1c85d074148803c&quot;"/>
     <we:property name="reportEmbeddedTime" value="&quot;2024-04-18T19:09:55.608Z&quot;"/>
-    <we:property name="creatorTenantId" value="&quot;01ff18d5-6ae3-4fe1-831f-78c5ba7f715d&quot;"/>
-    <we:property name="creatorUserId" value="&quot;1003200373EAE09B&quot;"/>
-    <we:property name="creatorSessionId" value="&quot;1d6e8200-9bfd-4a84-8b71-5204cab86961&quot;"/>
-    <we:property name="artifactViewState" value="&quot;live&quot;"/>
+    <we:property name="reportName" value="&quot;EDA_PROYECTO&quot;"/>
+    <we:property name="reportState" value="&quot;CONNECTED&quot;"/>
+    <we:property name="reportUrl" value="&quot;/groups/me/reports/e1dd3c9f-eb8b-4fd5-9415-94528c45eafa/ReportSectionf322a1c85d074148803c?bookmarkGuid=98477c35-d62d-4451-8739-04ea72b699ad&amp;bookmarkUsage=1&amp;ctid=01ff18d5-6ae3-4fe1-831f-78c5ba7f715d&amp;fromEntryPoint=export&quot;"/>
   </we:properties>
   <we:bindings/>
   <we:snapshot xmlns:r="http://schemas.openxmlformats.org/officeDocument/2006/relationships"/>
@@ -5310,23 +7058,23 @@
     <we:reference id="WA200003233" version="2.0.0.3" store="" storeType="OMEX"/>
   </we:alternateReferences>
   <we:properties>
-    <we:property name="reportUrl" value="&quot;/groups/me/reports/e1dd3c9f-eb8b-4fd5-9415-94528c45eafa/ReportSection8573b1774846e58ea940?bookmarkGuid=d7d3f0a9-df23-43cc-b517-7d146de3694e&amp;bookmarkUsage=1&amp;ctid=01ff18d5-6ae3-4fe1-831f-78c5ba7f715d&amp;fromEntryPoint=export&quot;"/>
-    <we:property name="reportName" value="&quot;EDA_PROYECTO&quot;"/>
-    <we:property name="reportState" value="&quot;CONNECTED&quot;"/>
-    <we:property name="embedUrl" value="&quot;/reportEmbed?reportId=e1dd3c9f-eb8b-4fd5-9415-94528c45eafa&amp;config=eyJjbHVzdGVyVXJsIjoiaHR0cHM6Ly9XQUJJLVdFU1QtRVVST1BFLUYtUFJJTUFSWS1yZWRpcmVjdC5hbmFseXNpcy53aW5kb3dzLm5ldCIsImVtYmVkRmVhdHVyZXMiOnsidXNhZ2VNZXRyaWNzVk5leHQiOnRydWV9fQ%3D%3D&amp;disableSensitivityBanner=true&quot;"/>
-    <we:property name="pageName" value="&quot;ReportSection8573b1774846e58ea940&quot;"/>
-    <we:property name="pageDisplayName" value="&quot;DISTRIBUCION FUMADORES POR ESTADO CIVIL &quot;"/>
-    <we:property name="datasetId" value="&quot;8d266ffc-6eb7-4324-bb53-5eca314f4ee4&quot;"/>
+    <we:property name="artifactViewState" value="&quot;live&quot;"/>
     <we:property name="backgroundColor" value="&quot;#FFFFFF&quot;"/>
     <we:property name="bookmark" value="&quot;H4sIAAAAAAAAA+1YTW/bOBD9KwteejEWki3bUm6J6wKLNk3gBCkWC6MYkSOZXVkUSMqNN/B/75CSncZ14qRNmgRYn8QROV/vcWbkKyakqQpYfoQ5sgN2DJqDUPqPkHVY2ciOTk7eHx9O3n/+eHg8JrGqrFSlYQdXzILO0V5IU0PhNJDwn2mHQVGcQu5WGRQGO6xCbVQJhfwPm830yuoaVx2Gl1WhNDiVZxYsOrUL2k5rsh3+2SOLwK1c4Bly20gnWClt23XcH/bScDiM4miA/RghiQI6Y5q33s39+51R79hIlRZkSQ44WRBmQQYZCN5Le2ESYBf6Tp7JwrZb0uX4stIUN2VjWbl8jSiKXGnJoWA+Po2mCeeKjVRRz/3T+Ib8TNWa4wQz/6q00i5Jk5mrf2WZsxXl6VQryqIXz0FLC8VnQ/mqjX87U19HGsmwYAfBqrPx5VAsoOQk3XbkMM815mDb5fjxvXRi9MJ3ddki1//R1ylJDB0vWmZcQ3HehMCL2lCyUTRejWagrWNh+oXwdBCQAqUF6qOlR+Gt1GuidDtbATxb1KvpmsW098t31GzJ0rj+NOyYrtyOZDAIM+QRDIMo7vWCSPTTvVS+nT5kYzZHK7lbfcDM/p707qD+FrsmMp95Z844nRLjRUOp382D/Y56/1y9dIsTOgdWUfJ721ckfBnXeX9AD73XoMXLvcf7wl152CAehkEyEGEQJhEG4TAIu8/fH65r0AMhMYXkqG+AwuZILd495Ehd0R2iSKrGmERzHe3Np4t1Cyfs3mk198faIcOQhR9i6LDGicCVyk8zKvhtSSyFXOP811ZmzP2rZrPwxm/JFpm9gKL2Mwxp/SBtE+5VI6adb/5G88btnDb4+zMCLOzIyVwJnzX04O9WdwRGcqdwQ6ddHWLj1COzo2kL/W7UJ+L2g5QPopiLNB4kv9AWnv1e/kzt/L+XPVYvo1FbFWu17tGVO+9CO4g8Qqd7iWh1Xwta3X1oTdTXh0L1Or53XiJtXucl38eNewwalVwoew4pUe5+E2C4PQE+Tcy3fqb5a/GEn2idTZl86u/AjKcZJEEigjiOsReLMPF/adyJl8VLm6rLm2D53+5ZUdXWVMDxFErcMRzR1YRSOK7cOSD5P4+YN0LeSMeWuw+4v5Q249Rq9Q3VOK+R3RIAAA==&quot;"/>
+    <we:property name="creatorSessionId" value="&quot;8274b022-eddc-490a-9122-eb2e684b2329&quot;"/>
+    <we:property name="creatorTenantId" value="&quot;01ff18d5-6ae3-4fe1-831f-78c5ba7f715d&quot;"/>
+    <we:property name="creatorUserId" value="&quot;1003200373EAE09B&quot;"/>
+    <we:property name="datasetId" value="&quot;8d266ffc-6eb7-4324-bb53-5eca314f4ee4&quot;"/>
+    <we:property name="embedUrl" value="&quot;/reportEmbed?reportId=e1dd3c9f-eb8b-4fd5-9415-94528c45eafa&amp;config=eyJjbHVzdGVyVXJsIjoiaHR0cHM6Ly9XQUJJLVdFU1QtRVVST1BFLUYtUFJJTUFSWS1yZWRpcmVjdC5hbmFseXNpcy53aW5kb3dzLm5ldCIsImVtYmVkRmVhdHVyZXMiOnsidXNhZ2VNZXRyaWNzVk5leHQiOnRydWV9fQ%3D%3D&amp;disableSensitivityBanner=true&quot;"/>
     <we:property name="initialStateBookmark" value="&quot;H4sIAAAAAAAAA+1YTW/bOBD9KwteejEWki3bUm6J6wKLNk3gBCkWC6MYkSOZXVkUSMqNN/B/75CSncZ14qRNmgRYn8QROV/vcWbkKyakqQpYfoQ5sgN2DJqDUPqPkHVY2ciOTk7eHx9O3n/+eHg8JrGqrFSlYQdXzILO0V5IU0PhNJDwn2mHQVGcQu5WGRQGO6xCbVQJhfwPm830yuoaVx2Gl1WhNDiVZxYsOrUL2k5rsh3+2SOLwK1c4Bly20gnWClt23XcH/bScDiM4miA/RghiQI6Y5q33s39+51R79hIlRZkSQ44WRBmQQYZCN5Le2ESYBf6Tp7JwrZb0uX4stIUN2VjWbl8jSiKXGnJoWA+Po2mCeeKjVRRz/3T+Ib8TNWa4wQz/6q00i5Jk5mrf2WZsxXl6VQryqIXz0FLC8VnQ/mqjX87U19HGsmwYAfBqrPx5VAsoOQk3XbkMM815mDb5fjxvXRi9MJ3ddki1//R1ylJDB0vWmZcQ3HehMCL2lCyUTRejWagrWNh+oXwdBCQAqUF6qOlR+Gt1GuidDtbATxb1KvpmsW098t31GzJ0rj+NOyYrtyOZDAIM+QRDIMo7vWCSPTTvVS+nT5kYzZHK7lbfcDM/p707qD+FrsmMp95Z844nRLjRUOp382D/Y56/1y9dIsTOgdWUfJ721ckfBnXeX9AD73XoMXLvcf7wl152CAehkEyEGEQJhEG4TAIu8/fH65r0AMhMYXkqG+AwuZILd495Ehd0R2iSKrGmERzHe3Np4t1Cyfs3mk198faIcOQhR9i6LDGicCVyk8zKvhtSSyFXOP811ZmzP2rZrPwxm/JFpm9gKL2Mwxp/SBtE+5VI6adb/5G88btnDb4+zMCLOzIyVwJnzX04O9WdwRGcqdwQ6ddHWLj1COzo2kL/W7UJ+L2g5QPopiLNB4kv9AWnv1e/kzt/L+XPVYvo1FbFWu17tGVO+9CO4g8Qqd7iWh1Xwta3X1oTdTXh0L1Or53XiJtXucl38eNewwalVwoew4pUe5+E2C4PQE+Tcy3fqb5a/GEn2idTZl86u/AjKcZJEEigjiOsReLMPF/adyJl8VLm6rLm2D53+5ZUdXWVMDxFErcMRzR1YRSOK7cOSD5P4+YN0LeSMeWuw+4v5Q249Rq9Q3VOK+R3RIAAA==&quot;"/>
     <we:property name="isFiltersActionButtonVisible" value="true"/>
     <we:property name="isVisualContainerHeaderHidden" value="false"/>
+    <we:property name="pageDisplayName" value="&quot;DISTRIBUCION FUMADORES POR ESTADO CIVIL &quot;"/>
+    <we:property name="pageName" value="&quot;ReportSection8573b1774846e58ea940&quot;"/>
     <we:property name="reportEmbeddedTime" value="&quot;2024-04-18T19:10:38.954Z&quot;"/>
-    <we:property name="creatorTenantId" value="&quot;01ff18d5-6ae3-4fe1-831f-78c5ba7f715d&quot;"/>
-    <we:property name="creatorUserId" value="&quot;1003200373EAE09B&quot;"/>
-    <we:property name="creatorSessionId" value="&quot;8274b022-eddc-490a-9122-eb2e684b2329&quot;"/>
-    <we:property name="artifactViewState" value="&quot;live&quot;"/>
+    <we:property name="reportName" value="&quot;EDA_PROYECTO&quot;"/>
+    <we:property name="reportState" value="&quot;CONNECTED&quot;"/>
+    <we:property name="reportUrl" value="&quot;/groups/me/reports/e1dd3c9f-eb8b-4fd5-9415-94528c45eafa/ReportSection8573b1774846e58ea940?bookmarkGuid=d7d3f0a9-df23-43cc-b517-7d146de3694e&amp;bookmarkUsage=1&amp;ctid=01ff18d5-6ae3-4fe1-831f-78c5ba7f715d&amp;fromEntryPoint=export&quot;"/>
   </we:properties>
   <we:bindings/>
   <we:snapshot xmlns:r="http://schemas.openxmlformats.org/officeDocument/2006/relationships"/>
@@ -5364,28 +7112,28 @@
 </file>
 
 <file path=ppt/webextensions/webextension7.xml><?xml version="1.0" encoding="utf-8"?>
-<we:webextension xmlns:we="http://schemas.microsoft.com/office/webextensions/webextension/2010/11" id="{F3398426-2615-4361-9527-5B962CF0EAC6}">
+<we:webextension xmlns:we="http://schemas.microsoft.com/office/webextensions/webextension/2010/11" id="{797E2F99-0D63-41B9-AC2B-DEB0F93D63AE}">
   <we:reference id="wa200003233" version="2.0.0.3" store="es-ES" storeType="OMEX"/>
   <we:alternateReferences>
     <we:reference id="WA200003233" version="2.0.0.3" store="" storeType="OMEX"/>
   </we:alternateReferences>
   <we:properties>
-    <we:property name="reportUrl" value="&quot;/groups/me/reports/e1dd3c9f-eb8b-4fd5-9415-94528c45eafa/ReportSection2c39f0207ebb24759a08?bookmarkGuid=f1f85dd2-96d4-4b53-8277-3975daab14c0&amp;bookmarkUsage=1&amp;ctid=01ff18d5-6ae3-4fe1-831f-78c5ba7f715d&amp;fromEntryPoint=export&quot;"/>
+    <we:property name="reportUrl" value="&quot;/groups/me/reports/e1dd3c9f-eb8b-4fd5-9415-94528c45eafa/ReportSection44647c894549d0d266ee?bookmarkGuid=859ba2af-771d-4512-a4ea-5a14a09ac18b&amp;bookmarkUsage=1&amp;ctid=01ff18d5-6ae3-4fe1-831f-78c5ba7f715d&amp;fromEntryPoint=export&quot;"/>
     <we:property name="reportName" value="&quot;EDA_PROYECTO&quot;"/>
     <we:property name="reportState" value="&quot;CONNECTED&quot;"/>
     <we:property name="embedUrl" value="&quot;/reportEmbed?reportId=e1dd3c9f-eb8b-4fd5-9415-94528c45eafa&amp;config=eyJjbHVzdGVyVXJsIjoiaHR0cHM6Ly9XQUJJLVdFU1QtRVVST1BFLUYtUFJJTUFSWS1yZWRpcmVjdC5hbmFseXNpcy53aW5kb3dzLm5ldCIsImVtYmVkRmVhdHVyZXMiOnsidXNhZ2VNZXRyaWNzVk5leHQiOnRydWV9fQ%3D%3D&amp;disableSensitivityBanner=true&quot;"/>
-    <we:property name="pageName" value="&quot;ReportSection2c39f0207ebb24759a08&quot;"/>
-    <we:property name="pageDisplayName" value="&quot;NACIONALITY BY SMOKERS&quot;"/>
+    <we:property name="pageName" value="&quot;ReportSection44647c894549d0d266ee&quot;"/>
+    <we:property name="pageDisplayName" value="&quot;DISTRIBUCION FUMADORES POR EDUCATION&quot;"/>
     <we:property name="datasetId" value="&quot;8d266ffc-6eb7-4324-bb53-5eca314f4ee4&quot;"/>
     <we:property name="backgroundColor" value="&quot;#FFFFFF&quot;"/>
-    <we:property name="bookmark" value="&quot;H4sIAAAAAAAAA+1XbW/aMBD+K5O/7AuakkDe+g0YlaauL4Kp0zShykkuwV2IM9thMMR/39kJtFBauqpd+2GVKuGzz/fcc4/vYEkSJsucLs7oFMgROaUipgkX72zSIkVt652fn5x2hydXZ93TAZp5qRgvJDlaEkVFBuqSyYrm+gY0fh+3CM3zC5rpVUpzCS1SgpC8oDn7DfVh3FKiglWLwLzMuaD6ypGiCvS1MzyOa4xtf2hjRBorNoMRxKq2DqHkQjVrJ26HqeVYPkSR0/HdkFoB+sh618A8fF4HNcD6vFCUFQhA24KO4wbgumFo2U7ggheCAZiyXDVHosVgXgrMG9lYlJqvbjKjRQwJMckJkHUuS9LNMgEZVc1ysLXZ53k13WMf8UrEMITUbBWKqQXGkFP+gxUZWSGDF4IjvxszGONxVTRsuXo54b/6ApDehBxZq9YGax9NGRcspvkduM+CqDDpYuVxdRfIGC0SvfJGFjd1+FLji/NKItOQ9KjoT6hQWn/RNVZSk4/eXCQgegvD/0cm1hJxWjugX4371XitXzx7fUuUDfU19BfgerzS20mQ+u1OHLYtxwt81/Icix5U8Iur4oarv9SDzFkMYksEZArYhPSHDPDdaifMpKyDMZA32W5/ulw3GdTKseBT49a0QYkR7uTQIjUIS5f06wRV2ZSuSNhaV592mJGPr269MMHvYQvDXtK8Ml0Wb/3MVJ3usjbjyfffQL7XJ3Xx9b/2SaiieziZ8sSwBqb4+6/rUclifWF93T1K3oB6ZnXUCo7tyPPTxEnswPcTm3YCr/OWe/CEZROQ6uonqpal+IZMrO2+4OxK377Vk18R+263fmCK2G9nijyGOsHUZAqKxUbqkKo3QegQtWKQjGJ0SQaz+v3969F1AKUBp7/Z6cU5OlHF8bW1n9C/FY1yGMyfPMX/l/Elylj3di+yfUjT0APLopbrxp4V6rAPFxTmKuI7BTV/+2c0r5QsaQwXtIA9QwlfLS0SLaYHB5P5WUFMEETDUFMHHPSPjc0YW63+AGLsxd33DAAA&quot;"/>
-    <we:property name="initialStateBookmark" value="&quot;H4sIAAAAAAAAA+1XbW/aMBD+K5O/7AuakkDe+g0YlaauL4Kp0zShykkuwV2IM9thMMR/39kJtFBauqpd+2GVKuGzz/fcc4/vYEkSJsucLs7oFMgROaUipgkX72zSIkVt652fn5x2hydXZ93TAZp5qRgvJDlaEkVFBuqSyYrm+gY0fh+3CM3zC5rpVUpzCS1SgpC8oDn7DfVh3FKiglWLwLzMuaD6ypGiCvS1MzyOa4xtf2hjRBorNoMRxKq2DqHkQjVrJ26HqeVYPkSR0/HdkFoB+sh618A8fF4HNcD6vFCUFQhA24KO4wbgumFo2U7ggheCAZiyXDVHosVgXgrMG9lYlJqvbjKjRQwJMckJkHUuS9LNMgEZVc1ysLXZ53k13WMf8UrEMITUbBWKqQXGkFP+gxUZWSGDF4IjvxszGONxVTRsuXo54b/6ApDehBxZq9YGax9NGRcspvkduM+CqDDpYuVxdRfIGC0SvfJGFjd1+FLji/NKItOQ9KjoT6hQWn/RNVZSk4/eXCQgegvD/0cm1hJxWjugX4371XitXzx7fUuUDfU19BfgerzS20mQ+u1OHLYtxwt81/Icix5U8Iur4oarv9SDzFkMYksEZArYhPSHDPDdaifMpKyDMZA32W5/ulw3GdTKseBT49a0QYkR7uTQIjUIS5f06wRV2ZSuSNhaV592mJGPr269MMHvYQvDXtK8Ml0Wb/3MVJ3usjbjyfffQL7XJ3Xx9b/2SaiieziZ8sSwBqb4+6/rUclifWF93T1K3oB6ZnXUCo7tyPPTxEnswPcTm3YCr/OWe/CEZROQ6uonqpal+IZMrO2+4OxK377Vk18R+263fmCK2G9nijyGOsHUZAqKxUbqkKo3QegQtWKQjGJ0SQaz+v3969F1AKUBp7/Z6cU5OlHF8bW1n9C/FY1yGMyfPMX/l/Elylj3di+yfUjT0APLopbrxp4V6rAPFxTmKuI7BTV/+2c0r5QsaQwXtIA9QwlfLS0SLaYHB5P5WUFMEETDUFMHHPSPjc0YW63+AGLsxd33DAAA&quot;"/>
+    <we:property name="bookmark" value="&quot;H4sIAAAAAAAAA+1XW2/aMBT+K5Nf9oKmBFJI+tYyKk29ik6dpglVJ/EhuAtxZjusrOK/79iGdqW0sLVrO2k8xSfn8p2LzxeuGBe6KmB6BGNk2+wQVAZcqjcha7DSy3aPj/cPd/r750c7hz0Sy8oIWWq2fcUMqBzNmdA1FNYDCb8MGgyK4gRyexpCobHBKlRallCIH+iV6ZVRNc4aDC+rQiqwLk8NGLRuJ6ROZ4odvmtRRMiMmOApZsZL+1hJZebnKGpHnSxOoq0o4QFvttuIZKP9Wwdzvb4N6oB1ZWlAlATAyoIoTdptHqRZGvNWAHGr07HyoSjMXCWd9i4rRXlTNaaVrVeXssilEhkUzOWnUPt0rlhXFvXYPfVuyU9lrTLs49C9Ko0wU/Kkx/KrKHM2ozqdKElVdOKRyEeozfk3wiuGFMeVxSqN5PeuQorP2XYwa1xD2uETKDOSLuPZyXOFuXdwB9STgLVidMK9upw3cOsu1gFJNJkX8wG56chHn0JW1JpqjnwXVHcEythJTC+op7YNZC0VR7U7dZ14L9RiWJqNJfQvlvJssJhk0r34ZTznA+Oh/9UJGcysYjzEMGliFmyFPGzHaRKk7bVTff8IKWFGYzQis6cDHJrnqfIYKDAU55q2Rq1XTVifquDAnGZkxXsTP1bPPQ7rgTp8dnXawzHZgZFU/NbyNQlfx5W+f/888oqD4q/3Vm+Y9cw1sRkg7yStoJnQ5YqDuJN0+MsTx81i+s3O6EJkqG71ho2RuN8+5Eh0aY0ok8oHE6hvsr39dLbgdmrhnpJjZzb/+tAU4U4ODeZBBHZ/fhoRBcz3ZMnFot0fliqjN1+l/uCC31MtCnsGRe0+bsjrgTA+3SsvJs23n1G/tZoD339nw8HAipqMJXdVQ9f81e52QYvMOlyM00rauAb1xNPhSSJEnsRhxNOkyTGGCHmAjyCJV3E9mw8t1H/qs+2FOHfjzf9KqHdjvJsy8Aa70kBaYO/yj4nsf2ufq7V+t/JWGEZRBDG0MQmCKMAELICHm4yXJpVLTXa/1Rwpa6MryPAESlxBCnS7oeTI1xCD+zfNXBBCI2jO1hjY/9jXNDKb/QS1SPBx7g8AAA==&quot;"/>
+    <we:property name="initialStateBookmark" value="&quot;H4sIAAAAAAAAA+1XW2/aMBT+K5Nf9oKmBFJI+tYyKk29ik6dpglVJ/EhuAtxZjusrOK/79iGdqW0sLVrO2k8xSfn8p2LzxeuGBe6KmB6BGNk2+wQVAZcqjcha7DSy3aPj/cPd/r750c7hz0Sy8oIWWq2fcUMqBzNmdA1FNYDCb8MGgyK4gRyexpCobHBKlRallCIH+iV6ZVRNc4aDC+rQiqwLk8NGLRuJ6ROZ4odvmtRRMiMmOApZsZL+1hJZebnKGpHnSxOoq0o4QFvttuIZKP9Wwdzvb4N6oB1ZWlAlATAyoIoTdptHqRZGvNWAHGr07HyoSjMXCWd9i4rRXlTNaaVrVeXssilEhkUzOWnUPt0rlhXFvXYPfVuyU9lrTLs49C9Ko0wU/Kkx/KrKHM2ozqdKElVdOKRyEeozfk3wiuGFMeVxSqN5PeuQorP2XYwa1xD2uETKDOSLuPZyXOFuXdwB9STgLVidMK9upw3cOsu1gFJNJkX8wG56chHn0JW1JpqjnwXVHcEythJTC+op7YNZC0VR7U7dZ14L9RiWJqNJfQvlvJssJhk0r34ZTznA+Oh/9UJGcysYjzEMGliFmyFPGzHaRKk7bVTff8IKWFGYzQis6cDHJrnqfIYKDAU55q2Rq1XTVifquDAnGZkxXsTP1bPPQ7rgTp8dnXawzHZgZFU/NbyNQlfx5W+f/888oqD4q/3Vm+Y9cw1sRkg7yStoJnQ5YqDuJN0+MsTx81i+s3O6EJkqG71ho2RuN8+5Eh0aY0ok8oHE6hvsr39dLbgdmrhnpJjZzb/+tAU4U4ODeZBBHZ/fhoRBcz3ZMnFot0fliqjN1+l/uCC31MtCnsGRe0+bsjrgTA+3SsvJs23n1G/tZoD339nw8HAipqMJXdVQ9f81e52QYvMOlyM00rauAb1xNPhSSJEnsRhxNOkyTGGCHmAjyCJV3E9mw8t1H/qs+2FOHfjzf9KqHdjvJsy8Aa70kBaYO/yj4nsf2ufq7V+t/JWGEZRBDG0MQmCKMAELICHm4yXJpVLTXa/1Rwpa6MryPAESlxBCnS7oeTI1xCD+zfNXBBCI2jO1hjY/9jXNDKb/QS1SPBx7g8AAA==&quot;"/>
     <we:property name="isFiltersActionButtonVisible" value="true"/>
     <we:property name="isVisualContainerHeaderHidden" value="false"/>
-    <we:property name="reportEmbeddedTime" value="&quot;2024-04-18T19:11:40.360Z&quot;"/>
+    <we:property name="reportEmbeddedTime" value="&quot;2024-04-19T17:43:58.353Z&quot;"/>
     <we:property name="creatorTenantId" value="&quot;01ff18d5-6ae3-4fe1-831f-78c5ba7f715d&quot;"/>
     <we:property name="creatorUserId" value="&quot;1003200373EAE09B&quot;"/>
-    <we:property name="creatorSessionId" value="&quot;576a812e-49d6-4e13-8d41-e891044c36c5&quot;"/>
+    <we:property name="creatorSessionId" value="&quot;4e2d6e41-c720-4c55-9fb2-3ecc91b2bcd0&quot;"/>
     <we:property name="artifactViewState" value="&quot;live&quot;"/>
   </we:properties>
   <we:bindings/>
@@ -5394,29 +7142,29 @@
 </file>
 
 <file path=ppt/webextensions/webextension8.xml><?xml version="1.0" encoding="utf-8"?>
-<we:webextension xmlns:we="http://schemas.microsoft.com/office/webextensions/webextension/2010/11" id="{1A461B50-0214-4EF6-B75E-0E8AABF066BA}">
+<we:webextension xmlns:we="http://schemas.microsoft.com/office/webextensions/webextension/2010/11" id="{F3398426-2615-4361-9527-5B962CF0EAC6}">
   <we:reference id="wa200003233" version="2.0.0.3" store="es-ES" storeType="OMEX"/>
   <we:alternateReferences>
     <we:reference id="WA200003233" version="2.0.0.3" store="" storeType="OMEX"/>
   </we:alternateReferences>
   <we:properties>
-    <we:property name="reportUrl" value="&quot;/groups/me/reports/e1dd3c9f-eb8b-4fd5-9415-94528c45eafa/ReportSection0007f7b6ce903571b939?bookmarkGuid=71f5ac45-677f-43cb-8daf-e55021cbfa47&amp;bookmarkUsage=1&amp;ctid=01ff18d5-6ae3-4fe1-831f-78c5ba7f715d&amp;fromEntryPoint=export&quot;"/>
+    <we:property name="artifactViewState" value="&quot;live&quot;"/>
+    <we:property name="backgroundColor" value="&quot;#FFFFFF&quot;"/>
+    <we:property name="bookmark" value="&quot;H4sIAAAAAAAAA+1XbW/aMBD+K5O/7AuakkDe+g0YlaauL4Kp0zShykkuwV2IM9thMMR/39kJtFBauqpd+2GVKuGzz/fcc4/vYEkSJsucLs7oFMgROaUipgkX72zSIkVt652fn5x2hydXZ93TAZp5qRgvJDlaEkVFBuqSyYrm+gY0fh+3CM3zC5rpVUpzCS1SgpC8oDn7DfVh3FKiglWLwLzMuaD6ypGiCvS1MzyOa4xtf2hjRBorNoMRxKq2DqHkQjVrJ26HqeVYPkSR0/HdkFoB+sh618A8fF4HNcD6vFCUFQhA24KO4wbgumFo2U7ggheCAZiyXDVHosVgXgrMG9lYlJqvbjKjRQwJMckJkHUuS9LNMgEZVc1ysLXZ53k13WMf8UrEMITUbBWKqQXGkFP+gxUZWSGDF4IjvxszGONxVTRsuXo54b/6ApDehBxZq9YGax9NGRcspvkduM+CqDDpYuVxdRfIGC0SvfJGFjd1+FLji/NKItOQ9KjoT6hQWn/RNVZSk4/eXCQgegvD/0cm1hJxWjugX4371XitXzx7fUuUDfU19BfgerzS20mQ+u1OHLYtxwt81/Icix5U8Iur4oarv9SDzFkMYksEZArYhPSHDPDdaifMpKyDMZA32W5/ulw3GdTKseBT49a0QYkR7uTQIjUIS5f06wRV2ZSuSNhaV592mJGPr269MMHvYQvDXtK8Ml0Wb/3MVJ3usjbjyfffQL7XJ3Xx9b/2SaiieziZ8sSwBqb4+6/rUclifWF93T1K3oB6ZnXUCo7tyPPTxEnswPcTm3YCr/OWe/CEZROQ6uonqpal+IZMrO2+4OxK377Vk18R+263fmCK2G9nijyGOsHUZAqKxUbqkKo3QegQtWKQjGJ0SQaz+v3969F1AKUBp7/Z6cU5OlHF8bW1n9C/FY1yGMyfPMX/l/Elylj3di+yfUjT0APLopbrxp4V6rAPFxTmKuI7BTV/+2c0r5QsaQwXtIA9QwlfLS0SLaYHB5P5WUFMEETDUFMHHPSPjc0YW63+AGLsxd33DAAA&quot;"/>
+    <we:property name="creatorSessionId" value="&quot;576a812e-49d6-4e13-8d41-e891044c36c5&quot;"/>
+    <we:property name="creatorTenantId" value="&quot;01ff18d5-6ae3-4fe1-831f-78c5ba7f715d&quot;"/>
+    <we:property name="creatorUserId" value="&quot;1003200373EAE09B&quot;"/>
+    <we:property name="datasetId" value="&quot;8d266ffc-6eb7-4324-bb53-5eca314f4ee4&quot;"/>
+    <we:property name="embedUrl" value="&quot;/reportEmbed?reportId=e1dd3c9f-eb8b-4fd5-9415-94528c45eafa&amp;config=eyJjbHVzdGVyVXJsIjoiaHR0cHM6Ly9XQUJJLVdFU1QtRVVST1BFLUYtUFJJTUFSWS1yZWRpcmVjdC5hbmFseXNpcy53aW5kb3dzLm5ldCIsImVtYmVkRmVhdHVyZXMiOnsidXNhZ2VNZXRyaWNzVk5leHQiOnRydWV9fQ%3D%3D&amp;disableSensitivityBanner=true&quot;"/>
+    <we:property name="initialStateBookmark" value="&quot;H4sIAAAAAAAAA+1XbW/aMBD+K5O/7AuakkDe+g0YlaauL4Kp0zShykkuwV2IM9thMMR/39kJtFBauqpd+2GVKuGzz/fcc4/vYEkSJsucLs7oFMgROaUipgkX72zSIkVt652fn5x2hydXZ93TAZp5qRgvJDlaEkVFBuqSyYrm+gY0fh+3CM3zC5rpVUpzCS1SgpC8oDn7DfVh3FKiglWLwLzMuaD6ypGiCvS1MzyOa4xtf2hjRBorNoMRxKq2DqHkQjVrJ26HqeVYPkSR0/HdkFoB+sh618A8fF4HNcD6vFCUFQhA24KO4wbgumFo2U7ggheCAZiyXDVHosVgXgrMG9lYlJqvbjKjRQwJMckJkHUuS9LNMgEZVc1ysLXZ53k13WMf8UrEMITUbBWKqQXGkFP+gxUZWSGDF4IjvxszGONxVTRsuXo54b/6ApDehBxZq9YGax9NGRcspvkduM+CqDDpYuVxdRfIGC0SvfJGFjd1+FLji/NKItOQ9KjoT6hQWn/RNVZSk4/eXCQgegvD/0cm1hJxWjugX4371XitXzx7fUuUDfU19BfgerzS20mQ+u1OHLYtxwt81/Icix5U8Iur4oarv9SDzFkMYksEZArYhPSHDPDdaifMpKyDMZA32W5/ulw3GdTKseBT49a0QYkR7uTQIjUIS5f06wRV2ZSuSNhaV592mJGPr269MMHvYQvDXtK8Ml0Wb/3MVJ3usjbjyfffQL7XJ3Xx9b/2SaiieziZ8sSwBqb4+6/rUclifWF93T1K3oB6ZnXUCo7tyPPTxEnswPcTm3YCr/OWe/CEZROQ6uonqpal+IZMrO2+4OxK377Vk18R+263fmCK2G9nijyGOsHUZAqKxUbqkKo3QegQtWKQjGJ0SQaz+v3969F1AKUBp7/Z6cU5OlHF8bW1n9C/FY1yGMyfPMX/l/Elylj3di+yfUjT0APLopbrxp4V6rAPFxTmKuI7BTV/+2c0r5QsaQwXtIA9QwlfLS0SLaYHB5P5WUFMEETDUFMHHPSPjc0YW63+AGLsxd33DAAA&quot;"/>
+    <we:property name="isFiltersActionButtonVisible" value="true"/>
+    <we:property name="isVisualContainerHeaderHidden" value="false"/>
+    <we:property name="pageDisplayName" value="&quot;NACIONALITY BY SMOKERS&quot;"/>
+    <we:property name="pageName" value="&quot;ReportSection2c39f0207ebb24759a08&quot;"/>
+    <we:property name="reportEmbeddedTime" value="&quot;2024-04-18T19:11:40.360Z&quot;"/>
     <we:property name="reportName" value="&quot;EDA_PROYECTO&quot;"/>
     <we:property name="reportState" value="&quot;CONNECTED&quot;"/>
-    <we:property name="embedUrl" value="&quot;/reportEmbed?reportId=e1dd3c9f-eb8b-4fd5-9415-94528c45eafa&amp;config=eyJjbHVzdGVyVXJsIjoiaHR0cHM6Ly9XQUJJLVdFU1QtRVVST1BFLUYtUFJJTUFSWS1yZWRpcmVjdC5hbmFseXNpcy53aW5kb3dzLm5ldCIsImVtYmVkRmVhdHVyZXMiOnsidXNhZ2VNZXRyaWNzVk5leHQiOnRydWV9fQ%3D%3D&amp;disableSensitivityBanner=true&quot;"/>
-    <we:property name="pageName" value="&quot;ReportSection0007f7b6ce903571b939&quot;"/>
-    <we:property name="pageDisplayName" value="&quot;GROSS_INCOME BY SMOKERS AND GENDER&quot;"/>
-    <we:property name="datasetId" value="&quot;8d266ffc-6eb7-4324-bb53-5eca314f4ee4&quot;"/>
-    <we:property name="backgroundColor" value="&quot;#FFFFFF&quot;"/>
-    <we:property name="bookmark" value="&quot;H4sIAAAAAAAAA+1WS2/bMAz+K4MuvQSDHcfO45Zm2aXrA8nQy1AUtEQ76hTLkOQsWZH/PkpO26XtWnRr0ct8Mh8iP5KfaF8zIW2tYHMCS2QjdgyGg9DmQ8w6rGp1h6enR8fj2dHlyfh4SmpdO6kry0bXzIEp0Z1L24DyEUj57aLDQKkzKL1UgLLYYTUaqytQ8ie2zmRypsFth+G6VtqADzl34NCHXZE7yZQ7/phQRuBOrnCO3LXaGdbauJ0cRVG/6OcZx2GUpP04HyZDOmNba4D5vL9PGoBNdOVAVgTA63gkIgF9MRDpIIuTboxd7vWFVG7nkm+m69pQ3dSNTe37NRYrqDgKFoozaNtartnYSLdYopMhxhcsXNCWpcES3M5pundkolWzfEQ/143hOMMimCon3YYy26X+LquSbamvZ0ZT12/VGJSfm2rXw9SLM1kuAoY5J2cxXYF6mOod8QVYnlJeOCV3cJpanXhxoX9MDBJhBBtF285t9yekKrWRnGq5P4BXQVsabe2lrLhetqD3kVyQxtIxtWP6HbW+tgB5ADFZgHH+MuVXREvPJDqnjUBzuAlk+iTNDd+7nfsj+U+k1yLS9uJmvVCcq992xo5H7TDegjiEheximORJnPQQMy76aW+YZ9GzG+bNOX7XyBeS2yrJ0ezxmi2RPhL+RYCDUEbdZpLY2rUIZgxVEp8lVd7GPgfV+LAHh2AlPyBE29C4P8wsuNvXm9hNG9pR8TjNsCiAdzFOOE8HXKT/8DF489vwYFHduxQv3VtgxF8vrHcutuVM2oszkUSDYT8apIMk6wGGBfpk2Q7XLtfr/crD8zjJdeNsDRzPoMJHyE4kgEr4lj9J+PDfxEISQiNz9dwN8X9Tt9dju/0FFIjwVtgJAAA=&quot;"/>
-    <we:property name="initialStateBookmark" value="&quot;H4sIAAAAAAAAA+1WS2/bMAz+K4MuvQSDHcfO45Zm2aXrA8nQy1AUtEQ76hTLkOQsWZH/PkpO26XtWnRr0ct8Mh8iP5KfaF8zIW2tYHMCS2QjdgyGg9DmQ8w6rGp1h6enR8fj2dHlyfh4SmpdO6kry0bXzIEp0Z1L24DyEUj57aLDQKkzKL1UgLLYYTUaqytQ8ie2zmRypsFth+G6VtqADzl34NCHXZE7yZQ7/phQRuBOrnCO3LXaGdbauJ0cRVG/6OcZx2GUpP04HyZDOmNba4D5vL9PGoBNdOVAVgTA63gkIgF9MRDpIIuTboxd7vWFVG7nkm+m69pQ3dSNTe37NRYrqDgKFoozaNtartnYSLdYopMhxhcsXNCWpcES3M5pundkolWzfEQ/143hOMMimCon3YYy26X+LquSbamvZ0ZT12/VGJSfm2rXw9SLM1kuAoY5J2cxXYF6mOod8QVYnlJeOCV3cJpanXhxoX9MDBJhBBtF285t9yekKrWRnGq5P4BXQVsabe2lrLhetqD3kVyQxtIxtWP6HbW+tgB5ADFZgHH+MuVXREvPJDqnjUBzuAlk+iTNDd+7nfsj+U+k1yLS9uJmvVCcq992xo5H7TDegjiEheximORJnPQQMy76aW+YZ9GzG+bNOX7XyBeS2yrJ0ezxmi2RPhL+RYCDUEbdZpLY2rUIZgxVEp8lVd7GPgfV+LAHh2AlPyBE29C4P8wsuNvXm9hNG9pR8TjNsCiAdzFOOE8HXKT/8DF489vwYFHduxQv3VtgxF8vrHcutuVM2oszkUSDYT8apIMk6wGGBfpk2Q7XLtfr/crD8zjJdeNsDRzPoMJHyE4kgEr4lj9J+PDfxEISQiNz9dwN8X9Tt9dju/0FFIjwVtgJAAA=&quot;"/>
-    <we:property name="isFiltersActionButtonVisible" value="true"/>
-    <we:property name="isVisualContainerHeaderHidden" value="false"/>
-    <we:property name="reportEmbeddedTime" value="&quot;2024-04-18T19:12:05.846Z&quot;"/>
-    <we:property name="creatorTenantId" value="&quot;01ff18d5-6ae3-4fe1-831f-78c5ba7f715d&quot;"/>
-    <we:property name="creatorUserId" value="&quot;1003200373EAE09B&quot;"/>
-    <we:property name="creatorSessionId" value="&quot;87ebaa55-901d-46de-97d1-ed4d594cd342&quot;"/>
-    <we:property name="artifactViewState" value="&quot;live&quot;"/>
+    <we:property name="reportUrl" value="&quot;/groups/me/reports/e1dd3c9f-eb8b-4fd5-9415-94528c45eafa/ReportSection2c39f0207ebb24759a08?bookmarkGuid=f1f85dd2-96d4-4b53-8277-3975daab14c0&amp;bookmarkUsage=1&amp;ctid=01ff18d5-6ae3-4fe1-831f-78c5ba7f715d&amp;fromEntryPoint=export&quot;"/>
   </we:properties>
   <we:bindings/>
   <we:snapshot xmlns:r="http://schemas.openxmlformats.org/officeDocument/2006/relationships"/>
@@ -5424,29 +7172,29 @@
 </file>
 
 <file path=ppt/webextensions/webextension9.xml><?xml version="1.0" encoding="utf-8"?>
-<we:webextension xmlns:we="http://schemas.microsoft.com/office/webextensions/webextension/2010/11" id="{0AAFD01D-5B72-478E-8927-935E73F9967A}">
+<we:webextension xmlns:we="http://schemas.microsoft.com/office/webextensions/webextension/2010/11" id="{1A461B50-0214-4EF6-B75E-0E8AABF066BA}">
   <we:reference id="wa200003233" version="2.0.0.3" store="es-ES" storeType="OMEX"/>
   <we:alternateReferences>
     <we:reference id="WA200003233" version="2.0.0.3" store="" storeType="OMEX"/>
   </we:alternateReferences>
   <we:properties>
-    <we:property name="reportUrl" value="&quot;/groups/me/reports/e1dd3c9f-eb8b-4fd5-9415-94528c45eafa/ReportSectionabe7d09ce07e6ca6c884?bookmarkGuid=351ab266-84a7-413b-8bc6-2986c29fc046&amp;bookmarkUsage=1&amp;ctid=01ff18d5-6ae3-4fe1-831f-78c5ba7f715d&amp;fromEntryPoint=export&quot;"/>
+    <we:property name="artifactViewState" value="&quot;live&quot;"/>
+    <we:property name="backgroundColor" value="&quot;#FFFFFF&quot;"/>
+    <we:property name="bookmark" value="&quot;H4sIAAAAAAAAA+1WS2/bMAz+K4MuvQSDHcfO45Zm2aXrA8nQy1AUtEQ76hTLkOQsWZH/PkpO26XtWnRr0ct8Mh8iP5KfaF8zIW2tYHMCS2QjdgyGg9DmQ8w6rGp1h6enR8fj2dHlyfh4SmpdO6kry0bXzIEp0Z1L24DyEUj57aLDQKkzKL1UgLLYYTUaqytQ8ie2zmRypsFth+G6VtqADzl34NCHXZE7yZQ7/phQRuBOrnCO3LXaGdbauJ0cRVG/6OcZx2GUpP04HyZDOmNba4D5vL9PGoBNdOVAVgTA63gkIgF9MRDpIIuTboxd7vWFVG7nkm+m69pQ3dSNTe37NRYrqDgKFoozaNtartnYSLdYopMhxhcsXNCWpcES3M5pundkolWzfEQ/143hOMMimCon3YYy26X+LquSbamvZ0ZT12/VGJSfm2rXw9SLM1kuAoY5J2cxXYF6mOod8QVYnlJeOCV3cJpanXhxoX9MDBJhBBtF285t9yekKrWRnGq5P4BXQVsabe2lrLhetqD3kVyQxtIxtWP6HbW+tgB5ADFZgHH+MuVXREvPJDqnjUBzuAlk+iTNDd+7nfsj+U+k1yLS9uJmvVCcq992xo5H7TDegjiEheximORJnPQQMy76aW+YZ9GzG+bNOX7XyBeS2yrJ0ezxmi2RPhL+RYCDUEbdZpLY2rUIZgxVEp8lVd7GPgfV+LAHh2AlPyBE29C4P8wsuNvXm9hNG9pR8TjNsCiAdzFOOE8HXKT/8DF489vwYFHduxQv3VtgxF8vrHcutuVM2oszkUSDYT8apIMk6wGGBfpk2Q7XLtfr/crD8zjJdeNsDRzPoMJHyE4kgEr4lj9J+PDfxEISQiNz9dwN8X9Tt9dju/0FFIjwVtgJAAA=&quot;"/>
+    <we:property name="creatorSessionId" value="&quot;87ebaa55-901d-46de-97d1-ed4d594cd342&quot;"/>
+    <we:property name="creatorTenantId" value="&quot;01ff18d5-6ae3-4fe1-831f-78c5ba7f715d&quot;"/>
+    <we:property name="creatorUserId" value="&quot;1003200373EAE09B&quot;"/>
+    <we:property name="datasetId" value="&quot;8d266ffc-6eb7-4324-bb53-5eca314f4ee4&quot;"/>
+    <we:property name="embedUrl" value="&quot;/reportEmbed?reportId=e1dd3c9f-eb8b-4fd5-9415-94528c45eafa&amp;config=eyJjbHVzdGVyVXJsIjoiaHR0cHM6Ly9XQUJJLVdFU1QtRVVST1BFLUYtUFJJTUFSWS1yZWRpcmVjdC5hbmFseXNpcy53aW5kb3dzLm5ldCIsImVtYmVkRmVhdHVyZXMiOnsidXNhZ2VNZXRyaWNzVk5leHQiOnRydWV9fQ%3D%3D&amp;disableSensitivityBanner=true&quot;"/>
+    <we:property name="initialStateBookmark" value="&quot;H4sIAAAAAAAAA+1WS2/bMAz+K4MuvQSDHcfO45Zm2aXrA8nQy1AUtEQ76hTLkOQsWZH/PkpO26XtWnRr0ct8Mh8iP5KfaF8zIW2tYHMCS2QjdgyGg9DmQ8w6rGp1h6enR8fj2dHlyfh4SmpdO6kry0bXzIEp0Z1L24DyEUj57aLDQKkzKL1UgLLYYTUaqytQ8ie2zmRypsFth+G6VtqADzl34NCHXZE7yZQ7/phQRuBOrnCO3LXaGdbauJ0cRVG/6OcZx2GUpP04HyZDOmNba4D5vL9PGoBNdOVAVgTA63gkIgF9MRDpIIuTboxd7vWFVG7nkm+m69pQ3dSNTe37NRYrqDgKFoozaNtartnYSLdYopMhxhcsXNCWpcES3M5pundkolWzfEQ/143hOMMimCon3YYy26X+LquSbamvZ0ZT12/VGJSfm2rXw9SLM1kuAoY5J2cxXYF6mOod8QVYnlJeOCV3cJpanXhxoX9MDBJhBBtF285t9yekKrWRnGq5P4BXQVsabe2lrLhetqD3kVyQxtIxtWP6HbW+tgB5ADFZgHH+MuVXREvPJDqnjUBzuAlk+iTNDd+7nfsj+U+k1yLS9uJmvVCcq992xo5H7TDegjiEheximORJnPQQMy76aW+YZ9GzG+bNOX7XyBeS2yrJ0ezxmi2RPhL+RYCDUEbdZpLY2rUIZgxVEp8lVd7GPgfV+LAHh2AlPyBE29C4P8wsuNvXm9hNG9pR8TjNsCiAdzFOOE8HXKT/8DF489vwYFHduxQv3VtgxF8vrHcutuVM2oszkUSDYT8apIMk6wGGBfpk2Q7XLtfr/crD8zjJdeNsDRzPoMJHyE4kgEr4lj9J+PDfxEISQiNz9dwN8X9Tt9dju/0FFIjwVtgJAAA=&quot;"/>
+    <we:property name="isFiltersActionButtonVisible" value="true"/>
+    <we:property name="isVisualContainerHeaderHidden" value="false"/>
+    <we:property name="pageDisplayName" value="&quot;GROSS_INCOME BY SMOKERS AND GENDER&quot;"/>
+    <we:property name="pageName" value="&quot;ReportSection0007f7b6ce903571b939&quot;"/>
+    <we:property name="reportEmbeddedTime" value="&quot;2024-04-18T19:12:05.846Z&quot;"/>
     <we:property name="reportName" value="&quot;EDA_PROYECTO&quot;"/>
     <we:property name="reportState" value="&quot;CONNECTED&quot;"/>
-    <we:property name="embedUrl" value="&quot;/reportEmbed?reportId=e1dd3c9f-eb8b-4fd5-9415-94528c45eafa&amp;config=eyJjbHVzdGVyVXJsIjoiaHR0cHM6Ly9XQUJJLVdFU1QtRVVST1BFLUYtUFJJTUFSWS1yZWRpcmVjdC5hbmFseXNpcy53aW5kb3dzLm5ldCIsImVtYmVkRmVhdHVyZXMiOnsidXNhZ2VNZXRyaWNzVk5leHQiOnRydWV9fQ%3D%3D&amp;disableSensitivityBanner=true&quot;"/>
-    <we:property name="pageName" value="&quot;ReportSectionabe7d09ce07e6ca6c884&quot;"/>
-    <we:property name="pageDisplayName" value="&quot;REGION BY SMOKERS&quot;"/>
-    <we:property name="datasetId" value="&quot;8d266ffc-6eb7-4324-bb53-5eca314f4ee4&quot;"/>
-    <we:property name="backgroundColor" value="&quot;#FFFFFF&quot;"/>
-    <we:property name="bookmark" value="&quot;H4sIAAAAAAAAA+VWy27bMBD8lYKXXIyCMi1Lzs1x3UuaB5IilyIoluRaZSqLAkmldg3/e5eUkzaBkaBAgPRxE2fJ3Z0ZLcEN08a3NaxPYYnskJ2AU6Cte5OxAWt67Ojs7PhkenH8+XR6MifYtsHYxrPDDQvgKgxXxndQxwwEfroeMKjrc6jiagG1xwFr0XnbQG2+Y7+ZQsF1uB0wXLW1dRBTXgYIGNPe0nZaU+3sraCKoIK5xUtUoUcvsLUu7NYgsdB8opAXOFYwVmU5ojO+j6Y2n98fi6bGZrYJYBpqIGLDIudyJAuhUZSZ4MMykxFfmDrstsj1fNU64k1qrNuo11TfQqNQs0TOoe+5bNi0qhxWEHbL+YPgzNbdcg9+aTun8AIXKdQEE9ZUwy/tV9NUbEsKnjtL+t7DmMD3XbNTK4/LL/bbzCHJq9kh314T4ul4vXPjJ/2PPQUFLrZv5Q1pFmnSAes0uqN1YvrOuDszhoNHDb8aS6JFUKaEyEcLlXGQkIMqgY+ftWxGylTWGUVaPHbthVv+TSd8bRS6B16wJdLUxQ8NARKNtq9ksI9bncKYWG7YB0PM+9xXUHcx7cEReKMOqKM73foZo5ZvfhmctN2nEi8qA1WkQDEW49FkMeSZ5KWYiIku+OtbRT9vPPbfe3WvQ28WLwRimY+lKHPQogTBs5jmSUUCroK0q4dXScw2KRfZUE9KLjkXpSzksMz/YOsH/9Lljt6ZXehvvOLT/7NvwmwXfAsKz6HBPZNGdkGjo0ZPTlt6sbBUhFQzsn5uPOM75n42t9sf6xsvIFIJAAA=&quot;"/>
-    <we:property name="initialStateBookmark" value="&quot;H4sIAAAAAAAAA+VWy27bMBD8lYKXXIyCMi1Lzs1x3UuaB5IilyIoluRaZSqLAkmldg3/e5eUkzaBkaBAgPRxE2fJ3Z0ZLcEN08a3NaxPYYnskJ2AU6Cte5OxAWt67Ojs7PhkenH8+XR6MifYtsHYxrPDDQvgKgxXxndQxwwEfroeMKjrc6jiagG1xwFr0XnbQG2+Y7+ZQsF1uB0wXLW1dRBTXgYIGNPe0nZaU+3sraCKoIK5xUtUoUcvsLUu7NYgsdB8opAXOFYwVmU5ojO+j6Y2n98fi6bGZrYJYBpqIGLDIudyJAuhUZSZ4MMykxFfmDrstsj1fNU64k1qrNuo11TfQqNQs0TOoe+5bNi0qhxWEHbL+YPgzNbdcg9+aTun8AIXKdQEE9ZUwy/tV9NUbEsKnjtL+t7DmMD3XbNTK4/LL/bbzCHJq9kh314T4ul4vXPjJ/2PPQUFLrZv5Q1pFmnSAes0uqN1YvrOuDszhoNHDb8aS6JFUKaEyEcLlXGQkIMqgY+ftWxGylTWGUVaPHbthVv+TSd8bRS6B16wJdLUxQ8NARKNtq9ksI9bncKYWG7YB0PM+9xXUHcx7cEReKMOqKM73foZo5ZvfhmctN2nEi8qA1WkQDEW49FkMeSZ5KWYiIku+OtbRT9vPPbfe3WvQ28WLwRimY+lKHPQogTBs5jmSUUCroK0q4dXScw2KRfZUE9KLjkXpSzksMz/YOsH/9Lljt6ZXehvvOLT/7NvwmwXfAsKz6HBPZNGdkGjo0ZPTlt6sbBUhFQzsn5uPOM75n42t9sf6xsvIFIJAAA=&quot;"/>
-    <we:property name="isFiltersActionButtonVisible" value="true"/>
-    <we:property name="isVisualContainerHeaderHidden" value="false"/>
-    <we:property name="reportEmbeddedTime" value="&quot;2024-04-18T19:12:31.616Z&quot;"/>
-    <we:property name="creatorTenantId" value="&quot;01ff18d5-6ae3-4fe1-831f-78c5ba7f715d&quot;"/>
-    <we:property name="creatorUserId" value="&quot;1003200373EAE09B&quot;"/>
-    <we:property name="creatorSessionId" value="&quot;8a05011c-091f-4b4d-af3b-6958fee221ee&quot;"/>
-    <we:property name="artifactViewState" value="&quot;live&quot;"/>
+    <we:property name="reportUrl" value="&quot;/groups/me/reports/e1dd3c9f-eb8b-4fd5-9415-94528c45eafa/ReportSection0007f7b6ce903571b939?bookmarkGuid=71f5ac45-677f-43cb-8daf-e55021cbfa47&amp;bookmarkUsage=1&amp;ctid=01ff18d5-6ae3-4fe1-831f-78c5ba7f715d&amp;fromEntryPoint=export&quot;"/>
   </we:properties>
   <we:bindings/>
   <we:snapshot xmlns:r="http://schemas.openxmlformats.org/officeDocument/2006/relationships"/>

</xml_diff>